<commit_message>
Add background and cohort info
</commit_message>
<xml_diff>
--- a/docs/Presentation.pptx
+++ b/docs/Presentation.pptx
@@ -13,7 +13,7 @@
   <p:sldIdLst>
     <p:sldId id="256" r:id="rId2"/>
     <p:sldId id="304" r:id="rId3"/>
-    <p:sldId id="286" r:id="rId4"/>
+    <p:sldId id="316" r:id="rId4"/>
     <p:sldId id="289" r:id="rId5"/>
     <p:sldId id="305" r:id="rId6"/>
     <p:sldId id="306" r:id="rId7"/>
@@ -1301,7 +1301,7 @@
           <a:p>
             <a:r>
               <a:rPr lang="en-US" dirty="0" smtClean="0"/>
-              <a:t>Nalini</a:t>
+              <a:t>Chen</a:t>
             </a:r>
             <a:endParaRPr lang="en-US" dirty="0"/>
           </a:p>
@@ -5251,6 +5251,1449 @@
           </a:p>
         </p:txBody>
       </p:sp>
+      <p:graphicFrame>
+        <p:nvGraphicFramePr>
+          <p:cNvPr id="9" name="Table 8"/>
+          <p:cNvGraphicFramePr>
+            <a:graphicFrameLocks noGrp="1"/>
+          </p:cNvGraphicFramePr>
+          <p:nvPr>
+            <p:extLst>
+              <p:ext uri="{D42A27DB-BD31-4B8C-83A1-F6EECF244321}">
+                <p14:modId xmlns:p14="http://schemas.microsoft.com/office/powerpoint/2010/main" val="4025364935"/>
+              </p:ext>
+            </p:extLst>
+          </p:nvPr>
+        </p:nvGraphicFramePr>
+        <p:xfrm>
+          <a:off x="1067594" y="2492375"/>
+          <a:ext cx="7008813" cy="2966720"/>
+        </p:xfrm>
+        <a:graphic>
+          <a:graphicData uri="http://schemas.openxmlformats.org/drawingml/2006/table">
+            <a:tbl>
+              <a:tblPr firstRow="1" bandRow="1">
+                <a:tableStyleId>{2D5ABB26-0587-4C30-8999-92F81FD0307C}</a:tableStyleId>
+              </a:tblPr>
+              <a:tblGrid>
+                <a:gridCol w="2921000"/>
+                <a:gridCol w="2127250"/>
+                <a:gridCol w="1960563"/>
+              </a:tblGrid>
+              <a:tr h="370840">
+                <a:tc>
+                  <a:txBody>
+                    <a:bodyPr/>
+                    <a:lstStyle/>
+                    <a:p>
+                      <a:pPr algn="ctr"/>
+                      <a:r>
+                        <a:rPr lang="en-US" b="1" dirty="0" smtClean="0">
+                          <a:latin typeface="Avenir Black"/>
+                          <a:cs typeface="Avenir Black"/>
+                        </a:rPr>
+                        <a:t>Covariate</a:t>
+                      </a:r>
+                      <a:endParaRPr lang="en-US" b="1" dirty="0">
+                        <a:latin typeface="Avenir Black"/>
+                        <a:cs typeface="Avenir Black"/>
+                      </a:endParaRPr>
+                    </a:p>
+                  </a:txBody>
+                  <a:tcPr>
+                    <a:lnL w="12700" cap="flat" cmpd="sng" algn="ctr">
+                      <a:solidFill>
+                        <a:scrgbClr r="0" g="0" b="0"/>
+                      </a:solidFill>
+                      <a:prstDash val="solid"/>
+                      <a:round/>
+                      <a:headEnd type="none" w="med" len="med"/>
+                      <a:tailEnd type="none" w="med" len="med"/>
+                    </a:lnL>
+                    <a:lnR w="12700" cap="flat" cmpd="sng" algn="ctr">
+                      <a:solidFill>
+                        <a:scrgbClr r="0" g="0" b="0"/>
+                      </a:solidFill>
+                      <a:prstDash val="solid"/>
+                      <a:round/>
+                      <a:headEnd type="none" w="med" len="med"/>
+                      <a:tailEnd type="none" w="med" len="med"/>
+                    </a:lnR>
+                    <a:lnT w="12700" cap="flat" cmpd="sng" algn="ctr">
+                      <a:solidFill>
+                        <a:scrgbClr r="0" g="0" b="0"/>
+                      </a:solidFill>
+                      <a:prstDash val="solid"/>
+                      <a:round/>
+                      <a:headEnd type="none" w="med" len="med"/>
+                      <a:tailEnd type="none" w="med" len="med"/>
+                    </a:lnT>
+                    <a:lnB w="28575" cap="flat" cmpd="sng" algn="ctr">
+                      <a:solidFill>
+                        <a:scrgbClr r="0" g="0" b="0"/>
+                      </a:solidFill>
+                      <a:prstDash val="solid"/>
+                      <a:round/>
+                      <a:headEnd type="none" w="med" len="med"/>
+                      <a:tailEnd type="none" w="med" len="med"/>
+                    </a:lnB>
+                  </a:tcPr>
+                </a:tc>
+                <a:tc>
+                  <a:txBody>
+                    <a:bodyPr/>
+                    <a:lstStyle/>
+                    <a:p>
+                      <a:pPr algn="ctr"/>
+                      <a:r>
+                        <a:rPr lang="en-US" b="1" dirty="0" smtClean="0">
+                          <a:latin typeface="Avenir Black"/>
+                          <a:cs typeface="Avenir Black"/>
+                        </a:rPr>
+                        <a:t>P-value</a:t>
+                      </a:r>
+                      <a:endParaRPr lang="en-US" b="1" dirty="0">
+                        <a:latin typeface="Avenir Black"/>
+                        <a:cs typeface="Avenir Black"/>
+                      </a:endParaRPr>
+                    </a:p>
+                  </a:txBody>
+                  <a:tcPr>
+                    <a:lnL w="12700" cap="flat" cmpd="sng" algn="ctr">
+                      <a:solidFill>
+                        <a:scrgbClr r="0" g="0" b="0"/>
+                      </a:solidFill>
+                      <a:prstDash val="solid"/>
+                      <a:round/>
+                      <a:headEnd type="none" w="med" len="med"/>
+                      <a:tailEnd type="none" w="med" len="med"/>
+                    </a:lnL>
+                    <a:lnR w="12700" cap="flat" cmpd="sng" algn="ctr">
+                      <a:solidFill>
+                        <a:scrgbClr r="0" g="0" b="0"/>
+                      </a:solidFill>
+                      <a:prstDash val="solid"/>
+                      <a:round/>
+                      <a:headEnd type="none" w="med" len="med"/>
+                      <a:tailEnd type="none" w="med" len="med"/>
+                    </a:lnR>
+                    <a:lnT w="12700" cap="flat" cmpd="sng" algn="ctr">
+                      <a:solidFill>
+                        <a:scrgbClr r="0" g="0" b="0"/>
+                      </a:solidFill>
+                      <a:prstDash val="solid"/>
+                      <a:round/>
+                      <a:headEnd type="none" w="med" len="med"/>
+                      <a:tailEnd type="none" w="med" len="med"/>
+                    </a:lnT>
+                    <a:lnB w="28575" cap="flat" cmpd="sng" algn="ctr">
+                      <a:solidFill>
+                        <a:scrgbClr r="0" g="0" b="0"/>
+                      </a:solidFill>
+                      <a:prstDash val="solid"/>
+                      <a:round/>
+                      <a:headEnd type="none" w="med" len="med"/>
+                      <a:tailEnd type="none" w="med" len="med"/>
+                    </a:lnB>
+                  </a:tcPr>
+                </a:tc>
+                <a:tc>
+                  <a:txBody>
+                    <a:bodyPr/>
+                    <a:lstStyle/>
+                    <a:p>
+                      <a:pPr algn="ctr"/>
+                      <a:r>
+                        <a:rPr lang="en-US" b="1" dirty="0" smtClean="0">
+                          <a:latin typeface="Avenir Black"/>
+                          <a:cs typeface="Avenir Black"/>
+                        </a:rPr>
+                        <a:t>Odds</a:t>
+                      </a:r>
+                      <a:r>
+                        <a:rPr lang="en-US" b="1" baseline="0" dirty="0" smtClean="0">
+                          <a:latin typeface="Avenir Black"/>
+                          <a:cs typeface="Avenir Black"/>
+                        </a:rPr>
+                        <a:t> Ratio</a:t>
+                      </a:r>
+                      <a:endParaRPr lang="en-US" b="1" dirty="0">
+                        <a:latin typeface="Avenir Black"/>
+                        <a:cs typeface="Avenir Black"/>
+                      </a:endParaRPr>
+                    </a:p>
+                  </a:txBody>
+                  <a:tcPr>
+                    <a:lnL w="12700" cap="flat" cmpd="sng" algn="ctr">
+                      <a:solidFill>
+                        <a:scrgbClr r="0" g="0" b="0"/>
+                      </a:solidFill>
+                      <a:prstDash val="solid"/>
+                      <a:round/>
+                      <a:headEnd type="none" w="med" len="med"/>
+                      <a:tailEnd type="none" w="med" len="med"/>
+                    </a:lnL>
+                    <a:lnR w="12700" cap="flat" cmpd="sng" algn="ctr">
+                      <a:solidFill>
+                        <a:scrgbClr r="0" g="0" b="0"/>
+                      </a:solidFill>
+                      <a:prstDash val="solid"/>
+                      <a:round/>
+                      <a:headEnd type="none" w="med" len="med"/>
+                      <a:tailEnd type="none" w="med" len="med"/>
+                    </a:lnR>
+                    <a:lnT w="12700" cap="flat" cmpd="sng" algn="ctr">
+                      <a:solidFill>
+                        <a:scrgbClr r="0" g="0" b="0"/>
+                      </a:solidFill>
+                      <a:prstDash val="solid"/>
+                      <a:round/>
+                      <a:headEnd type="none" w="med" len="med"/>
+                      <a:tailEnd type="none" w="med" len="med"/>
+                    </a:lnT>
+                    <a:lnB w="28575" cap="flat" cmpd="sng" algn="ctr">
+                      <a:solidFill>
+                        <a:scrgbClr r="0" g="0" b="0"/>
+                      </a:solidFill>
+                      <a:prstDash val="solid"/>
+                      <a:round/>
+                      <a:headEnd type="none" w="med" len="med"/>
+                      <a:tailEnd type="none" w="med" len="med"/>
+                    </a:lnB>
+                  </a:tcPr>
+                </a:tc>
+              </a:tr>
+              <a:tr h="370840">
+                <a:tc>
+                  <a:txBody>
+                    <a:bodyPr/>
+                    <a:lstStyle/>
+                    <a:p>
+                      <a:pPr algn="l"/>
+                      <a:r>
+                        <a:rPr lang="en-US" dirty="0" smtClean="0">
+                          <a:latin typeface="Avenir Book"/>
+                          <a:cs typeface="Avenir Book"/>
+                        </a:rPr>
+                        <a:t>Age</a:t>
+                      </a:r>
+                      <a:endParaRPr lang="en-US" dirty="0">
+                        <a:latin typeface="Avenir Book"/>
+                        <a:cs typeface="Avenir Book"/>
+                      </a:endParaRPr>
+                    </a:p>
+                  </a:txBody>
+                  <a:tcPr>
+                    <a:lnL w="12700" cap="flat" cmpd="sng" algn="ctr">
+                      <a:solidFill>
+                        <a:scrgbClr r="0" g="0" b="0"/>
+                      </a:solidFill>
+                      <a:prstDash val="solid"/>
+                      <a:round/>
+                      <a:headEnd type="none" w="med" len="med"/>
+                      <a:tailEnd type="none" w="med" len="med"/>
+                    </a:lnL>
+                    <a:lnR w="12700" cap="flat" cmpd="sng" algn="ctr">
+                      <a:solidFill>
+                        <a:scrgbClr r="0" g="0" b="0"/>
+                      </a:solidFill>
+                      <a:prstDash val="solid"/>
+                      <a:round/>
+                      <a:headEnd type="none" w="med" len="med"/>
+                      <a:tailEnd type="none" w="med" len="med"/>
+                    </a:lnR>
+                    <a:lnT w="28575" cap="flat" cmpd="sng" algn="ctr">
+                      <a:solidFill>
+                        <a:scrgbClr r="0" g="0" b="0"/>
+                      </a:solidFill>
+                      <a:prstDash val="solid"/>
+                      <a:round/>
+                      <a:headEnd type="none" w="med" len="med"/>
+                      <a:tailEnd type="none" w="med" len="med"/>
+                    </a:lnT>
+                    <a:lnB w="12700" cap="flat" cmpd="sng" algn="ctr">
+                      <a:solidFill>
+                        <a:scrgbClr r="0" g="0" b="0"/>
+                      </a:solidFill>
+                      <a:prstDash val="solid"/>
+                      <a:round/>
+                      <a:headEnd type="none" w="med" len="med"/>
+                      <a:tailEnd type="none" w="med" len="med"/>
+                    </a:lnB>
+                  </a:tcPr>
+                </a:tc>
+                <a:tc>
+                  <a:txBody>
+                    <a:bodyPr/>
+                    <a:lstStyle/>
+                    <a:p>
+                      <a:pPr algn="ctr"/>
+                      <a:r>
+                        <a:rPr lang="en-US" dirty="0" smtClean="0">
+                          <a:latin typeface="Avenir Book"/>
+                          <a:cs typeface="Avenir Book"/>
+                        </a:rPr>
+                        <a:t>0.000</a:t>
+                      </a:r>
+                      <a:endParaRPr lang="en-US" dirty="0">
+                        <a:latin typeface="Avenir Book"/>
+                        <a:cs typeface="Avenir Book"/>
+                      </a:endParaRPr>
+                    </a:p>
+                  </a:txBody>
+                  <a:tcPr>
+                    <a:lnL w="12700" cap="flat" cmpd="sng" algn="ctr">
+                      <a:solidFill>
+                        <a:scrgbClr r="0" g="0" b="0"/>
+                      </a:solidFill>
+                      <a:prstDash val="solid"/>
+                      <a:round/>
+                      <a:headEnd type="none" w="med" len="med"/>
+                      <a:tailEnd type="none" w="med" len="med"/>
+                    </a:lnL>
+                    <a:lnR w="12700" cap="flat" cmpd="sng" algn="ctr">
+                      <a:solidFill>
+                        <a:scrgbClr r="0" g="0" b="0"/>
+                      </a:solidFill>
+                      <a:prstDash val="solid"/>
+                      <a:round/>
+                      <a:headEnd type="none" w="med" len="med"/>
+                      <a:tailEnd type="none" w="med" len="med"/>
+                    </a:lnR>
+                    <a:lnT w="28575" cap="flat" cmpd="sng" algn="ctr">
+                      <a:solidFill>
+                        <a:scrgbClr r="0" g="0" b="0"/>
+                      </a:solidFill>
+                      <a:prstDash val="solid"/>
+                      <a:round/>
+                      <a:headEnd type="none" w="med" len="med"/>
+                      <a:tailEnd type="none" w="med" len="med"/>
+                    </a:lnT>
+                    <a:lnB w="12700" cap="flat" cmpd="sng" algn="ctr">
+                      <a:solidFill>
+                        <a:scrgbClr r="0" g="0" b="0"/>
+                      </a:solidFill>
+                      <a:prstDash val="solid"/>
+                      <a:round/>
+                      <a:headEnd type="none" w="med" len="med"/>
+                      <a:tailEnd type="none" w="med" len="med"/>
+                    </a:lnB>
+                  </a:tcPr>
+                </a:tc>
+                <a:tc>
+                  <a:txBody>
+                    <a:bodyPr/>
+                    <a:lstStyle/>
+                    <a:p>
+                      <a:pPr algn="ctr"/>
+                      <a:r>
+                        <a:rPr lang="en-US" dirty="0" smtClean="0">
+                          <a:latin typeface="Avenir Book"/>
+                          <a:cs typeface="Avenir Book"/>
+                        </a:rPr>
+                        <a:t>1.00</a:t>
+                      </a:r>
+                      <a:endParaRPr lang="en-US" dirty="0">
+                        <a:latin typeface="Avenir Book"/>
+                        <a:cs typeface="Avenir Book"/>
+                      </a:endParaRPr>
+                    </a:p>
+                  </a:txBody>
+                  <a:tcPr>
+                    <a:lnL w="12700" cap="flat" cmpd="sng" algn="ctr">
+                      <a:solidFill>
+                        <a:scrgbClr r="0" g="0" b="0"/>
+                      </a:solidFill>
+                      <a:prstDash val="solid"/>
+                      <a:round/>
+                      <a:headEnd type="none" w="med" len="med"/>
+                      <a:tailEnd type="none" w="med" len="med"/>
+                    </a:lnL>
+                    <a:lnR w="12700" cap="flat" cmpd="sng" algn="ctr">
+                      <a:solidFill>
+                        <a:scrgbClr r="0" g="0" b="0"/>
+                      </a:solidFill>
+                      <a:prstDash val="solid"/>
+                      <a:round/>
+                      <a:headEnd type="none" w="med" len="med"/>
+                      <a:tailEnd type="none" w="med" len="med"/>
+                    </a:lnR>
+                    <a:lnT w="28575" cap="flat" cmpd="sng" algn="ctr">
+                      <a:solidFill>
+                        <a:scrgbClr r="0" g="0" b="0"/>
+                      </a:solidFill>
+                      <a:prstDash val="solid"/>
+                      <a:round/>
+                      <a:headEnd type="none" w="med" len="med"/>
+                      <a:tailEnd type="none" w="med" len="med"/>
+                    </a:lnT>
+                    <a:lnB w="12700" cap="flat" cmpd="sng" algn="ctr">
+                      <a:solidFill>
+                        <a:scrgbClr r="0" g="0" b="0"/>
+                      </a:solidFill>
+                      <a:prstDash val="solid"/>
+                      <a:round/>
+                      <a:headEnd type="none" w="med" len="med"/>
+                      <a:tailEnd type="none" w="med" len="med"/>
+                    </a:lnB>
+                  </a:tcPr>
+                </a:tc>
+              </a:tr>
+              <a:tr h="370840">
+                <a:tc>
+                  <a:txBody>
+                    <a:bodyPr/>
+                    <a:lstStyle/>
+                    <a:p>
+                      <a:pPr algn="l"/>
+                      <a:r>
+                        <a:rPr lang="en-US" dirty="0" smtClean="0">
+                          <a:latin typeface="Avenir Book"/>
+                          <a:cs typeface="Avenir Book"/>
+                        </a:rPr>
+                        <a:t>Gender</a:t>
+                      </a:r>
+                      <a:endParaRPr lang="en-US" dirty="0">
+                        <a:latin typeface="Avenir Book"/>
+                        <a:cs typeface="Avenir Book"/>
+                      </a:endParaRPr>
+                    </a:p>
+                  </a:txBody>
+                  <a:tcPr>
+                    <a:lnL w="12700" cap="flat" cmpd="sng" algn="ctr">
+                      <a:solidFill>
+                        <a:scrgbClr r="0" g="0" b="0"/>
+                      </a:solidFill>
+                      <a:prstDash val="solid"/>
+                      <a:round/>
+                      <a:headEnd type="none" w="med" len="med"/>
+                      <a:tailEnd type="none" w="med" len="med"/>
+                    </a:lnL>
+                    <a:lnR w="12700" cap="flat" cmpd="sng" algn="ctr">
+                      <a:solidFill>
+                        <a:scrgbClr r="0" g="0" b="0"/>
+                      </a:solidFill>
+                      <a:prstDash val="solid"/>
+                      <a:round/>
+                      <a:headEnd type="none" w="med" len="med"/>
+                      <a:tailEnd type="none" w="med" len="med"/>
+                    </a:lnR>
+                    <a:lnT w="12700" cap="flat" cmpd="sng" algn="ctr">
+                      <a:solidFill>
+                        <a:scrgbClr r="0" g="0" b="0"/>
+                      </a:solidFill>
+                      <a:prstDash val="solid"/>
+                      <a:round/>
+                      <a:headEnd type="none" w="med" len="med"/>
+                      <a:tailEnd type="none" w="med" len="med"/>
+                    </a:lnT>
+                    <a:lnB w="12700" cap="flat" cmpd="sng" algn="ctr">
+                      <a:solidFill>
+                        <a:scrgbClr r="0" g="0" b="0"/>
+                      </a:solidFill>
+                      <a:prstDash val="solid"/>
+                      <a:round/>
+                      <a:headEnd type="none" w="med" len="med"/>
+                      <a:tailEnd type="none" w="med" len="med"/>
+                    </a:lnB>
+                  </a:tcPr>
+                </a:tc>
+                <a:tc>
+                  <a:txBody>
+                    <a:bodyPr/>
+                    <a:lstStyle/>
+                    <a:p>
+                      <a:pPr algn="ctr"/>
+                      <a:r>
+                        <a:rPr lang="en-US" dirty="0" smtClean="0">
+                          <a:latin typeface="Avenir Book"/>
+                          <a:cs typeface="Avenir Book"/>
+                        </a:rPr>
+                        <a:t>0.440</a:t>
+                      </a:r>
+                      <a:endParaRPr lang="en-US" dirty="0">
+                        <a:latin typeface="Avenir Book"/>
+                        <a:cs typeface="Avenir Book"/>
+                      </a:endParaRPr>
+                    </a:p>
+                  </a:txBody>
+                  <a:tcPr>
+                    <a:lnL w="12700" cap="flat" cmpd="sng" algn="ctr">
+                      <a:solidFill>
+                        <a:scrgbClr r="0" g="0" b="0"/>
+                      </a:solidFill>
+                      <a:prstDash val="solid"/>
+                      <a:round/>
+                      <a:headEnd type="none" w="med" len="med"/>
+                      <a:tailEnd type="none" w="med" len="med"/>
+                    </a:lnL>
+                    <a:lnR w="12700" cap="flat" cmpd="sng" algn="ctr">
+                      <a:solidFill>
+                        <a:scrgbClr r="0" g="0" b="0"/>
+                      </a:solidFill>
+                      <a:prstDash val="solid"/>
+                      <a:round/>
+                      <a:headEnd type="none" w="med" len="med"/>
+                      <a:tailEnd type="none" w="med" len="med"/>
+                    </a:lnR>
+                    <a:lnT w="12700" cap="flat" cmpd="sng" algn="ctr">
+                      <a:solidFill>
+                        <a:scrgbClr r="0" g="0" b="0"/>
+                      </a:solidFill>
+                      <a:prstDash val="solid"/>
+                      <a:round/>
+                      <a:headEnd type="none" w="med" len="med"/>
+                      <a:tailEnd type="none" w="med" len="med"/>
+                    </a:lnT>
+                    <a:lnB w="12700" cap="flat" cmpd="sng" algn="ctr">
+                      <a:solidFill>
+                        <a:scrgbClr r="0" g="0" b="0"/>
+                      </a:solidFill>
+                      <a:prstDash val="solid"/>
+                      <a:round/>
+                      <a:headEnd type="none" w="med" len="med"/>
+                      <a:tailEnd type="none" w="med" len="med"/>
+                    </a:lnB>
+                  </a:tcPr>
+                </a:tc>
+                <a:tc>
+                  <a:txBody>
+                    <a:bodyPr/>
+                    <a:lstStyle/>
+                    <a:p>
+                      <a:pPr algn="ctr"/>
+                      <a:r>
+                        <a:rPr lang="en-US" dirty="0" smtClean="0">
+                          <a:latin typeface="Avenir Book"/>
+                          <a:cs typeface="Avenir Book"/>
+                        </a:rPr>
+                        <a:t>0.95</a:t>
+                      </a:r>
+                      <a:endParaRPr lang="en-US" dirty="0">
+                        <a:latin typeface="Avenir Book"/>
+                        <a:cs typeface="Avenir Book"/>
+                      </a:endParaRPr>
+                    </a:p>
+                  </a:txBody>
+                  <a:tcPr>
+                    <a:lnL w="12700" cap="flat" cmpd="sng" algn="ctr">
+                      <a:solidFill>
+                        <a:scrgbClr r="0" g="0" b="0"/>
+                      </a:solidFill>
+                      <a:prstDash val="solid"/>
+                      <a:round/>
+                      <a:headEnd type="none" w="med" len="med"/>
+                      <a:tailEnd type="none" w="med" len="med"/>
+                    </a:lnL>
+                    <a:lnR w="12700" cap="flat" cmpd="sng" algn="ctr">
+                      <a:solidFill>
+                        <a:scrgbClr r="0" g="0" b="0"/>
+                      </a:solidFill>
+                      <a:prstDash val="solid"/>
+                      <a:round/>
+                      <a:headEnd type="none" w="med" len="med"/>
+                      <a:tailEnd type="none" w="med" len="med"/>
+                    </a:lnR>
+                    <a:lnT w="12700" cap="flat" cmpd="sng" algn="ctr">
+                      <a:solidFill>
+                        <a:scrgbClr r="0" g="0" b="0"/>
+                      </a:solidFill>
+                      <a:prstDash val="solid"/>
+                      <a:round/>
+                      <a:headEnd type="none" w="med" len="med"/>
+                      <a:tailEnd type="none" w="med" len="med"/>
+                    </a:lnT>
+                    <a:lnB w="12700" cap="flat" cmpd="sng" algn="ctr">
+                      <a:solidFill>
+                        <a:scrgbClr r="0" g="0" b="0"/>
+                      </a:solidFill>
+                      <a:prstDash val="solid"/>
+                      <a:round/>
+                      <a:headEnd type="none" w="med" len="med"/>
+                      <a:tailEnd type="none" w="med" len="med"/>
+                    </a:lnB>
+                  </a:tcPr>
+                </a:tc>
+              </a:tr>
+              <a:tr h="370840">
+                <a:tc>
+                  <a:txBody>
+                    <a:bodyPr/>
+                    <a:lstStyle/>
+                    <a:p>
+                      <a:pPr algn="l"/>
+                      <a:r>
+                        <a:rPr lang="en-US" dirty="0" smtClean="0">
+                          <a:latin typeface="Avenir Book"/>
+                          <a:cs typeface="Avenir Book"/>
+                        </a:rPr>
+                        <a:t>Ethnicity</a:t>
+                      </a:r>
+                      <a:endParaRPr lang="en-US" dirty="0">
+                        <a:latin typeface="Avenir Book"/>
+                        <a:cs typeface="Avenir Book"/>
+                      </a:endParaRPr>
+                    </a:p>
+                  </a:txBody>
+                  <a:tcPr>
+                    <a:lnL w="12700" cap="flat" cmpd="sng" algn="ctr">
+                      <a:solidFill>
+                        <a:scrgbClr r="0" g="0" b="0"/>
+                      </a:solidFill>
+                      <a:prstDash val="solid"/>
+                      <a:round/>
+                      <a:headEnd type="none" w="med" len="med"/>
+                      <a:tailEnd type="none" w="med" len="med"/>
+                    </a:lnL>
+                    <a:lnR w="12700" cap="flat" cmpd="sng" algn="ctr">
+                      <a:solidFill>
+                        <a:scrgbClr r="0" g="0" b="0"/>
+                      </a:solidFill>
+                      <a:prstDash val="solid"/>
+                      <a:round/>
+                      <a:headEnd type="none" w="med" len="med"/>
+                      <a:tailEnd type="none" w="med" len="med"/>
+                    </a:lnR>
+                    <a:lnT w="12700" cap="flat" cmpd="sng" algn="ctr">
+                      <a:solidFill>
+                        <a:scrgbClr r="0" g="0" b="0"/>
+                      </a:solidFill>
+                      <a:prstDash val="solid"/>
+                      <a:round/>
+                      <a:headEnd type="none" w="med" len="med"/>
+                      <a:tailEnd type="none" w="med" len="med"/>
+                    </a:lnT>
+                    <a:lnB w="12700" cap="flat" cmpd="sng" algn="ctr">
+                      <a:solidFill>
+                        <a:scrgbClr r="0" g="0" b="0"/>
+                      </a:solidFill>
+                      <a:prstDash val="solid"/>
+                      <a:round/>
+                      <a:headEnd type="none" w="med" len="med"/>
+                      <a:tailEnd type="none" w="med" len="med"/>
+                    </a:lnB>
+                  </a:tcPr>
+                </a:tc>
+                <a:tc>
+                  <a:txBody>
+                    <a:bodyPr/>
+                    <a:lstStyle/>
+                    <a:p>
+                      <a:pPr algn="ctr"/>
+                      <a:r>
+                        <a:rPr lang="en-US" dirty="0" smtClean="0">
+                          <a:latin typeface="Avenir Book"/>
+                          <a:cs typeface="Avenir Book"/>
+                        </a:rPr>
+                        <a:t>0.000</a:t>
+                      </a:r>
+                      <a:endParaRPr lang="en-US" dirty="0">
+                        <a:latin typeface="Avenir Book"/>
+                        <a:cs typeface="Avenir Book"/>
+                      </a:endParaRPr>
+                    </a:p>
+                  </a:txBody>
+                  <a:tcPr>
+                    <a:lnL w="12700" cap="flat" cmpd="sng" algn="ctr">
+                      <a:solidFill>
+                        <a:scrgbClr r="0" g="0" b="0"/>
+                      </a:solidFill>
+                      <a:prstDash val="solid"/>
+                      <a:round/>
+                      <a:headEnd type="none" w="med" len="med"/>
+                      <a:tailEnd type="none" w="med" len="med"/>
+                    </a:lnL>
+                    <a:lnR w="12700" cap="flat" cmpd="sng" algn="ctr">
+                      <a:solidFill>
+                        <a:scrgbClr r="0" g="0" b="0"/>
+                      </a:solidFill>
+                      <a:prstDash val="solid"/>
+                      <a:round/>
+                      <a:headEnd type="none" w="med" len="med"/>
+                      <a:tailEnd type="none" w="med" len="med"/>
+                    </a:lnR>
+                    <a:lnT w="12700" cap="flat" cmpd="sng" algn="ctr">
+                      <a:solidFill>
+                        <a:scrgbClr r="0" g="0" b="0"/>
+                      </a:solidFill>
+                      <a:prstDash val="solid"/>
+                      <a:round/>
+                      <a:headEnd type="none" w="med" len="med"/>
+                      <a:tailEnd type="none" w="med" len="med"/>
+                    </a:lnT>
+                    <a:lnB w="12700" cap="flat" cmpd="sng" algn="ctr">
+                      <a:solidFill>
+                        <a:scrgbClr r="0" g="0" b="0"/>
+                      </a:solidFill>
+                      <a:prstDash val="solid"/>
+                      <a:round/>
+                      <a:headEnd type="none" w="med" len="med"/>
+                      <a:tailEnd type="none" w="med" len="med"/>
+                    </a:lnB>
+                  </a:tcPr>
+                </a:tc>
+                <a:tc>
+                  <a:txBody>
+                    <a:bodyPr/>
+                    <a:lstStyle/>
+                    <a:p>
+                      <a:pPr algn="ctr"/>
+                      <a:r>
+                        <a:rPr lang="en-US" dirty="0" smtClean="0">
+                          <a:latin typeface="Avenir Book"/>
+                          <a:cs typeface="Avenir Book"/>
+                        </a:rPr>
+                        <a:t>1.09</a:t>
+                      </a:r>
+                      <a:endParaRPr lang="en-US" dirty="0">
+                        <a:latin typeface="Avenir Book"/>
+                        <a:cs typeface="Avenir Book"/>
+                      </a:endParaRPr>
+                    </a:p>
+                  </a:txBody>
+                  <a:tcPr>
+                    <a:lnL w="12700" cap="flat" cmpd="sng" algn="ctr">
+                      <a:solidFill>
+                        <a:scrgbClr r="0" g="0" b="0"/>
+                      </a:solidFill>
+                      <a:prstDash val="solid"/>
+                      <a:round/>
+                      <a:headEnd type="none" w="med" len="med"/>
+                      <a:tailEnd type="none" w="med" len="med"/>
+                    </a:lnL>
+                    <a:lnR w="12700" cap="flat" cmpd="sng" algn="ctr">
+                      <a:solidFill>
+                        <a:scrgbClr r="0" g="0" b="0"/>
+                      </a:solidFill>
+                      <a:prstDash val="solid"/>
+                      <a:round/>
+                      <a:headEnd type="none" w="med" len="med"/>
+                      <a:tailEnd type="none" w="med" len="med"/>
+                    </a:lnR>
+                    <a:lnT w="12700" cap="flat" cmpd="sng" algn="ctr">
+                      <a:solidFill>
+                        <a:scrgbClr r="0" g="0" b="0"/>
+                      </a:solidFill>
+                      <a:prstDash val="solid"/>
+                      <a:round/>
+                      <a:headEnd type="none" w="med" len="med"/>
+                      <a:tailEnd type="none" w="med" len="med"/>
+                    </a:lnT>
+                    <a:lnB w="12700" cap="flat" cmpd="sng" algn="ctr">
+                      <a:solidFill>
+                        <a:scrgbClr r="0" g="0" b="0"/>
+                      </a:solidFill>
+                      <a:prstDash val="solid"/>
+                      <a:round/>
+                      <a:headEnd type="none" w="med" len="med"/>
+                      <a:tailEnd type="none" w="med" len="med"/>
+                    </a:lnB>
+                  </a:tcPr>
+                </a:tc>
+              </a:tr>
+              <a:tr h="370840">
+                <a:tc>
+                  <a:txBody>
+                    <a:bodyPr/>
+                    <a:lstStyle/>
+                    <a:p>
+                      <a:pPr algn="l"/>
+                      <a:r>
+                        <a:rPr lang="en-US" dirty="0" smtClean="0">
+                          <a:latin typeface="Avenir Book"/>
+                          <a:cs typeface="Avenir Book"/>
+                        </a:rPr>
+                        <a:t>Length of Stay</a:t>
+                      </a:r>
+                      <a:endParaRPr lang="en-US" dirty="0">
+                        <a:latin typeface="Avenir Book"/>
+                        <a:cs typeface="Avenir Book"/>
+                      </a:endParaRPr>
+                    </a:p>
+                  </a:txBody>
+                  <a:tcPr>
+                    <a:lnL w="12700" cap="flat" cmpd="sng" algn="ctr">
+                      <a:solidFill>
+                        <a:scrgbClr r="0" g="0" b="0"/>
+                      </a:solidFill>
+                      <a:prstDash val="solid"/>
+                      <a:round/>
+                      <a:headEnd type="none" w="med" len="med"/>
+                      <a:tailEnd type="none" w="med" len="med"/>
+                    </a:lnL>
+                    <a:lnR w="12700" cap="flat" cmpd="sng" algn="ctr">
+                      <a:solidFill>
+                        <a:scrgbClr r="0" g="0" b="0"/>
+                      </a:solidFill>
+                      <a:prstDash val="solid"/>
+                      <a:round/>
+                      <a:headEnd type="none" w="med" len="med"/>
+                      <a:tailEnd type="none" w="med" len="med"/>
+                    </a:lnR>
+                    <a:lnT w="12700" cap="flat" cmpd="sng" algn="ctr">
+                      <a:solidFill>
+                        <a:scrgbClr r="0" g="0" b="0"/>
+                      </a:solidFill>
+                      <a:prstDash val="solid"/>
+                      <a:round/>
+                      <a:headEnd type="none" w="med" len="med"/>
+                      <a:tailEnd type="none" w="med" len="med"/>
+                    </a:lnT>
+                    <a:lnB w="12700" cap="flat" cmpd="sng" algn="ctr">
+                      <a:solidFill>
+                        <a:scrgbClr r="0" g="0" b="0"/>
+                      </a:solidFill>
+                      <a:prstDash val="solid"/>
+                      <a:round/>
+                      <a:headEnd type="none" w="med" len="med"/>
+                      <a:tailEnd type="none" w="med" len="med"/>
+                    </a:lnB>
+                  </a:tcPr>
+                </a:tc>
+                <a:tc>
+                  <a:txBody>
+                    <a:bodyPr/>
+                    <a:lstStyle/>
+                    <a:p>
+                      <a:pPr algn="ctr"/>
+                      <a:r>
+                        <a:rPr lang="en-US" dirty="0" smtClean="0">
+                          <a:latin typeface="Avenir Book"/>
+                          <a:cs typeface="Avenir Book"/>
+                        </a:rPr>
+                        <a:t>0.000</a:t>
+                      </a:r>
+                      <a:endParaRPr lang="en-US" dirty="0">
+                        <a:latin typeface="Avenir Book"/>
+                        <a:cs typeface="Avenir Book"/>
+                      </a:endParaRPr>
+                    </a:p>
+                  </a:txBody>
+                  <a:tcPr>
+                    <a:lnL w="12700" cap="flat" cmpd="sng" algn="ctr">
+                      <a:solidFill>
+                        <a:scrgbClr r="0" g="0" b="0"/>
+                      </a:solidFill>
+                      <a:prstDash val="solid"/>
+                      <a:round/>
+                      <a:headEnd type="none" w="med" len="med"/>
+                      <a:tailEnd type="none" w="med" len="med"/>
+                    </a:lnL>
+                    <a:lnR w="12700" cap="flat" cmpd="sng" algn="ctr">
+                      <a:solidFill>
+                        <a:scrgbClr r="0" g="0" b="0"/>
+                      </a:solidFill>
+                      <a:prstDash val="solid"/>
+                      <a:round/>
+                      <a:headEnd type="none" w="med" len="med"/>
+                      <a:tailEnd type="none" w="med" len="med"/>
+                    </a:lnR>
+                    <a:lnT w="12700" cap="flat" cmpd="sng" algn="ctr">
+                      <a:solidFill>
+                        <a:scrgbClr r="0" g="0" b="0"/>
+                      </a:solidFill>
+                      <a:prstDash val="solid"/>
+                      <a:round/>
+                      <a:headEnd type="none" w="med" len="med"/>
+                      <a:tailEnd type="none" w="med" len="med"/>
+                    </a:lnT>
+                    <a:lnB w="12700" cap="flat" cmpd="sng" algn="ctr">
+                      <a:solidFill>
+                        <a:scrgbClr r="0" g="0" b="0"/>
+                      </a:solidFill>
+                      <a:prstDash val="solid"/>
+                      <a:round/>
+                      <a:headEnd type="none" w="med" len="med"/>
+                      <a:tailEnd type="none" w="med" len="med"/>
+                    </a:lnB>
+                  </a:tcPr>
+                </a:tc>
+                <a:tc>
+                  <a:txBody>
+                    <a:bodyPr/>
+                    <a:lstStyle/>
+                    <a:p>
+                      <a:pPr algn="ctr"/>
+                      <a:r>
+                        <a:rPr lang="en-US" dirty="0" smtClean="0">
+                          <a:latin typeface="Avenir Book"/>
+                          <a:cs typeface="Avenir Book"/>
+                        </a:rPr>
+                        <a:t>1.05</a:t>
+                      </a:r>
+                      <a:endParaRPr lang="en-US" dirty="0">
+                        <a:latin typeface="Avenir Book"/>
+                        <a:cs typeface="Avenir Book"/>
+                      </a:endParaRPr>
+                    </a:p>
+                  </a:txBody>
+                  <a:tcPr>
+                    <a:lnL w="12700" cap="flat" cmpd="sng" algn="ctr">
+                      <a:solidFill>
+                        <a:scrgbClr r="0" g="0" b="0"/>
+                      </a:solidFill>
+                      <a:prstDash val="solid"/>
+                      <a:round/>
+                      <a:headEnd type="none" w="med" len="med"/>
+                      <a:tailEnd type="none" w="med" len="med"/>
+                    </a:lnL>
+                    <a:lnR w="12700" cap="flat" cmpd="sng" algn="ctr">
+                      <a:solidFill>
+                        <a:scrgbClr r="0" g="0" b="0"/>
+                      </a:solidFill>
+                      <a:prstDash val="solid"/>
+                      <a:round/>
+                      <a:headEnd type="none" w="med" len="med"/>
+                      <a:tailEnd type="none" w="med" len="med"/>
+                    </a:lnR>
+                    <a:lnT w="12700" cap="flat" cmpd="sng" algn="ctr">
+                      <a:solidFill>
+                        <a:scrgbClr r="0" g="0" b="0"/>
+                      </a:solidFill>
+                      <a:prstDash val="solid"/>
+                      <a:round/>
+                      <a:headEnd type="none" w="med" len="med"/>
+                      <a:tailEnd type="none" w="med" len="med"/>
+                    </a:lnT>
+                    <a:lnB w="12700" cap="flat" cmpd="sng" algn="ctr">
+                      <a:solidFill>
+                        <a:scrgbClr r="0" g="0" b="0"/>
+                      </a:solidFill>
+                      <a:prstDash val="solid"/>
+                      <a:round/>
+                      <a:headEnd type="none" w="med" len="med"/>
+                      <a:tailEnd type="none" w="med" len="med"/>
+                    </a:lnB>
+                  </a:tcPr>
+                </a:tc>
+              </a:tr>
+              <a:tr h="370840">
+                <a:tc>
+                  <a:txBody>
+                    <a:bodyPr/>
+                    <a:lstStyle/>
+                    <a:p>
+                      <a:pPr algn="l"/>
+                      <a:r>
+                        <a:rPr lang="en-US" dirty="0" smtClean="0">
+                          <a:latin typeface="Avenir Book"/>
+                          <a:cs typeface="Avenir Book"/>
+                        </a:rPr>
+                        <a:t>Maximum Lactate</a:t>
+                      </a:r>
+                      <a:endParaRPr lang="en-US" dirty="0">
+                        <a:latin typeface="Avenir Book"/>
+                        <a:cs typeface="Avenir Book"/>
+                      </a:endParaRPr>
+                    </a:p>
+                  </a:txBody>
+                  <a:tcPr>
+                    <a:lnL w="12700" cap="flat" cmpd="sng" algn="ctr">
+                      <a:solidFill>
+                        <a:scrgbClr r="0" g="0" b="0"/>
+                      </a:solidFill>
+                      <a:prstDash val="solid"/>
+                      <a:round/>
+                      <a:headEnd type="none" w="med" len="med"/>
+                      <a:tailEnd type="none" w="med" len="med"/>
+                    </a:lnL>
+                    <a:lnR w="12700" cap="flat" cmpd="sng" algn="ctr">
+                      <a:solidFill>
+                        <a:scrgbClr r="0" g="0" b="0"/>
+                      </a:solidFill>
+                      <a:prstDash val="solid"/>
+                      <a:round/>
+                      <a:headEnd type="none" w="med" len="med"/>
+                      <a:tailEnd type="none" w="med" len="med"/>
+                    </a:lnR>
+                    <a:lnT w="12700" cap="flat" cmpd="sng" algn="ctr">
+                      <a:solidFill>
+                        <a:scrgbClr r="0" g="0" b="0"/>
+                      </a:solidFill>
+                      <a:prstDash val="solid"/>
+                      <a:round/>
+                      <a:headEnd type="none" w="med" len="med"/>
+                      <a:tailEnd type="none" w="med" len="med"/>
+                    </a:lnT>
+                    <a:lnB w="12700" cap="flat" cmpd="sng" algn="ctr">
+                      <a:solidFill>
+                        <a:scrgbClr r="0" g="0" b="0"/>
+                      </a:solidFill>
+                      <a:prstDash val="solid"/>
+                      <a:round/>
+                      <a:headEnd type="none" w="med" len="med"/>
+                      <a:tailEnd type="none" w="med" len="med"/>
+                    </a:lnB>
+                  </a:tcPr>
+                </a:tc>
+                <a:tc>
+                  <a:txBody>
+                    <a:bodyPr/>
+                    <a:lstStyle/>
+                    <a:p>
+                      <a:pPr algn="ctr"/>
+                      <a:r>
+                        <a:rPr lang="en-US" dirty="0" smtClean="0">
+                          <a:latin typeface="Avenir Book"/>
+                          <a:cs typeface="Avenir Book"/>
+                        </a:rPr>
+                        <a:t>0.000</a:t>
+                      </a:r>
+                      <a:endParaRPr lang="en-US" dirty="0">
+                        <a:latin typeface="Avenir Book"/>
+                        <a:cs typeface="Avenir Book"/>
+                      </a:endParaRPr>
+                    </a:p>
+                  </a:txBody>
+                  <a:tcPr>
+                    <a:lnL w="12700" cap="flat" cmpd="sng" algn="ctr">
+                      <a:solidFill>
+                        <a:scrgbClr r="0" g="0" b="0"/>
+                      </a:solidFill>
+                      <a:prstDash val="solid"/>
+                      <a:round/>
+                      <a:headEnd type="none" w="med" len="med"/>
+                      <a:tailEnd type="none" w="med" len="med"/>
+                    </a:lnL>
+                    <a:lnR w="12700" cap="flat" cmpd="sng" algn="ctr">
+                      <a:solidFill>
+                        <a:scrgbClr r="0" g="0" b="0"/>
+                      </a:solidFill>
+                      <a:prstDash val="solid"/>
+                      <a:round/>
+                      <a:headEnd type="none" w="med" len="med"/>
+                      <a:tailEnd type="none" w="med" len="med"/>
+                    </a:lnR>
+                    <a:lnT w="12700" cap="flat" cmpd="sng" algn="ctr">
+                      <a:solidFill>
+                        <a:scrgbClr r="0" g="0" b="0"/>
+                      </a:solidFill>
+                      <a:prstDash val="solid"/>
+                      <a:round/>
+                      <a:headEnd type="none" w="med" len="med"/>
+                      <a:tailEnd type="none" w="med" len="med"/>
+                    </a:lnT>
+                    <a:lnB w="12700" cap="flat" cmpd="sng" algn="ctr">
+                      <a:solidFill>
+                        <a:scrgbClr r="0" g="0" b="0"/>
+                      </a:solidFill>
+                      <a:prstDash val="solid"/>
+                      <a:round/>
+                      <a:headEnd type="none" w="med" len="med"/>
+                      <a:tailEnd type="none" w="med" len="med"/>
+                    </a:lnB>
+                  </a:tcPr>
+                </a:tc>
+                <a:tc>
+                  <a:txBody>
+                    <a:bodyPr/>
+                    <a:lstStyle/>
+                    <a:p>
+                      <a:pPr algn="ctr"/>
+                      <a:r>
+                        <a:rPr lang="en-US" dirty="0" smtClean="0">
+                          <a:latin typeface="Avenir Book"/>
+                          <a:cs typeface="Avenir Book"/>
+                        </a:rPr>
+                        <a:t>1.05</a:t>
+                      </a:r>
+                    </a:p>
+                  </a:txBody>
+                  <a:tcPr>
+                    <a:lnL w="12700" cap="flat" cmpd="sng" algn="ctr">
+                      <a:solidFill>
+                        <a:scrgbClr r="0" g="0" b="0"/>
+                      </a:solidFill>
+                      <a:prstDash val="solid"/>
+                      <a:round/>
+                      <a:headEnd type="none" w="med" len="med"/>
+                      <a:tailEnd type="none" w="med" len="med"/>
+                    </a:lnL>
+                    <a:lnR w="12700" cap="flat" cmpd="sng" algn="ctr">
+                      <a:solidFill>
+                        <a:scrgbClr r="0" g="0" b="0"/>
+                      </a:solidFill>
+                      <a:prstDash val="solid"/>
+                      <a:round/>
+                      <a:headEnd type="none" w="med" len="med"/>
+                      <a:tailEnd type="none" w="med" len="med"/>
+                    </a:lnR>
+                    <a:lnT w="12700" cap="flat" cmpd="sng" algn="ctr">
+                      <a:solidFill>
+                        <a:scrgbClr r="0" g="0" b="0"/>
+                      </a:solidFill>
+                      <a:prstDash val="solid"/>
+                      <a:round/>
+                      <a:headEnd type="none" w="med" len="med"/>
+                      <a:tailEnd type="none" w="med" len="med"/>
+                    </a:lnT>
+                    <a:lnB w="12700" cap="flat" cmpd="sng" algn="ctr">
+                      <a:solidFill>
+                        <a:scrgbClr r="0" g="0" b="0"/>
+                      </a:solidFill>
+                      <a:prstDash val="solid"/>
+                      <a:round/>
+                      <a:headEnd type="none" w="med" len="med"/>
+                      <a:tailEnd type="none" w="med" len="med"/>
+                    </a:lnB>
+                  </a:tcPr>
+                </a:tc>
+              </a:tr>
+              <a:tr h="370840">
+                <a:tc>
+                  <a:txBody>
+                    <a:bodyPr/>
+                    <a:lstStyle/>
+                    <a:p>
+                      <a:pPr algn="l"/>
+                      <a:r>
+                        <a:rPr lang="en-US" dirty="0" smtClean="0">
+                          <a:latin typeface="Avenir Book"/>
+                          <a:cs typeface="Avenir Book"/>
+                        </a:rPr>
+                        <a:t>%</a:t>
+                      </a:r>
+                      <a:r>
+                        <a:rPr lang="en-US" baseline="0" dirty="0" smtClean="0">
+                          <a:latin typeface="Avenir Book"/>
+                          <a:cs typeface="Avenir Book"/>
+                        </a:rPr>
+                        <a:t> Time on Vasopressors</a:t>
+                      </a:r>
+                      <a:endParaRPr lang="en-US" dirty="0">
+                        <a:latin typeface="Avenir Book"/>
+                        <a:cs typeface="Avenir Book"/>
+                      </a:endParaRPr>
+                    </a:p>
+                  </a:txBody>
+                  <a:tcPr>
+                    <a:lnL w="12700" cap="flat" cmpd="sng" algn="ctr">
+                      <a:solidFill>
+                        <a:scrgbClr r="0" g="0" b="0"/>
+                      </a:solidFill>
+                      <a:prstDash val="solid"/>
+                      <a:round/>
+                      <a:headEnd type="none" w="med" len="med"/>
+                      <a:tailEnd type="none" w="med" len="med"/>
+                    </a:lnL>
+                    <a:lnR w="12700" cap="flat" cmpd="sng" algn="ctr">
+                      <a:solidFill>
+                        <a:scrgbClr r="0" g="0" b="0"/>
+                      </a:solidFill>
+                      <a:prstDash val="solid"/>
+                      <a:round/>
+                      <a:headEnd type="none" w="med" len="med"/>
+                      <a:tailEnd type="none" w="med" len="med"/>
+                    </a:lnR>
+                    <a:lnT w="12700" cap="flat" cmpd="sng" algn="ctr">
+                      <a:solidFill>
+                        <a:scrgbClr r="0" g="0" b="0"/>
+                      </a:solidFill>
+                      <a:prstDash val="solid"/>
+                      <a:round/>
+                      <a:headEnd type="none" w="med" len="med"/>
+                      <a:tailEnd type="none" w="med" len="med"/>
+                    </a:lnT>
+                    <a:lnB w="12700" cap="flat" cmpd="sng" algn="ctr">
+                      <a:solidFill>
+                        <a:scrgbClr r="0" g="0" b="0"/>
+                      </a:solidFill>
+                      <a:prstDash val="solid"/>
+                      <a:round/>
+                      <a:headEnd type="none" w="med" len="med"/>
+                      <a:tailEnd type="none" w="med" len="med"/>
+                    </a:lnB>
+                  </a:tcPr>
+                </a:tc>
+                <a:tc>
+                  <a:txBody>
+                    <a:bodyPr/>
+                    <a:lstStyle/>
+                    <a:p>
+                      <a:pPr algn="ctr"/>
+                      <a:r>
+                        <a:rPr lang="en-US" dirty="0" smtClean="0">
+                          <a:latin typeface="Avenir Book"/>
+                          <a:cs typeface="Avenir Book"/>
+                        </a:rPr>
+                        <a:t>0.065</a:t>
+                      </a:r>
+                      <a:endParaRPr lang="en-US" dirty="0">
+                        <a:latin typeface="Avenir Book"/>
+                        <a:cs typeface="Avenir Book"/>
+                      </a:endParaRPr>
+                    </a:p>
+                  </a:txBody>
+                  <a:tcPr>
+                    <a:lnL w="12700" cap="flat" cmpd="sng" algn="ctr">
+                      <a:solidFill>
+                        <a:scrgbClr r="0" g="0" b="0"/>
+                      </a:solidFill>
+                      <a:prstDash val="solid"/>
+                      <a:round/>
+                      <a:headEnd type="none" w="med" len="med"/>
+                      <a:tailEnd type="none" w="med" len="med"/>
+                    </a:lnL>
+                    <a:lnR w="12700" cap="flat" cmpd="sng" algn="ctr">
+                      <a:solidFill>
+                        <a:scrgbClr r="0" g="0" b="0"/>
+                      </a:solidFill>
+                      <a:prstDash val="solid"/>
+                      <a:round/>
+                      <a:headEnd type="none" w="med" len="med"/>
+                      <a:tailEnd type="none" w="med" len="med"/>
+                    </a:lnR>
+                    <a:lnT w="12700" cap="flat" cmpd="sng" algn="ctr">
+                      <a:solidFill>
+                        <a:scrgbClr r="0" g="0" b="0"/>
+                      </a:solidFill>
+                      <a:prstDash val="solid"/>
+                      <a:round/>
+                      <a:headEnd type="none" w="med" len="med"/>
+                      <a:tailEnd type="none" w="med" len="med"/>
+                    </a:lnT>
+                    <a:lnB w="12700" cap="flat" cmpd="sng" algn="ctr">
+                      <a:solidFill>
+                        <a:scrgbClr r="0" g="0" b="0"/>
+                      </a:solidFill>
+                      <a:prstDash val="solid"/>
+                      <a:round/>
+                      <a:headEnd type="none" w="med" len="med"/>
+                      <a:tailEnd type="none" w="med" len="med"/>
+                    </a:lnB>
+                  </a:tcPr>
+                </a:tc>
+                <a:tc>
+                  <a:txBody>
+                    <a:bodyPr/>
+                    <a:lstStyle/>
+                    <a:p>
+                      <a:pPr algn="ctr"/>
+                      <a:r>
+                        <a:rPr lang="en-US" dirty="0" smtClean="0">
+                          <a:latin typeface="Avenir Book"/>
+                          <a:cs typeface="Avenir Book"/>
+                        </a:rPr>
+                        <a:t>1.36</a:t>
+                      </a:r>
+                    </a:p>
+                  </a:txBody>
+                  <a:tcPr>
+                    <a:lnL w="12700" cap="flat" cmpd="sng" algn="ctr">
+                      <a:solidFill>
+                        <a:scrgbClr r="0" g="0" b="0"/>
+                      </a:solidFill>
+                      <a:prstDash val="solid"/>
+                      <a:round/>
+                      <a:headEnd type="none" w="med" len="med"/>
+                      <a:tailEnd type="none" w="med" len="med"/>
+                    </a:lnL>
+                    <a:lnR w="12700" cap="flat" cmpd="sng" algn="ctr">
+                      <a:solidFill>
+                        <a:scrgbClr r="0" g="0" b="0"/>
+                      </a:solidFill>
+                      <a:prstDash val="solid"/>
+                      <a:round/>
+                      <a:headEnd type="none" w="med" len="med"/>
+                      <a:tailEnd type="none" w="med" len="med"/>
+                    </a:lnR>
+                    <a:lnT w="12700" cap="flat" cmpd="sng" algn="ctr">
+                      <a:solidFill>
+                        <a:scrgbClr r="0" g="0" b="0"/>
+                      </a:solidFill>
+                      <a:prstDash val="solid"/>
+                      <a:round/>
+                      <a:headEnd type="none" w="med" len="med"/>
+                      <a:tailEnd type="none" w="med" len="med"/>
+                    </a:lnT>
+                    <a:lnB w="12700" cap="flat" cmpd="sng" algn="ctr">
+                      <a:solidFill>
+                        <a:scrgbClr r="0" g="0" b="0"/>
+                      </a:solidFill>
+                      <a:prstDash val="solid"/>
+                      <a:round/>
+                      <a:headEnd type="none" w="med" len="med"/>
+                      <a:tailEnd type="none" w="med" len="med"/>
+                    </a:lnB>
+                  </a:tcPr>
+                </a:tc>
+              </a:tr>
+              <a:tr h="370840">
+                <a:tc>
+                  <a:txBody>
+                    <a:bodyPr/>
+                    <a:lstStyle/>
+                    <a:p>
+                      <a:pPr algn="l"/>
+                      <a:r>
+                        <a:rPr lang="en-US" dirty="0" smtClean="0">
+                          <a:latin typeface="Avenir Book"/>
+                          <a:cs typeface="Avenir Book"/>
+                        </a:rPr>
+                        <a:t>Minimum MAP </a:t>
+                      </a:r>
+                      <a:endParaRPr lang="en-US" dirty="0">
+                        <a:latin typeface="Avenir Book"/>
+                        <a:cs typeface="Avenir Book"/>
+                      </a:endParaRPr>
+                    </a:p>
+                  </a:txBody>
+                  <a:tcPr>
+                    <a:lnL w="12700" cap="flat" cmpd="sng" algn="ctr">
+                      <a:solidFill>
+                        <a:scrgbClr r="0" g="0" b="0"/>
+                      </a:solidFill>
+                      <a:prstDash val="solid"/>
+                      <a:round/>
+                      <a:headEnd type="none" w="med" len="med"/>
+                      <a:tailEnd type="none" w="med" len="med"/>
+                    </a:lnL>
+                    <a:lnR w="12700" cap="flat" cmpd="sng" algn="ctr">
+                      <a:solidFill>
+                        <a:scrgbClr r="0" g="0" b="0"/>
+                      </a:solidFill>
+                      <a:prstDash val="solid"/>
+                      <a:round/>
+                      <a:headEnd type="none" w="med" len="med"/>
+                      <a:tailEnd type="none" w="med" len="med"/>
+                    </a:lnR>
+                    <a:lnT w="12700" cap="flat" cmpd="sng" algn="ctr">
+                      <a:solidFill>
+                        <a:scrgbClr r="0" g="0" b="0"/>
+                      </a:solidFill>
+                      <a:prstDash val="solid"/>
+                      <a:round/>
+                      <a:headEnd type="none" w="med" len="med"/>
+                      <a:tailEnd type="none" w="med" len="med"/>
+                    </a:lnT>
+                    <a:lnB w="12700" cap="flat" cmpd="sng" algn="ctr">
+                      <a:solidFill>
+                        <a:scrgbClr r="0" g="0" b="0"/>
+                      </a:solidFill>
+                      <a:prstDash val="solid"/>
+                      <a:round/>
+                      <a:headEnd type="none" w="med" len="med"/>
+                      <a:tailEnd type="none" w="med" len="med"/>
+                    </a:lnB>
+                  </a:tcPr>
+                </a:tc>
+                <a:tc>
+                  <a:txBody>
+                    <a:bodyPr/>
+                    <a:lstStyle/>
+                    <a:p>
+                      <a:pPr algn="ctr"/>
+                      <a:r>
+                        <a:rPr lang="en-US" dirty="0" smtClean="0">
+                          <a:latin typeface="Avenir Book"/>
+                          <a:cs typeface="Avenir Book"/>
+                        </a:rPr>
+                        <a:t>0.000</a:t>
+                      </a:r>
+                      <a:endParaRPr lang="en-US" dirty="0">
+                        <a:latin typeface="Avenir Book"/>
+                        <a:cs typeface="Avenir Book"/>
+                      </a:endParaRPr>
+                    </a:p>
+                  </a:txBody>
+                  <a:tcPr>
+                    <a:lnL w="12700" cap="flat" cmpd="sng" algn="ctr">
+                      <a:solidFill>
+                        <a:scrgbClr r="0" g="0" b="0"/>
+                      </a:solidFill>
+                      <a:prstDash val="solid"/>
+                      <a:round/>
+                      <a:headEnd type="none" w="med" len="med"/>
+                      <a:tailEnd type="none" w="med" len="med"/>
+                    </a:lnL>
+                    <a:lnR w="12700" cap="flat" cmpd="sng" algn="ctr">
+                      <a:solidFill>
+                        <a:scrgbClr r="0" g="0" b="0"/>
+                      </a:solidFill>
+                      <a:prstDash val="solid"/>
+                      <a:round/>
+                      <a:headEnd type="none" w="med" len="med"/>
+                      <a:tailEnd type="none" w="med" len="med"/>
+                    </a:lnR>
+                    <a:lnT w="12700" cap="flat" cmpd="sng" algn="ctr">
+                      <a:solidFill>
+                        <a:scrgbClr r="0" g="0" b="0"/>
+                      </a:solidFill>
+                      <a:prstDash val="solid"/>
+                      <a:round/>
+                      <a:headEnd type="none" w="med" len="med"/>
+                      <a:tailEnd type="none" w="med" len="med"/>
+                    </a:lnT>
+                    <a:lnB w="12700" cap="flat" cmpd="sng" algn="ctr">
+                      <a:solidFill>
+                        <a:scrgbClr r="0" g="0" b="0"/>
+                      </a:solidFill>
+                      <a:prstDash val="solid"/>
+                      <a:round/>
+                      <a:headEnd type="none" w="med" len="med"/>
+                      <a:tailEnd type="none" w="med" len="med"/>
+                    </a:lnB>
+                  </a:tcPr>
+                </a:tc>
+                <a:tc>
+                  <a:txBody>
+                    <a:bodyPr/>
+                    <a:lstStyle/>
+                    <a:p>
+                      <a:pPr algn="ctr"/>
+                      <a:r>
+                        <a:rPr lang="en-US" dirty="0" smtClean="0">
+                          <a:latin typeface="Avenir Book"/>
+                          <a:cs typeface="Avenir Book"/>
+                        </a:rPr>
+                        <a:t>0.75</a:t>
+                      </a:r>
+                    </a:p>
+                  </a:txBody>
+                  <a:tcPr>
+                    <a:lnL w="12700" cap="flat" cmpd="sng" algn="ctr">
+                      <a:solidFill>
+                        <a:scrgbClr r="0" g="0" b="0"/>
+                      </a:solidFill>
+                      <a:prstDash val="solid"/>
+                      <a:round/>
+                      <a:headEnd type="none" w="med" len="med"/>
+                      <a:tailEnd type="none" w="med" len="med"/>
+                    </a:lnL>
+                    <a:lnR w="12700" cap="flat" cmpd="sng" algn="ctr">
+                      <a:solidFill>
+                        <a:scrgbClr r="0" g="0" b="0"/>
+                      </a:solidFill>
+                      <a:prstDash val="solid"/>
+                      <a:round/>
+                      <a:headEnd type="none" w="med" len="med"/>
+                      <a:tailEnd type="none" w="med" len="med"/>
+                    </a:lnR>
+                    <a:lnT w="12700" cap="flat" cmpd="sng" algn="ctr">
+                      <a:solidFill>
+                        <a:scrgbClr r="0" g="0" b="0"/>
+                      </a:solidFill>
+                      <a:prstDash val="solid"/>
+                      <a:round/>
+                      <a:headEnd type="none" w="med" len="med"/>
+                      <a:tailEnd type="none" w="med" len="med"/>
+                    </a:lnT>
+                    <a:lnB w="12700" cap="flat" cmpd="sng" algn="ctr">
+                      <a:solidFill>
+                        <a:scrgbClr r="0" g="0" b="0"/>
+                      </a:solidFill>
+                      <a:prstDash val="solid"/>
+                      <a:round/>
+                      <a:headEnd type="none" w="med" len="med"/>
+                      <a:tailEnd type="none" w="med" len="med"/>
+                    </a:lnB>
+                  </a:tcPr>
+                </a:tc>
+              </a:tr>
+            </a:tbl>
+          </a:graphicData>
+        </a:graphic>
+      </p:graphicFrame>
     </p:spTree>
     <p:extLst>
       <p:ext uri="{BB962C8B-B14F-4D97-AF65-F5344CB8AC3E}">
@@ -5898,6 +7341,361 @@
           </a:p>
         </p:txBody>
       </p:sp>
+      <p:sp>
+        <p:nvSpPr>
+          <p:cNvPr id="10" name="TextBox 9"/>
+          <p:cNvSpPr txBox="1"/>
+          <p:nvPr/>
+        </p:nvSpPr>
+        <p:spPr>
+          <a:xfrm>
+            <a:off x="4837557" y="1183412"/>
+            <a:ext cx="4052443" cy="4339650"/>
+          </a:xfrm>
+          <a:prstGeom prst="rect">
+            <a:avLst/>
+          </a:prstGeom>
+          <a:noFill/>
+        </p:spPr>
+        <p:txBody>
+          <a:bodyPr wrap="square" rtlCol="0">
+            <a:spAutoFit/>
+          </a:bodyPr>
+          <a:lstStyle/>
+          <a:p>
+            <a:r>
+              <a:rPr lang="en-US" sz="4400" b="1" dirty="0" smtClean="0">
+                <a:latin typeface="Avenir Heavy"/>
+                <a:cs typeface="Avenir Heavy"/>
+              </a:rPr>
+              <a:t>&gt;1 </a:t>
+            </a:r>
+            <a:r>
+              <a:rPr lang="en-US" sz="4400" b="1" dirty="0" smtClean="0">
+                <a:latin typeface="Avenir Heavy"/>
+                <a:cs typeface="Avenir Heavy"/>
+              </a:rPr>
+              <a:t>million </a:t>
+            </a:r>
+          </a:p>
+          <a:p>
+            <a:r>
+              <a:rPr lang="en-US" sz="2400" i="1" dirty="0" smtClean="0">
+                <a:latin typeface="Avenir Book"/>
+                <a:cs typeface="Avenir Book"/>
+              </a:rPr>
+              <a:t>Americans </a:t>
+            </a:r>
+            <a:r>
+              <a:rPr lang="en-US" sz="2400" i="1" dirty="0" smtClean="0">
+                <a:latin typeface="Avenir Book"/>
+                <a:cs typeface="Avenir Book"/>
+              </a:rPr>
+              <a:t>afflicted per year.</a:t>
+            </a:r>
+            <a:r>
+              <a:rPr lang="en-US" sz="2400" i="1" dirty="0" smtClean="0">
+                <a:latin typeface="Avenir Book"/>
+                <a:cs typeface="Avenir Book"/>
+              </a:rPr>
+              <a:t/>
+            </a:r>
+            <a:br>
+              <a:rPr lang="en-US" sz="2400" i="1" dirty="0" smtClean="0">
+                <a:latin typeface="Avenir Book"/>
+                <a:cs typeface="Avenir Book"/>
+              </a:rPr>
+            </a:br>
+            <a:r>
+              <a:rPr lang="en-US" sz="2400" i="1" dirty="0" smtClean="0">
+                <a:latin typeface="Avenir Book"/>
+                <a:cs typeface="Avenir Book"/>
+              </a:rPr>
+              <a:t/>
+            </a:r>
+            <a:br>
+              <a:rPr lang="en-US" sz="2400" i="1" dirty="0" smtClean="0">
+                <a:latin typeface="Avenir Book"/>
+                <a:cs typeface="Avenir Book"/>
+              </a:rPr>
+            </a:br>
+            <a:r>
+              <a:rPr lang="en-US" sz="4400" b="1" dirty="0" smtClean="0">
+                <a:latin typeface="Avenir Heavy"/>
+                <a:cs typeface="Avenir Heavy"/>
+              </a:rPr>
+              <a:t>28–50%</a:t>
+            </a:r>
+            <a:endParaRPr lang="en-US" sz="4400" b="1" dirty="0">
+              <a:latin typeface="Avenir Heavy"/>
+              <a:cs typeface="Avenir Heavy"/>
+            </a:endParaRPr>
+          </a:p>
+          <a:p>
+            <a:r>
+              <a:rPr lang="en-US" sz="2400" i="1" dirty="0" smtClean="0">
+                <a:latin typeface="Avenir Book"/>
+                <a:cs typeface="Avenir Book"/>
+              </a:rPr>
+              <a:t>Mortality rate.</a:t>
+            </a:r>
+            <a:endParaRPr lang="en-US" sz="2400" i="1" dirty="0">
+              <a:latin typeface="Avenir Book"/>
+              <a:cs typeface="Avenir Book"/>
+            </a:endParaRPr>
+          </a:p>
+          <a:p>
+            <a:r>
+              <a:rPr lang="en-US" sz="2400" i="1" dirty="0" smtClean="0">
+                <a:latin typeface="Avenir Book"/>
+                <a:cs typeface="Avenir Book"/>
+              </a:rPr>
+              <a:t/>
+            </a:r>
+            <a:br>
+              <a:rPr lang="en-US" sz="2400" i="1" dirty="0" smtClean="0">
+                <a:latin typeface="Avenir Book"/>
+                <a:cs typeface="Avenir Book"/>
+              </a:rPr>
+            </a:br>
+            <a:r>
+              <a:rPr lang="en-US" sz="4400" b="1" dirty="0" smtClean="0">
+                <a:latin typeface="Avenir Heavy"/>
+                <a:cs typeface="Avenir Heavy"/>
+              </a:rPr>
+              <a:t>$14.2 billion</a:t>
+            </a:r>
+            <a:endParaRPr lang="en-US" sz="4400" b="1" dirty="0">
+              <a:latin typeface="Avenir Heavy"/>
+              <a:cs typeface="Avenir Heavy"/>
+            </a:endParaRPr>
+          </a:p>
+          <a:p>
+            <a:r>
+              <a:rPr lang="en-US" sz="2400" i="1" dirty="0" smtClean="0">
+                <a:latin typeface="Avenir Book"/>
+                <a:cs typeface="Avenir Book"/>
+              </a:rPr>
+              <a:t>Estimated cost per year.</a:t>
+            </a:r>
+            <a:endParaRPr lang="en-US" sz="2400" i="1" dirty="0">
+              <a:latin typeface="Avenir Book"/>
+              <a:cs typeface="Avenir Book"/>
+            </a:endParaRPr>
+          </a:p>
+          <a:p>
+            <a:endParaRPr lang="en-US" sz="2400" i="1" dirty="0">
+              <a:latin typeface="Avenir Book"/>
+              <a:cs typeface="Avenir Book"/>
+            </a:endParaRPr>
+          </a:p>
+        </p:txBody>
+      </p:sp>
+      <p:sp>
+        <p:nvSpPr>
+          <p:cNvPr id="11" name="TextBox 10"/>
+          <p:cNvSpPr txBox="1"/>
+          <p:nvPr/>
+        </p:nvSpPr>
+        <p:spPr>
+          <a:xfrm>
+            <a:off x="536575" y="1675537"/>
+            <a:ext cx="3761232" cy="3231654"/>
+          </a:xfrm>
+          <a:prstGeom prst="rect">
+            <a:avLst/>
+          </a:prstGeom>
+          <a:noFill/>
+        </p:spPr>
+        <p:txBody>
+          <a:bodyPr wrap="square" rtlCol="0">
+            <a:spAutoFit/>
+          </a:bodyPr>
+          <a:lstStyle/>
+          <a:p>
+            <a:pPr algn="ctr"/>
+            <a:r>
+              <a:rPr lang="en-US" sz="4400" b="1" dirty="0" smtClean="0">
+                <a:latin typeface="Avenir Heavy"/>
+                <a:cs typeface="Avenir Heavy"/>
+              </a:rPr>
+              <a:t>Sepsis: </a:t>
+            </a:r>
+            <a:endParaRPr lang="en-US" sz="4400" b="1" dirty="0" smtClean="0">
+              <a:solidFill>
+                <a:schemeClr val="bg1"/>
+              </a:solidFill>
+              <a:latin typeface="Avenir Heavy"/>
+              <a:cs typeface="Avenir Heavy"/>
+            </a:endParaRPr>
+          </a:p>
+          <a:p>
+            <a:pPr algn="ctr"/>
+            <a:r>
+              <a:rPr lang="en-US" sz="4000" dirty="0" smtClean="0">
+                <a:latin typeface="Avenir Book"/>
+                <a:cs typeface="Avenir Book"/>
+              </a:rPr>
+              <a:t>overwhelming, life-threatening response to infection</a:t>
+            </a:r>
+            <a:r>
+              <a:rPr lang="en-US" sz="4000" b="1" dirty="0" smtClean="0">
+                <a:latin typeface="Avenir Heavy"/>
+                <a:cs typeface="Avenir Heavy"/>
+              </a:rPr>
+              <a:t> </a:t>
+            </a:r>
+          </a:p>
+        </p:txBody>
+      </p:sp>
+      <p:cxnSp>
+        <p:nvCxnSpPr>
+          <p:cNvPr id="13" name="Straight Connector 12"/>
+          <p:cNvCxnSpPr/>
+          <p:nvPr/>
+        </p:nvCxnSpPr>
+        <p:spPr>
+          <a:xfrm>
+            <a:off x="4572000" y="1063625"/>
+            <a:ext cx="0" cy="4459437"/>
+          </a:xfrm>
+          <a:prstGeom prst="line">
+            <a:avLst/>
+          </a:prstGeom>
+          <a:ln>
+            <a:solidFill>
+              <a:schemeClr val="tx1"/>
+            </a:solidFill>
+          </a:ln>
+          <a:effectLst/>
+        </p:spPr>
+        <p:style>
+          <a:lnRef idx="2">
+            <a:schemeClr val="accent1"/>
+          </a:lnRef>
+          <a:fillRef idx="0">
+            <a:schemeClr val="accent1"/>
+          </a:fillRef>
+          <a:effectRef idx="1">
+            <a:schemeClr val="accent1"/>
+          </a:effectRef>
+          <a:fontRef idx="minor">
+            <a:schemeClr val="tx1"/>
+          </a:fontRef>
+        </p:style>
+      </p:cxnSp>
+      <p:sp>
+        <p:nvSpPr>
+          <p:cNvPr id="19" name="Rectangle 18"/>
+          <p:cNvSpPr/>
+          <p:nvPr/>
+        </p:nvSpPr>
+        <p:spPr>
+          <a:xfrm>
+            <a:off x="0" y="5668536"/>
+            <a:ext cx="9144000" cy="1046670"/>
+          </a:xfrm>
+          <a:prstGeom prst="rect">
+            <a:avLst/>
+          </a:prstGeom>
+          <a:solidFill>
+            <a:schemeClr val="accent5">
+              <a:lumMod val="60000"/>
+              <a:lumOff val="40000"/>
+            </a:schemeClr>
+          </a:solidFill>
+          <a:ln>
+            <a:noFill/>
+          </a:ln>
+        </p:spPr>
+        <p:style>
+          <a:lnRef idx="1">
+            <a:schemeClr val="accent1"/>
+          </a:lnRef>
+          <a:fillRef idx="3">
+            <a:schemeClr val="accent1"/>
+          </a:fillRef>
+          <a:effectRef idx="2">
+            <a:schemeClr val="accent1"/>
+          </a:effectRef>
+          <a:fontRef idx="minor">
+            <a:schemeClr val="lt1"/>
+          </a:fontRef>
+        </p:style>
+        <p:txBody>
+          <a:bodyPr rtlCol="0" anchor="ctr"/>
+          <a:lstStyle/>
+          <a:p>
+            <a:pPr algn="ctr"/>
+            <a:endParaRPr lang="en-US"/>
+          </a:p>
+        </p:txBody>
+      </p:sp>
+      <p:sp>
+        <p:nvSpPr>
+          <p:cNvPr id="20" name="TextBox 19"/>
+          <p:cNvSpPr txBox="1"/>
+          <p:nvPr/>
+        </p:nvSpPr>
+        <p:spPr>
+          <a:xfrm>
+            <a:off x="0" y="5936447"/>
+            <a:ext cx="9144000" cy="507831"/>
+          </a:xfrm>
+          <a:prstGeom prst="rect">
+            <a:avLst/>
+          </a:prstGeom>
+          <a:noFill/>
+        </p:spPr>
+        <p:txBody>
+          <a:bodyPr wrap="square" rtlCol="0">
+            <a:spAutoFit/>
+          </a:bodyPr>
+          <a:lstStyle/>
+          <a:p>
+            <a:pPr algn="ctr"/>
+            <a:r>
+              <a:rPr lang="en-US" sz="2700" b="1" dirty="0" smtClean="0">
+                <a:latin typeface="Avenir Book"/>
+                <a:cs typeface="Avenir Book"/>
+              </a:rPr>
+              <a:t>Sepsis</a:t>
+            </a:r>
+            <a:r>
+              <a:rPr lang="en-US" sz="2700" dirty="0" smtClean="0">
+                <a:latin typeface="Avenir Heavy"/>
+                <a:cs typeface="Avenir Heavy"/>
+              </a:rPr>
+              <a:t> </a:t>
+            </a:r>
+            <a:r>
+              <a:rPr lang="en-US" sz="2700" dirty="0" smtClean="0">
+                <a:latin typeface="Avenir Book"/>
+                <a:cs typeface="Avenir Book"/>
+              </a:rPr>
+              <a:t>is the leading precipitating factor of </a:t>
+            </a:r>
+            <a:r>
+              <a:rPr lang="en-US" sz="2700" dirty="0" smtClean="0">
+                <a:latin typeface="Avenir Black"/>
+                <a:cs typeface="Avenir Black"/>
+              </a:rPr>
+              <a:t>AKI</a:t>
+            </a:r>
+            <a:r>
+              <a:rPr lang="en-US" sz="2700" dirty="0" smtClean="0">
+                <a:latin typeface="Avenir Book"/>
+                <a:cs typeface="Avenir Book"/>
+              </a:rPr>
+              <a:t>.</a:t>
+            </a:r>
+            <a:endParaRPr lang="en-US" sz="2700" dirty="0">
+              <a:latin typeface="Avenir Heavy"/>
+              <a:cs typeface="Avenir Heavy"/>
+            </a:endParaRPr>
+          </a:p>
+        </p:txBody>
+      </p:sp>
     </p:spTree>
     <p:extLst>
       <p:ext uri="{BB962C8B-B14F-4D97-AF65-F5344CB8AC3E}">
@@ -5974,10 +7772,327 @@
           </a:p>
         </p:txBody>
       </p:sp>
+      <p:sp>
+        <p:nvSpPr>
+          <p:cNvPr id="10" name="TextBox 9"/>
+          <p:cNvSpPr txBox="1"/>
+          <p:nvPr/>
+        </p:nvSpPr>
+        <p:spPr>
+          <a:xfrm>
+            <a:off x="4837557" y="1723162"/>
+            <a:ext cx="4052443" cy="2677656"/>
+          </a:xfrm>
+          <a:prstGeom prst="rect">
+            <a:avLst/>
+          </a:prstGeom>
+          <a:noFill/>
+        </p:spPr>
+        <p:txBody>
+          <a:bodyPr wrap="square" rtlCol="0">
+            <a:spAutoFit/>
+          </a:bodyPr>
+          <a:lstStyle/>
+          <a:p>
+            <a:r>
+              <a:rPr lang="en-US" sz="4800" b="1" dirty="0" smtClean="0">
+                <a:latin typeface="Avenir Heavy"/>
+                <a:cs typeface="Avenir Heavy"/>
+              </a:rPr>
+              <a:t>36%</a:t>
+            </a:r>
+            <a:endParaRPr lang="en-US" sz="4800" b="1" dirty="0" smtClean="0">
+              <a:latin typeface="Avenir Heavy"/>
+              <a:cs typeface="Avenir Heavy"/>
+            </a:endParaRPr>
+          </a:p>
+          <a:p>
+            <a:r>
+              <a:rPr lang="en-US" sz="2400" i="1" dirty="0" smtClean="0">
+                <a:latin typeface="Avenir Book"/>
+                <a:cs typeface="Avenir Book"/>
+              </a:rPr>
+              <a:t>Of ICU patients affected.</a:t>
+            </a:r>
+            <a:r>
+              <a:rPr lang="en-US" sz="2400" i="1" dirty="0" smtClean="0">
+                <a:latin typeface="Avenir Book"/>
+                <a:cs typeface="Avenir Book"/>
+              </a:rPr>
+              <a:t/>
+            </a:r>
+            <a:br>
+              <a:rPr lang="en-US" sz="2400" i="1" dirty="0" smtClean="0">
+                <a:latin typeface="Avenir Book"/>
+                <a:cs typeface="Avenir Book"/>
+              </a:rPr>
+            </a:br>
+            <a:r>
+              <a:rPr lang="en-US" sz="2400" i="1" dirty="0" smtClean="0">
+                <a:latin typeface="Avenir Book"/>
+                <a:cs typeface="Avenir Book"/>
+              </a:rPr>
+              <a:t/>
+            </a:r>
+            <a:br>
+              <a:rPr lang="en-US" sz="2400" i="1" dirty="0" smtClean="0">
+                <a:latin typeface="Avenir Book"/>
+                <a:cs typeface="Avenir Book"/>
+              </a:rPr>
+            </a:br>
+            <a:r>
+              <a:rPr lang="en-US" sz="4800" b="1" dirty="0" smtClean="0">
+                <a:latin typeface="Avenir Heavy"/>
+                <a:cs typeface="Avenir Heavy"/>
+              </a:rPr>
+              <a:t>37</a:t>
+            </a:r>
+            <a:r>
+              <a:rPr lang="en-US" sz="4800" b="1" dirty="0" smtClean="0">
+                <a:latin typeface="Avenir Heavy"/>
+                <a:cs typeface="Avenir Heavy"/>
+              </a:rPr>
+              <a:t>–50%</a:t>
+            </a:r>
+            <a:endParaRPr lang="en-US" sz="4800" b="1" dirty="0">
+              <a:latin typeface="Avenir Heavy"/>
+              <a:cs typeface="Avenir Heavy"/>
+            </a:endParaRPr>
+          </a:p>
+          <a:p>
+            <a:r>
+              <a:rPr lang="en-US" sz="2400" i="1" dirty="0" smtClean="0">
+                <a:latin typeface="Avenir Book"/>
+                <a:cs typeface="Avenir Book"/>
+              </a:rPr>
+              <a:t>Mortality rate.</a:t>
+            </a:r>
+            <a:endParaRPr lang="en-US" sz="2400" i="1" dirty="0">
+              <a:latin typeface="Avenir Book"/>
+              <a:cs typeface="Avenir Book"/>
+            </a:endParaRPr>
+          </a:p>
+        </p:txBody>
+      </p:sp>
+      <p:sp>
+        <p:nvSpPr>
+          <p:cNvPr id="11" name="TextBox 10"/>
+          <p:cNvSpPr txBox="1"/>
+          <p:nvPr/>
+        </p:nvSpPr>
+        <p:spPr>
+          <a:xfrm>
+            <a:off x="568325" y="1421666"/>
+            <a:ext cx="3840607" cy="3293209"/>
+          </a:xfrm>
+          <a:prstGeom prst="rect">
+            <a:avLst/>
+          </a:prstGeom>
+          <a:noFill/>
+        </p:spPr>
+        <p:txBody>
+          <a:bodyPr wrap="square" rtlCol="0">
+            <a:spAutoFit/>
+          </a:bodyPr>
+          <a:lstStyle/>
+          <a:p>
+            <a:pPr algn="ctr"/>
+            <a:r>
+              <a:rPr lang="en-US" sz="4400" b="1" dirty="0" smtClean="0">
+                <a:latin typeface="Avenir Heavy"/>
+                <a:cs typeface="Avenir Heavy"/>
+              </a:rPr>
+              <a:t>Acute </a:t>
+            </a:r>
+            <a:br>
+              <a:rPr lang="en-US" sz="4400" b="1" dirty="0" smtClean="0">
+                <a:latin typeface="Avenir Heavy"/>
+                <a:cs typeface="Avenir Heavy"/>
+              </a:rPr>
+            </a:br>
+            <a:r>
+              <a:rPr lang="en-US" sz="4400" b="1" dirty="0" smtClean="0">
+                <a:latin typeface="Avenir Heavy"/>
+                <a:cs typeface="Avenir Heavy"/>
+              </a:rPr>
+              <a:t>Kidney Injury: </a:t>
+            </a:r>
+            <a:endParaRPr lang="en-US" sz="4400" b="1" dirty="0" smtClean="0">
+              <a:solidFill>
+                <a:schemeClr val="bg1"/>
+              </a:solidFill>
+              <a:latin typeface="Avenir Heavy"/>
+              <a:cs typeface="Avenir Heavy"/>
+            </a:endParaRPr>
+          </a:p>
+          <a:p>
+            <a:pPr algn="ctr"/>
+            <a:r>
+              <a:rPr lang="en-US" sz="4000" dirty="0">
+                <a:latin typeface="Avenir Book"/>
+                <a:cs typeface="Avenir Book"/>
+              </a:rPr>
+              <a:t>r</a:t>
+            </a:r>
+            <a:r>
+              <a:rPr lang="en-US" sz="4000" dirty="0" smtClean="0">
+                <a:latin typeface="Avenir Book"/>
+                <a:cs typeface="Avenir Book"/>
+              </a:rPr>
+              <a:t>apid decrease in kidney function</a:t>
+            </a:r>
+            <a:endParaRPr lang="en-US" sz="4000" b="1" dirty="0" smtClean="0">
+              <a:latin typeface="Avenir Heavy"/>
+              <a:cs typeface="Avenir Heavy"/>
+            </a:endParaRPr>
+          </a:p>
+        </p:txBody>
+      </p:sp>
+      <p:cxnSp>
+        <p:nvCxnSpPr>
+          <p:cNvPr id="13" name="Straight Connector 12"/>
+          <p:cNvCxnSpPr/>
+          <p:nvPr/>
+        </p:nvCxnSpPr>
+        <p:spPr>
+          <a:xfrm>
+            <a:off x="4572000" y="1412875"/>
+            <a:ext cx="0" cy="3302000"/>
+          </a:xfrm>
+          <a:prstGeom prst="line">
+            <a:avLst/>
+          </a:prstGeom>
+          <a:ln>
+            <a:solidFill>
+              <a:schemeClr val="tx1"/>
+            </a:solidFill>
+          </a:ln>
+          <a:effectLst/>
+        </p:spPr>
+        <p:style>
+          <a:lnRef idx="2">
+            <a:schemeClr val="accent1"/>
+          </a:lnRef>
+          <a:fillRef idx="0">
+            <a:schemeClr val="accent1"/>
+          </a:fillRef>
+          <a:effectRef idx="1">
+            <a:schemeClr val="accent1"/>
+          </a:effectRef>
+          <a:fontRef idx="minor">
+            <a:schemeClr val="tx1"/>
+          </a:fontRef>
+        </p:style>
+      </p:cxnSp>
+      <p:sp>
+        <p:nvSpPr>
+          <p:cNvPr id="9" name="Rectangle 8"/>
+          <p:cNvSpPr/>
+          <p:nvPr/>
+        </p:nvSpPr>
+        <p:spPr>
+          <a:xfrm>
+            <a:off x="0" y="5208161"/>
+            <a:ext cx="9144000" cy="1046670"/>
+          </a:xfrm>
+          <a:prstGeom prst="rect">
+            <a:avLst/>
+          </a:prstGeom>
+          <a:solidFill>
+            <a:schemeClr val="accent5">
+              <a:lumMod val="60000"/>
+              <a:lumOff val="40000"/>
+            </a:schemeClr>
+          </a:solidFill>
+          <a:ln>
+            <a:noFill/>
+          </a:ln>
+        </p:spPr>
+        <p:style>
+          <a:lnRef idx="1">
+            <a:schemeClr val="accent1"/>
+          </a:lnRef>
+          <a:fillRef idx="3">
+            <a:schemeClr val="accent1"/>
+          </a:fillRef>
+          <a:effectRef idx="2">
+            <a:schemeClr val="accent1"/>
+          </a:effectRef>
+          <a:fontRef idx="minor">
+            <a:schemeClr val="lt1"/>
+          </a:fontRef>
+        </p:style>
+        <p:txBody>
+          <a:bodyPr rtlCol="0" anchor="ctr"/>
+          <a:lstStyle/>
+          <a:p>
+            <a:pPr algn="ctr"/>
+            <a:endParaRPr lang="en-US"/>
+          </a:p>
+        </p:txBody>
+      </p:sp>
+      <p:sp>
+        <p:nvSpPr>
+          <p:cNvPr id="12" name="TextBox 11"/>
+          <p:cNvSpPr txBox="1"/>
+          <p:nvPr/>
+        </p:nvSpPr>
+        <p:spPr>
+          <a:xfrm>
+            <a:off x="0" y="5476072"/>
+            <a:ext cx="9144000" cy="507831"/>
+          </a:xfrm>
+          <a:prstGeom prst="rect">
+            <a:avLst/>
+          </a:prstGeom>
+          <a:noFill/>
+        </p:spPr>
+        <p:txBody>
+          <a:bodyPr wrap="square" rtlCol="0">
+            <a:spAutoFit/>
+          </a:bodyPr>
+          <a:lstStyle/>
+          <a:p>
+            <a:pPr algn="ctr"/>
+            <a:r>
+              <a:rPr lang="en-US" sz="2700" b="1" dirty="0" smtClean="0">
+                <a:latin typeface="Avenir Heavy"/>
+                <a:cs typeface="Avenir Heavy"/>
+              </a:rPr>
+              <a:t>Hypotensi</a:t>
+            </a:r>
+            <a:r>
+              <a:rPr lang="en-US" sz="2700" b="1" dirty="0" smtClean="0">
+                <a:latin typeface="Avenir Heavy"/>
+                <a:cs typeface="Avenir Heavy"/>
+              </a:rPr>
+              <a:t>on</a:t>
+            </a:r>
+            <a:r>
+              <a:rPr lang="en-US" sz="2700" dirty="0" smtClean="0">
+                <a:latin typeface="Avenir Heavy"/>
+                <a:cs typeface="Avenir Heavy"/>
+              </a:rPr>
+              <a:t> </a:t>
+            </a:r>
+            <a:r>
+              <a:rPr lang="en-US" sz="2700" dirty="0" smtClean="0">
+                <a:latin typeface="Avenir Book"/>
+                <a:cs typeface="Avenir Book"/>
+              </a:rPr>
+              <a:t>is a probable factor in development of AKI.</a:t>
+            </a:r>
+            <a:endParaRPr lang="en-US" sz="2700" dirty="0">
+              <a:latin typeface="Avenir Heavy"/>
+              <a:cs typeface="Avenir Heavy"/>
+            </a:endParaRPr>
+          </a:p>
+        </p:txBody>
+      </p:sp>
     </p:spTree>
     <p:extLst>
       <p:ext uri="{BB962C8B-B14F-4D97-AF65-F5344CB8AC3E}">
-        <p14:creationId xmlns:p14="http://schemas.microsoft.com/office/powerpoint/2010/main" val="3062394309"/>
+        <p14:creationId xmlns:p14="http://schemas.microsoft.com/office/powerpoint/2010/main" val="3618056903"/>
       </p:ext>
     </p:extLst>
   </p:cSld>
@@ -6156,7 +8271,12 @@
             <p:ph idx="1"/>
           </p:nvPr>
         </p:nvSpPr>
-        <p:spPr/>
+        <p:spPr>
+          <a:xfrm>
+            <a:off x="457200" y="1774825"/>
+            <a:ext cx="8229600" cy="4525963"/>
+          </a:xfrm>
+        </p:spPr>
         <p:txBody>
           <a:bodyPr>
             <a:normAutofit/>
@@ -6192,7 +8312,12 @@
             <p:ph type="sldNum" sz="quarter" idx="12"/>
           </p:nvPr>
         </p:nvSpPr>
-        <p:spPr/>
+        <p:spPr>
+          <a:xfrm>
+            <a:off x="6553200" y="6213475"/>
+            <a:ext cx="2133600" cy="365125"/>
+          </a:xfrm>
+        </p:spPr>
         <p:txBody>
           <a:bodyPr/>
           <a:lstStyle/>
@@ -6202,6 +8327,839 @@
               <a:t>5</a:t>
             </a:fld>
             <a:endParaRPr lang="en-US"/>
+          </a:p>
+        </p:txBody>
+      </p:sp>
+      <p:sp>
+        <p:nvSpPr>
+          <p:cNvPr id="7" name="TextBox 6"/>
+          <p:cNvSpPr txBox="1"/>
+          <p:nvPr/>
+        </p:nvSpPr>
+        <p:spPr>
+          <a:xfrm>
+            <a:off x="774699" y="1183243"/>
+            <a:ext cx="2543176" cy="830997"/>
+          </a:xfrm>
+          <a:prstGeom prst="rect">
+            <a:avLst/>
+          </a:prstGeom>
+          <a:noFill/>
+          <a:ln>
+            <a:solidFill>
+              <a:schemeClr val="tx1"/>
+            </a:solidFill>
+          </a:ln>
+        </p:spPr>
+        <p:txBody>
+          <a:bodyPr wrap="square" rtlCol="0">
+            <a:spAutoFit/>
+          </a:bodyPr>
+          <a:lstStyle/>
+          <a:p>
+            <a:pPr algn="ctr"/>
+            <a:r>
+              <a:rPr lang="en-US" sz="2400" dirty="0" smtClean="0"/>
+              <a:t>MIMIC III</a:t>
+            </a:r>
+          </a:p>
+          <a:p>
+            <a:pPr algn="ctr"/>
+            <a:r>
+              <a:rPr lang="en-US" sz="2400" dirty="0" smtClean="0">
+                <a:solidFill>
+                  <a:schemeClr val="accent5">
+                    <a:lumMod val="75000"/>
+                  </a:schemeClr>
+                </a:solidFill>
+              </a:rPr>
+              <a:t>61,532 ICU stays</a:t>
+            </a:r>
+            <a:endParaRPr lang="en-US" sz="2400" dirty="0">
+              <a:solidFill>
+                <a:schemeClr val="accent5">
+                  <a:lumMod val="75000"/>
+                </a:schemeClr>
+              </a:solidFill>
+            </a:endParaRPr>
+          </a:p>
+        </p:txBody>
+      </p:sp>
+      <p:cxnSp>
+        <p:nvCxnSpPr>
+          <p:cNvPr id="9" name="Straight Arrow Connector 8"/>
+          <p:cNvCxnSpPr/>
+          <p:nvPr/>
+        </p:nvCxnSpPr>
+        <p:spPr>
+          <a:xfrm>
+            <a:off x="2046287" y="2014240"/>
+            <a:ext cx="0" cy="274320"/>
+          </a:xfrm>
+          <a:prstGeom prst="straightConnector1">
+            <a:avLst/>
+          </a:prstGeom>
+          <a:ln w="9525" cmpd="sng">
+            <a:solidFill>
+              <a:srgbClr val="000000"/>
+            </a:solidFill>
+            <a:tailEnd type="arrow"/>
+          </a:ln>
+          <a:effectLst/>
+        </p:spPr>
+        <p:style>
+          <a:lnRef idx="2">
+            <a:schemeClr val="accent1"/>
+          </a:lnRef>
+          <a:fillRef idx="0">
+            <a:schemeClr val="accent1"/>
+          </a:fillRef>
+          <a:effectRef idx="1">
+            <a:schemeClr val="accent1"/>
+          </a:effectRef>
+          <a:fontRef idx="minor">
+            <a:schemeClr val="tx1"/>
+          </a:fontRef>
+        </p:style>
+      </p:cxnSp>
+      <p:cxnSp>
+        <p:nvCxnSpPr>
+          <p:cNvPr id="14" name="Straight Arrow Connector 13"/>
+          <p:cNvCxnSpPr>
+            <a:endCxn id="16" idx="1"/>
+          </p:cNvCxnSpPr>
+          <p:nvPr/>
+        </p:nvCxnSpPr>
+        <p:spPr>
+          <a:xfrm>
+            <a:off x="2046287" y="2116098"/>
+            <a:ext cx="2271713" cy="0"/>
+          </a:xfrm>
+          <a:prstGeom prst="straightConnector1">
+            <a:avLst/>
+          </a:prstGeom>
+          <a:ln w="9525" cmpd="sng">
+            <a:solidFill>
+              <a:srgbClr val="000000"/>
+            </a:solidFill>
+            <a:tailEnd type="arrow"/>
+          </a:ln>
+          <a:effectLst/>
+        </p:spPr>
+        <p:style>
+          <a:lnRef idx="2">
+            <a:schemeClr val="accent1"/>
+          </a:lnRef>
+          <a:fillRef idx="0">
+            <a:schemeClr val="accent1"/>
+          </a:fillRef>
+          <a:effectRef idx="1">
+            <a:schemeClr val="accent1"/>
+          </a:effectRef>
+          <a:fontRef idx="minor">
+            <a:schemeClr val="tx1"/>
+          </a:fontRef>
+        </p:style>
+      </p:cxnSp>
+      <p:sp>
+        <p:nvSpPr>
+          <p:cNvPr id="16" name="TextBox 15"/>
+          <p:cNvSpPr txBox="1"/>
+          <p:nvPr/>
+        </p:nvSpPr>
+        <p:spPr>
+          <a:xfrm>
+            <a:off x="4318000" y="1885265"/>
+            <a:ext cx="4635500" cy="461665"/>
+          </a:xfrm>
+          <a:prstGeom prst="rect">
+            <a:avLst/>
+          </a:prstGeom>
+          <a:noFill/>
+          <a:ln>
+            <a:solidFill>
+              <a:schemeClr val="tx1"/>
+            </a:solidFill>
+          </a:ln>
+        </p:spPr>
+        <p:txBody>
+          <a:bodyPr wrap="square" rtlCol="0">
+            <a:spAutoFit/>
+          </a:bodyPr>
+          <a:lstStyle/>
+          <a:p>
+            <a:pPr algn="ctr"/>
+            <a:r>
+              <a:rPr lang="en-US" sz="2400" dirty="0" smtClean="0">
+                <a:solidFill>
+                  <a:schemeClr val="accent2">
+                    <a:lumMod val="75000"/>
+                  </a:schemeClr>
+                </a:solidFill>
+              </a:rPr>
+              <a:t>Age &gt; 18 or ICU stay length &lt; 3 days</a:t>
+            </a:r>
+            <a:endParaRPr lang="en-US" sz="2400" dirty="0">
+              <a:solidFill>
+                <a:schemeClr val="accent2">
+                  <a:lumMod val="75000"/>
+                </a:schemeClr>
+              </a:solidFill>
+            </a:endParaRPr>
+          </a:p>
+        </p:txBody>
+      </p:sp>
+      <p:sp>
+        <p:nvSpPr>
+          <p:cNvPr id="17" name="TextBox 16"/>
+          <p:cNvSpPr txBox="1"/>
+          <p:nvPr/>
+        </p:nvSpPr>
+        <p:spPr>
+          <a:xfrm>
+            <a:off x="330199" y="2299305"/>
+            <a:ext cx="3432176" cy="830997"/>
+          </a:xfrm>
+          <a:prstGeom prst="rect">
+            <a:avLst/>
+          </a:prstGeom>
+          <a:noFill/>
+          <a:ln>
+            <a:solidFill>
+              <a:schemeClr val="tx1"/>
+            </a:solidFill>
+          </a:ln>
+        </p:spPr>
+        <p:txBody>
+          <a:bodyPr wrap="square" rtlCol="0">
+            <a:spAutoFit/>
+          </a:bodyPr>
+          <a:lstStyle/>
+          <a:p>
+            <a:pPr algn="ctr"/>
+            <a:r>
+              <a:rPr lang="en-US" sz="2400" dirty="0" smtClean="0"/>
+              <a:t>Adult, ICU LOS &gt; 3 days</a:t>
+            </a:r>
+          </a:p>
+          <a:p>
+            <a:pPr algn="ctr"/>
+            <a:r>
+              <a:rPr lang="en-US" sz="2400" dirty="0" smtClean="0">
+                <a:solidFill>
+                  <a:schemeClr val="accent5">
+                    <a:lumMod val="75000"/>
+                  </a:schemeClr>
+                </a:solidFill>
+              </a:rPr>
+              <a:t>19,534 ICU stays</a:t>
+            </a:r>
+            <a:endParaRPr lang="en-US" sz="2400" dirty="0">
+              <a:solidFill>
+                <a:schemeClr val="accent5">
+                  <a:lumMod val="75000"/>
+                </a:schemeClr>
+              </a:solidFill>
+            </a:endParaRPr>
+          </a:p>
+        </p:txBody>
+      </p:sp>
+      <p:cxnSp>
+        <p:nvCxnSpPr>
+          <p:cNvPr id="20" name="Straight Arrow Connector 19"/>
+          <p:cNvCxnSpPr/>
+          <p:nvPr/>
+        </p:nvCxnSpPr>
+        <p:spPr>
+          <a:xfrm>
+            <a:off x="2046287" y="3130302"/>
+            <a:ext cx="0" cy="274320"/>
+          </a:xfrm>
+          <a:prstGeom prst="straightConnector1">
+            <a:avLst/>
+          </a:prstGeom>
+          <a:ln w="9525" cmpd="sng">
+            <a:solidFill>
+              <a:srgbClr val="000000"/>
+            </a:solidFill>
+            <a:tailEnd type="arrow"/>
+          </a:ln>
+          <a:effectLst/>
+        </p:spPr>
+        <p:style>
+          <a:lnRef idx="2">
+            <a:schemeClr val="accent1"/>
+          </a:lnRef>
+          <a:fillRef idx="0">
+            <a:schemeClr val="accent1"/>
+          </a:fillRef>
+          <a:effectRef idx="1">
+            <a:schemeClr val="accent1"/>
+          </a:effectRef>
+          <a:fontRef idx="minor">
+            <a:schemeClr val="tx1"/>
+          </a:fontRef>
+        </p:style>
+      </p:cxnSp>
+      <p:cxnSp>
+        <p:nvCxnSpPr>
+          <p:cNvPr id="21" name="Straight Arrow Connector 20"/>
+          <p:cNvCxnSpPr/>
+          <p:nvPr/>
+        </p:nvCxnSpPr>
+        <p:spPr>
+          <a:xfrm>
+            <a:off x="2046287" y="3248720"/>
+            <a:ext cx="2271713" cy="0"/>
+          </a:xfrm>
+          <a:prstGeom prst="straightConnector1">
+            <a:avLst/>
+          </a:prstGeom>
+          <a:ln w="9525" cmpd="sng">
+            <a:solidFill>
+              <a:srgbClr val="000000"/>
+            </a:solidFill>
+            <a:tailEnd type="arrow"/>
+          </a:ln>
+          <a:effectLst/>
+        </p:spPr>
+        <p:style>
+          <a:lnRef idx="2">
+            <a:schemeClr val="accent1"/>
+          </a:lnRef>
+          <a:fillRef idx="0">
+            <a:schemeClr val="accent1"/>
+          </a:fillRef>
+          <a:effectRef idx="1">
+            <a:schemeClr val="accent1"/>
+          </a:effectRef>
+          <a:fontRef idx="minor">
+            <a:schemeClr val="tx1"/>
+          </a:fontRef>
+        </p:style>
+      </p:cxnSp>
+      <p:sp>
+        <p:nvSpPr>
+          <p:cNvPr id="22" name="TextBox 21"/>
+          <p:cNvSpPr txBox="1"/>
+          <p:nvPr/>
+        </p:nvSpPr>
+        <p:spPr>
+          <a:xfrm>
+            <a:off x="4318000" y="3017887"/>
+            <a:ext cx="4635500" cy="830997"/>
+          </a:xfrm>
+          <a:prstGeom prst="rect">
+            <a:avLst/>
+          </a:prstGeom>
+          <a:noFill/>
+          <a:ln>
+            <a:solidFill>
+              <a:schemeClr val="tx1"/>
+            </a:solidFill>
+          </a:ln>
+        </p:spPr>
+        <p:txBody>
+          <a:bodyPr wrap="square" rtlCol="0">
+            <a:spAutoFit/>
+          </a:bodyPr>
+          <a:lstStyle/>
+          <a:p>
+            <a:pPr algn="ctr"/>
+            <a:r>
+              <a:rPr lang="en-US" sz="2400" dirty="0" smtClean="0">
+                <a:solidFill>
+                  <a:schemeClr val="accent2">
+                    <a:lumMod val="75000"/>
+                  </a:schemeClr>
+                </a:solidFill>
+              </a:rPr>
+              <a:t>Non-septic based on Angus criteria (Based on ICD9 Codes)</a:t>
+            </a:r>
+            <a:endParaRPr lang="en-US" sz="2400" dirty="0">
+              <a:solidFill>
+                <a:schemeClr val="accent2">
+                  <a:lumMod val="75000"/>
+                </a:schemeClr>
+              </a:solidFill>
+            </a:endParaRPr>
+          </a:p>
+        </p:txBody>
+      </p:sp>
+      <p:sp>
+        <p:nvSpPr>
+          <p:cNvPr id="25" name="TextBox 24"/>
+          <p:cNvSpPr txBox="1"/>
+          <p:nvPr/>
+        </p:nvSpPr>
+        <p:spPr>
+          <a:xfrm>
+            <a:off x="330199" y="3416052"/>
+            <a:ext cx="3432176" cy="830997"/>
+          </a:xfrm>
+          <a:prstGeom prst="rect">
+            <a:avLst/>
+          </a:prstGeom>
+          <a:noFill/>
+          <a:ln>
+            <a:solidFill>
+              <a:schemeClr val="tx1"/>
+            </a:solidFill>
+          </a:ln>
+        </p:spPr>
+        <p:txBody>
+          <a:bodyPr wrap="square" rtlCol="0">
+            <a:spAutoFit/>
+          </a:bodyPr>
+          <a:lstStyle/>
+          <a:p>
+            <a:pPr algn="ctr"/>
+            <a:r>
+              <a:rPr lang="en-US" sz="2400" dirty="0" smtClean="0"/>
+              <a:t>Septic</a:t>
+            </a:r>
+          </a:p>
+          <a:p>
+            <a:pPr algn="ctr"/>
+            <a:r>
+              <a:rPr lang="en-US" sz="2400" dirty="0" smtClean="0">
+                <a:solidFill>
+                  <a:schemeClr val="accent5">
+                    <a:lumMod val="75000"/>
+                  </a:schemeClr>
+                </a:solidFill>
+              </a:rPr>
+              <a:t>10,097 ICU stays</a:t>
+            </a:r>
+            <a:endParaRPr lang="en-US" sz="2400" dirty="0">
+              <a:solidFill>
+                <a:schemeClr val="accent5">
+                  <a:lumMod val="75000"/>
+                </a:schemeClr>
+              </a:solidFill>
+            </a:endParaRPr>
+          </a:p>
+        </p:txBody>
+      </p:sp>
+      <p:cxnSp>
+        <p:nvCxnSpPr>
+          <p:cNvPr id="30" name="Straight Arrow Connector 29"/>
+          <p:cNvCxnSpPr/>
+          <p:nvPr/>
+        </p:nvCxnSpPr>
+        <p:spPr>
+          <a:xfrm>
+            <a:off x="2046287" y="4255473"/>
+            <a:ext cx="0" cy="274320"/>
+          </a:xfrm>
+          <a:prstGeom prst="straightConnector1">
+            <a:avLst/>
+          </a:prstGeom>
+          <a:ln w="9525" cmpd="sng">
+            <a:solidFill>
+              <a:srgbClr val="000000"/>
+            </a:solidFill>
+            <a:tailEnd type="arrow"/>
+          </a:ln>
+          <a:effectLst/>
+        </p:spPr>
+        <p:style>
+          <a:lnRef idx="2">
+            <a:schemeClr val="accent1"/>
+          </a:lnRef>
+          <a:fillRef idx="0">
+            <a:schemeClr val="accent1"/>
+          </a:fillRef>
+          <a:effectRef idx="1">
+            <a:schemeClr val="accent1"/>
+          </a:effectRef>
+          <a:fontRef idx="minor">
+            <a:schemeClr val="tx1"/>
+          </a:fontRef>
+        </p:style>
+      </p:cxnSp>
+      <p:cxnSp>
+        <p:nvCxnSpPr>
+          <p:cNvPr id="31" name="Straight Arrow Connector 30"/>
+          <p:cNvCxnSpPr/>
+          <p:nvPr/>
+        </p:nvCxnSpPr>
+        <p:spPr>
+          <a:xfrm>
+            <a:off x="2046287" y="4358016"/>
+            <a:ext cx="2271713" cy="0"/>
+          </a:xfrm>
+          <a:prstGeom prst="straightConnector1">
+            <a:avLst/>
+          </a:prstGeom>
+          <a:ln w="9525" cmpd="sng">
+            <a:solidFill>
+              <a:srgbClr val="000000"/>
+            </a:solidFill>
+            <a:tailEnd type="arrow"/>
+          </a:ln>
+          <a:effectLst/>
+        </p:spPr>
+        <p:style>
+          <a:lnRef idx="2">
+            <a:schemeClr val="accent1"/>
+          </a:lnRef>
+          <a:fillRef idx="0">
+            <a:schemeClr val="accent1"/>
+          </a:fillRef>
+          <a:effectRef idx="1">
+            <a:schemeClr val="accent1"/>
+          </a:effectRef>
+          <a:fontRef idx="minor">
+            <a:schemeClr val="tx1"/>
+          </a:fontRef>
+        </p:style>
+      </p:cxnSp>
+      <p:sp>
+        <p:nvSpPr>
+          <p:cNvPr id="32" name="TextBox 31"/>
+          <p:cNvSpPr txBox="1"/>
+          <p:nvPr/>
+        </p:nvSpPr>
+        <p:spPr>
+          <a:xfrm>
+            <a:off x="4318000" y="4127183"/>
+            <a:ext cx="4635500" cy="830997"/>
+          </a:xfrm>
+          <a:prstGeom prst="rect">
+            <a:avLst/>
+          </a:prstGeom>
+          <a:noFill/>
+          <a:ln>
+            <a:solidFill>
+              <a:schemeClr val="tx1"/>
+            </a:solidFill>
+          </a:ln>
+        </p:spPr>
+        <p:txBody>
+          <a:bodyPr wrap="square" rtlCol="0">
+            <a:spAutoFit/>
+          </a:bodyPr>
+          <a:lstStyle/>
+          <a:p>
+            <a:pPr algn="ctr"/>
+            <a:r>
+              <a:rPr lang="en-US" sz="2400" dirty="0" smtClean="0">
+                <a:solidFill>
+                  <a:schemeClr val="accent2">
+                    <a:lumMod val="75000"/>
+                  </a:schemeClr>
+                </a:solidFill>
+              </a:rPr>
+              <a:t>Chronic Kidney Disease (CKD)</a:t>
+            </a:r>
+          </a:p>
+          <a:p>
+            <a:pPr algn="ctr"/>
+            <a:r>
+              <a:rPr lang="en-US" sz="2400" dirty="0">
+                <a:solidFill>
+                  <a:schemeClr val="accent2">
+                    <a:lumMod val="75000"/>
+                  </a:schemeClr>
+                </a:solidFill>
+              </a:rPr>
+              <a:t>(Based on ICD9 Codes)</a:t>
+            </a:r>
+            <a:endParaRPr lang="en-US" sz="2400" dirty="0">
+              <a:solidFill>
+                <a:schemeClr val="accent2">
+                  <a:lumMod val="75000"/>
+                </a:schemeClr>
+              </a:solidFill>
+            </a:endParaRPr>
+          </a:p>
+        </p:txBody>
+      </p:sp>
+      <p:sp>
+        <p:nvSpPr>
+          <p:cNvPr id="33" name="TextBox 32"/>
+          <p:cNvSpPr txBox="1"/>
+          <p:nvPr/>
+        </p:nvSpPr>
+        <p:spPr>
+          <a:xfrm>
+            <a:off x="330199" y="4541223"/>
+            <a:ext cx="3432176" cy="830997"/>
+          </a:xfrm>
+          <a:prstGeom prst="rect">
+            <a:avLst/>
+          </a:prstGeom>
+          <a:noFill/>
+          <a:ln>
+            <a:solidFill>
+              <a:schemeClr val="tx1"/>
+            </a:solidFill>
+          </a:ln>
+        </p:spPr>
+        <p:txBody>
+          <a:bodyPr wrap="square" rtlCol="0">
+            <a:spAutoFit/>
+          </a:bodyPr>
+          <a:lstStyle/>
+          <a:p>
+            <a:pPr algn="ctr"/>
+            <a:r>
+              <a:rPr lang="en-US" sz="2400" dirty="0" smtClean="0"/>
+              <a:t>No CKD</a:t>
+            </a:r>
+          </a:p>
+          <a:p>
+            <a:pPr algn="ctr"/>
+            <a:r>
+              <a:rPr lang="en-US" sz="2400" dirty="0" smtClean="0">
+                <a:solidFill>
+                  <a:schemeClr val="accent5">
+                    <a:lumMod val="75000"/>
+                  </a:schemeClr>
+                </a:solidFill>
+              </a:rPr>
+              <a:t>7,681 ICU stays</a:t>
+            </a:r>
+            <a:endParaRPr lang="en-US" sz="2400" dirty="0">
+              <a:solidFill>
+                <a:schemeClr val="accent5">
+                  <a:lumMod val="75000"/>
+                </a:schemeClr>
+              </a:solidFill>
+            </a:endParaRPr>
+          </a:p>
+        </p:txBody>
+      </p:sp>
+      <p:cxnSp>
+        <p:nvCxnSpPr>
+          <p:cNvPr id="34" name="Straight Arrow Connector 33"/>
+          <p:cNvCxnSpPr/>
+          <p:nvPr/>
+        </p:nvCxnSpPr>
+        <p:spPr>
+          <a:xfrm>
+            <a:off x="2046287" y="5382598"/>
+            <a:ext cx="0" cy="274320"/>
+          </a:xfrm>
+          <a:prstGeom prst="straightConnector1">
+            <a:avLst/>
+          </a:prstGeom>
+          <a:ln w="9525" cmpd="sng">
+            <a:solidFill>
+              <a:srgbClr val="000000"/>
+            </a:solidFill>
+            <a:tailEnd type="arrow"/>
+          </a:ln>
+          <a:effectLst/>
+        </p:spPr>
+        <p:style>
+          <a:lnRef idx="2">
+            <a:schemeClr val="accent1"/>
+          </a:lnRef>
+          <a:fillRef idx="0">
+            <a:schemeClr val="accent1"/>
+          </a:fillRef>
+          <a:effectRef idx="1">
+            <a:schemeClr val="accent1"/>
+          </a:effectRef>
+          <a:fontRef idx="minor">
+            <a:schemeClr val="tx1"/>
+          </a:fontRef>
+        </p:style>
+      </p:cxnSp>
+      <p:cxnSp>
+        <p:nvCxnSpPr>
+          <p:cNvPr id="35" name="Straight Arrow Connector 34"/>
+          <p:cNvCxnSpPr/>
+          <p:nvPr/>
+        </p:nvCxnSpPr>
+        <p:spPr>
+          <a:xfrm>
+            <a:off x="2046287" y="5501016"/>
+            <a:ext cx="2271713" cy="0"/>
+          </a:xfrm>
+          <a:prstGeom prst="straightConnector1">
+            <a:avLst/>
+          </a:prstGeom>
+          <a:ln w="9525" cmpd="sng">
+            <a:solidFill>
+              <a:srgbClr val="000000"/>
+            </a:solidFill>
+            <a:tailEnd type="arrow"/>
+          </a:ln>
+          <a:effectLst/>
+        </p:spPr>
+        <p:style>
+          <a:lnRef idx="2">
+            <a:schemeClr val="accent1"/>
+          </a:lnRef>
+          <a:fillRef idx="0">
+            <a:schemeClr val="accent1"/>
+          </a:fillRef>
+          <a:effectRef idx="1">
+            <a:schemeClr val="accent1"/>
+          </a:effectRef>
+          <a:fontRef idx="minor">
+            <a:schemeClr val="tx1"/>
+          </a:fontRef>
+        </p:style>
+      </p:cxnSp>
+      <p:sp>
+        <p:nvSpPr>
+          <p:cNvPr id="36" name="TextBox 35"/>
+          <p:cNvSpPr txBox="1"/>
+          <p:nvPr/>
+        </p:nvSpPr>
+        <p:spPr>
+          <a:xfrm>
+            <a:off x="4318000" y="5286058"/>
+            <a:ext cx="4635500" cy="830997"/>
+          </a:xfrm>
+          <a:prstGeom prst="rect">
+            <a:avLst/>
+          </a:prstGeom>
+          <a:noFill/>
+          <a:ln>
+            <a:solidFill>
+              <a:schemeClr val="tx1"/>
+            </a:solidFill>
+          </a:ln>
+        </p:spPr>
+        <p:txBody>
+          <a:bodyPr wrap="square" rtlCol="0">
+            <a:spAutoFit/>
+          </a:bodyPr>
+          <a:lstStyle/>
+          <a:p>
+            <a:pPr algn="ctr"/>
+            <a:r>
+              <a:rPr lang="en-US" sz="2400" dirty="0" smtClean="0">
+                <a:solidFill>
+                  <a:schemeClr val="accent2">
+                    <a:lumMod val="75000"/>
+                  </a:schemeClr>
+                </a:solidFill>
+              </a:rPr>
+              <a:t>Missing lactate, </a:t>
+            </a:r>
+            <a:r>
+              <a:rPr lang="en-US" sz="2400" dirty="0" err="1" smtClean="0">
+                <a:solidFill>
+                  <a:schemeClr val="accent2">
+                    <a:lumMod val="75000"/>
+                  </a:schemeClr>
+                </a:solidFill>
+              </a:rPr>
+              <a:t>creatinine</a:t>
+            </a:r>
+            <a:r>
+              <a:rPr lang="en-US" sz="2400" dirty="0" smtClean="0">
+                <a:solidFill>
+                  <a:schemeClr val="accent2">
+                    <a:lumMod val="75000"/>
+                  </a:schemeClr>
+                </a:solidFill>
+              </a:rPr>
+              <a:t>, or has admission </a:t>
+            </a:r>
+            <a:r>
+              <a:rPr lang="en-US" sz="2400" dirty="0" err="1" smtClean="0">
+                <a:solidFill>
+                  <a:schemeClr val="accent2">
+                    <a:lumMod val="75000"/>
+                  </a:schemeClr>
+                </a:solidFill>
+              </a:rPr>
+              <a:t>creatinine</a:t>
+            </a:r>
+            <a:r>
+              <a:rPr lang="en-US" sz="2400" dirty="0" smtClean="0">
+                <a:solidFill>
+                  <a:schemeClr val="accent2">
+                    <a:lumMod val="75000"/>
+                  </a:schemeClr>
+                </a:solidFill>
+              </a:rPr>
+              <a:t> &gt; 1.5 mg/</a:t>
+            </a:r>
+            <a:r>
+              <a:rPr lang="en-US" sz="2400" dirty="0" err="1" smtClean="0">
+                <a:solidFill>
+                  <a:schemeClr val="accent2">
+                    <a:lumMod val="75000"/>
+                  </a:schemeClr>
+                </a:solidFill>
+              </a:rPr>
+              <a:t>dL</a:t>
+            </a:r>
+            <a:endParaRPr lang="en-US" sz="2400" dirty="0">
+              <a:solidFill>
+                <a:schemeClr val="accent2">
+                  <a:lumMod val="75000"/>
+                </a:schemeClr>
+              </a:solidFill>
+            </a:endParaRPr>
+          </a:p>
+        </p:txBody>
+      </p:sp>
+      <p:sp>
+        <p:nvSpPr>
+          <p:cNvPr id="38" name="TextBox 37"/>
+          <p:cNvSpPr txBox="1"/>
+          <p:nvPr/>
+        </p:nvSpPr>
+        <p:spPr>
+          <a:xfrm>
+            <a:off x="330199" y="5684223"/>
+            <a:ext cx="3432176" cy="830997"/>
+          </a:xfrm>
+          <a:prstGeom prst="rect">
+            <a:avLst/>
+          </a:prstGeom>
+          <a:solidFill>
+            <a:schemeClr val="accent5">
+              <a:lumMod val="20000"/>
+              <a:lumOff val="80000"/>
+            </a:schemeClr>
+          </a:solidFill>
+          <a:ln w="38100" cmpd="sng">
+            <a:solidFill>
+              <a:schemeClr val="tx1"/>
+            </a:solidFill>
+          </a:ln>
+        </p:spPr>
+        <p:txBody>
+          <a:bodyPr wrap="square" rtlCol="0">
+            <a:spAutoFit/>
+          </a:bodyPr>
+          <a:lstStyle/>
+          <a:p>
+            <a:pPr algn="ctr"/>
+            <a:r>
+              <a:rPr lang="en-US" sz="2400" b="1" dirty="0" smtClean="0"/>
+              <a:t>Pertinent Measurements</a:t>
+            </a:r>
+          </a:p>
+          <a:p>
+            <a:pPr algn="ctr"/>
+            <a:r>
+              <a:rPr lang="en-US" sz="2400" b="1" dirty="0" smtClean="0">
+                <a:solidFill>
+                  <a:schemeClr val="accent5">
+                    <a:lumMod val="75000"/>
+                  </a:schemeClr>
+                </a:solidFill>
+              </a:rPr>
+              <a:t>4,663 ICU stays</a:t>
+            </a:r>
+            <a:endParaRPr lang="en-US" sz="2400" b="1" dirty="0">
+              <a:solidFill>
+                <a:schemeClr val="accent5">
+                  <a:lumMod val="75000"/>
+                </a:schemeClr>
+              </a:solidFill>
+            </a:endParaRPr>
           </a:p>
         </p:txBody>
       </p:sp>

</xml_diff>

<commit_message>
Make error bars larger
</commit_message>
<xml_diff>
--- a/docs/Presentation.pptx
+++ b/docs/Presentation.pptx
@@ -7062,7 +7062,7 @@
       </p:sp>
       <p:pic>
         <p:nvPicPr>
-          <p:cNvPr id="6" name="Picture 5" descr="chen_figure.png"/>
+          <p:cNvPr id="7" name="Picture 6" descr="chen_figure.png"/>
           <p:cNvPicPr>
             <a:picLocks noChangeAspect="1"/>
           </p:cNvPicPr>
@@ -7082,8 +7082,8 @@
         </p:blipFill>
         <p:spPr>
           <a:xfrm>
-            <a:off x="1261242" y="1701800"/>
-            <a:ext cx="6621517" cy="4572000"/>
+            <a:off x="1415530" y="1411288"/>
+            <a:ext cx="6312940" cy="4572000"/>
           </a:xfrm>
           <a:prstGeom prst="rect">
             <a:avLst/>
@@ -7174,8 +7174,13 @@
                   <a:srgbClr val="000000"/>
                 </a:solidFill>
               </a:rPr>
-              <a:t>Key Takeaways</a:t>
-            </a:r>
+              <a:t>Summary</a:t>
+            </a:r>
+            <a:endParaRPr lang="en-US" dirty="0" smtClean="0">
+              <a:solidFill>
+                <a:srgbClr val="000000"/>
+              </a:solidFill>
+            </a:endParaRPr>
           </a:p>
           <a:p>
             <a:r>
@@ -7227,7 +7232,7 @@
                   <a:srgbClr val="000000"/>
                 </a:solidFill>
               </a:rPr>
-              <a:t>Future Directions</a:t>
+              <a:t>Next Steps</a:t>
             </a:r>
           </a:p>
           <a:p>
@@ -8338,8 +8343,8 @@
         </p:nvSpPr>
         <p:spPr>
           <a:xfrm>
-            <a:off x="774699" y="1183243"/>
-            <a:ext cx="2543176" cy="830997"/>
+            <a:off x="330199" y="1183243"/>
+            <a:ext cx="3432176" cy="830997"/>
           </a:xfrm>
           <a:prstGeom prst="rect">
             <a:avLst/>

</xml_diff>

<commit_message>
Add in logistic regression results with categoricals
</commit_message>
<xml_diff>
--- a/docs/Presentation.pptx
+++ b/docs/Presentation.pptx
@@ -21,7 +21,7 @@
     <p:sldId id="311" r:id="rId9"/>
     <p:sldId id="308" r:id="rId10"/>
     <p:sldId id="310" r:id="rId11"/>
-    <p:sldId id="314" r:id="rId12"/>
+    <p:sldId id="317" r:id="rId12"/>
     <p:sldId id="309" r:id="rId13"/>
     <p:sldId id="315" r:id="rId14"/>
     <p:sldId id="303" r:id="rId15"/>
@@ -897,7 +897,7 @@
     </p:spTree>
     <p:extLst>
       <p:ext uri="{BB962C8B-B14F-4D97-AF65-F5344CB8AC3E}">
-        <p14:creationId xmlns:p14="http://schemas.microsoft.com/office/powerpoint/2010/main" val="3179343016"/>
+        <p14:creationId xmlns:p14="http://schemas.microsoft.com/office/powerpoint/2010/main" val="2079930134"/>
       </p:ext>
     </p:extLst>
   </p:cSld>
@@ -5260,14 +5260,14 @@
           <p:nvPr>
             <p:extLst>
               <p:ext uri="{D42A27DB-BD31-4B8C-83A1-F6EECF244321}">
-                <p14:modId xmlns:p14="http://schemas.microsoft.com/office/powerpoint/2010/main" val="4025364935"/>
+                <p14:modId xmlns:p14="http://schemas.microsoft.com/office/powerpoint/2010/main" val="1690909758"/>
               </p:ext>
             </p:extLst>
           </p:nvPr>
         </p:nvGraphicFramePr>
         <p:xfrm>
-          <a:off x="1067594" y="2492375"/>
-          <a:ext cx="7008813" cy="2966720"/>
+          <a:off x="642937" y="1206500"/>
+          <a:ext cx="7858126" cy="5191760"/>
         </p:xfrm>
         <a:graphic>
           <a:graphicData uri="http://schemas.openxmlformats.org/drawingml/2006/table">
@@ -5276,9 +5276,9 @@
                 <a:tableStyleId>{2D5ABB26-0587-4C30-8999-92F81FD0307C}</a:tableStyleId>
               </a:tblPr>
               <a:tblGrid>
-                <a:gridCol w="2921000"/>
-                <a:gridCol w="2127250"/>
-                <a:gridCol w="1960563"/>
+                <a:gridCol w="3840069"/>
+                <a:gridCol w="1819917"/>
+                <a:gridCol w="2198140"/>
               </a:tblGrid>
               <a:tr h="370840">
                 <a:tc>
@@ -5533,7 +5533,7 @@
                           <a:latin typeface="Avenir Book"/>
                           <a:cs typeface="Avenir Book"/>
                         </a:rPr>
-                        <a:t>0.000</a:t>
+                        <a:t>&lt;0.001</a:t>
                       </a:r>
                       <a:endParaRPr lang="en-US" dirty="0">
                         <a:latin typeface="Avenir Book"/>
@@ -5651,7 +5651,7 @@
                           <a:latin typeface="Avenir Book"/>
                           <a:cs typeface="Avenir Book"/>
                         </a:rPr>
-                        <a:t>Gender</a:t>
+                        <a:t>Gender: Female</a:t>
                       </a:r>
                       <a:endParaRPr lang="en-US" dirty="0">
                         <a:latin typeface="Avenir Book"/>
@@ -5709,7 +5709,7 @@
                           <a:latin typeface="Avenir Book"/>
                           <a:cs typeface="Avenir Book"/>
                         </a:rPr>
-                        <a:t>0.440</a:t>
+                        <a:t>&lt;0.001</a:t>
                       </a:r>
                       <a:endParaRPr lang="en-US" dirty="0">
                         <a:latin typeface="Avenir Book"/>
@@ -5767,7 +5767,7 @@
                           <a:latin typeface="Avenir Book"/>
                           <a:cs typeface="Avenir Book"/>
                         </a:rPr>
-                        <a:t>0.95</a:t>
+                        <a:t>1.03</a:t>
                       </a:r>
                       <a:endParaRPr lang="en-US" dirty="0">
                         <a:latin typeface="Avenir Book"/>
@@ -5827,7 +5827,166 @@
                           <a:latin typeface="Avenir Book"/>
                           <a:cs typeface="Avenir Book"/>
                         </a:rPr>
-                        <a:t>Ethnicity</a:t>
+                        <a:t>Ethnicity (ref: White)</a:t>
+                      </a:r>
+                      <a:endParaRPr lang="en-US" dirty="0">
+                        <a:latin typeface="Avenir Book"/>
+                        <a:cs typeface="Avenir Book"/>
+                      </a:endParaRPr>
+                    </a:p>
+                  </a:txBody>
+                  <a:tcPr>
+                    <a:lnL w="12700" cap="flat" cmpd="sng" algn="ctr">
+                      <a:solidFill>
+                        <a:scrgbClr r="0" g="0" b="0"/>
+                      </a:solidFill>
+                      <a:prstDash val="solid"/>
+                      <a:round/>
+                      <a:headEnd type="none" w="med" len="med"/>
+                      <a:tailEnd type="none" w="med" len="med"/>
+                    </a:lnL>
+                    <a:lnR w="12700" cap="flat" cmpd="sng" algn="ctr">
+                      <a:solidFill>
+                        <a:scrgbClr r="0" g="0" b="0"/>
+                      </a:solidFill>
+                      <a:prstDash val="solid"/>
+                      <a:round/>
+                      <a:headEnd type="none" w="med" len="med"/>
+                      <a:tailEnd type="none" w="med" len="med"/>
+                    </a:lnR>
+                    <a:lnT w="12700" cap="flat" cmpd="sng" algn="ctr">
+                      <a:solidFill>
+                        <a:scrgbClr r="0" g="0" b="0"/>
+                      </a:solidFill>
+                      <a:prstDash val="solid"/>
+                      <a:round/>
+                      <a:headEnd type="none" w="med" len="med"/>
+                      <a:tailEnd type="none" w="med" len="med"/>
+                    </a:lnT>
+                    <a:lnB w="12700" cap="flat" cmpd="sng" algn="ctr">
+                      <a:solidFill>
+                        <a:scrgbClr r="0" g="0" b="0"/>
+                      </a:solidFill>
+                      <a:prstDash val="solid"/>
+                      <a:round/>
+                      <a:headEnd type="none" w="med" len="med"/>
+                      <a:tailEnd type="none" w="med" len="med"/>
+                    </a:lnB>
+                  </a:tcPr>
+                </a:tc>
+                <a:tc>
+                  <a:txBody>
+                    <a:bodyPr/>
+                    <a:lstStyle/>
+                    <a:p>
+                      <a:pPr algn="ctr"/>
+                      <a:endParaRPr lang="en-US" dirty="0"/>
+                    </a:p>
+                  </a:txBody>
+                  <a:tcPr>
+                    <a:lnL w="12700" cap="flat" cmpd="sng" algn="ctr">
+                      <a:solidFill>
+                        <a:scrgbClr r="0" g="0" b="0"/>
+                      </a:solidFill>
+                      <a:prstDash val="solid"/>
+                      <a:round/>
+                      <a:headEnd type="none" w="med" len="med"/>
+                      <a:tailEnd type="none" w="med" len="med"/>
+                    </a:lnL>
+                    <a:lnR w="12700" cap="flat" cmpd="sng" algn="ctr">
+                      <a:solidFill>
+                        <a:scrgbClr r="0" g="0" b="0"/>
+                      </a:solidFill>
+                      <a:prstDash val="solid"/>
+                      <a:round/>
+                      <a:headEnd type="none" w="med" len="med"/>
+                      <a:tailEnd type="none" w="med" len="med"/>
+                    </a:lnR>
+                    <a:lnT w="12700" cap="flat" cmpd="sng" algn="ctr">
+                      <a:solidFill>
+                        <a:scrgbClr r="0" g="0" b="0"/>
+                      </a:solidFill>
+                      <a:prstDash val="solid"/>
+                      <a:round/>
+                      <a:headEnd type="none" w="med" len="med"/>
+                      <a:tailEnd type="none" w="med" len="med"/>
+                    </a:lnT>
+                    <a:lnB w="12700" cap="flat" cmpd="sng" algn="ctr">
+                      <a:solidFill>
+                        <a:scrgbClr r="0" g="0" b="0"/>
+                      </a:solidFill>
+                      <a:prstDash val="solid"/>
+                      <a:round/>
+                      <a:headEnd type="none" w="med" len="med"/>
+                      <a:tailEnd type="none" w="med" len="med"/>
+                    </a:lnB>
+                  </a:tcPr>
+                </a:tc>
+                <a:tc>
+                  <a:txBody>
+                    <a:bodyPr/>
+                    <a:lstStyle/>
+                    <a:p>
+                      <a:pPr algn="ctr"/>
+                      <a:endParaRPr lang="en-US" dirty="0">
+                        <a:latin typeface="Avenir Book"/>
+                        <a:cs typeface="Avenir Book"/>
+                      </a:endParaRPr>
+                    </a:p>
+                  </a:txBody>
+                  <a:tcPr>
+                    <a:lnL w="12700" cap="flat" cmpd="sng" algn="ctr">
+                      <a:solidFill>
+                        <a:scrgbClr r="0" g="0" b="0"/>
+                      </a:solidFill>
+                      <a:prstDash val="solid"/>
+                      <a:round/>
+                      <a:headEnd type="none" w="med" len="med"/>
+                      <a:tailEnd type="none" w="med" len="med"/>
+                    </a:lnL>
+                    <a:lnR w="12700" cap="flat" cmpd="sng" algn="ctr">
+                      <a:solidFill>
+                        <a:scrgbClr r="0" g="0" b="0"/>
+                      </a:solidFill>
+                      <a:prstDash val="solid"/>
+                      <a:round/>
+                      <a:headEnd type="none" w="med" len="med"/>
+                      <a:tailEnd type="none" w="med" len="med"/>
+                    </a:lnR>
+                    <a:lnT w="12700" cap="flat" cmpd="sng" algn="ctr">
+                      <a:solidFill>
+                        <a:scrgbClr r="0" g="0" b="0"/>
+                      </a:solidFill>
+                      <a:prstDash val="solid"/>
+                      <a:round/>
+                      <a:headEnd type="none" w="med" len="med"/>
+                      <a:tailEnd type="none" w="med" len="med"/>
+                    </a:lnT>
+                    <a:lnB w="12700" cap="flat" cmpd="sng" algn="ctr">
+                      <a:solidFill>
+                        <a:scrgbClr r="0" g="0" b="0"/>
+                      </a:solidFill>
+                      <a:prstDash val="solid"/>
+                      <a:round/>
+                      <a:headEnd type="none" w="med" len="med"/>
+                      <a:tailEnd type="none" w="med" len="med"/>
+                    </a:lnB>
+                  </a:tcPr>
+                </a:tc>
+              </a:tr>
+              <a:tr h="370840">
+                <a:tc>
+                  <a:txBody>
+                    <a:bodyPr/>
+                    <a:lstStyle/>
+                    <a:p>
+                      <a:pPr marL="460375" indent="0" algn="l"/>
+                      <a:r>
+                        <a:rPr lang="en-US" dirty="0" smtClean="0">
+                          <a:latin typeface="Avenir Book"/>
+                          <a:cs typeface="Avenir Book"/>
+                        </a:rPr>
+                        <a:t>American Indian/Alaska Native</a:t>
                       </a:r>
                       <a:endParaRPr lang="en-US" dirty="0">
                         <a:latin typeface="Avenir Book"/>
@@ -5885,7 +6044,7 @@
                           <a:latin typeface="Avenir Book"/>
                           <a:cs typeface="Avenir Book"/>
                         </a:rPr>
-                        <a:t>0.000</a:t>
+                        <a:t>0.686</a:t>
                       </a:r>
                       <a:endParaRPr lang="en-US" dirty="0">
                         <a:latin typeface="Avenir Book"/>
@@ -5943,7 +6102,887 @@
                           <a:latin typeface="Avenir Book"/>
                           <a:cs typeface="Avenir Book"/>
                         </a:rPr>
-                        <a:t>1.09</a:t>
+                        <a:t>0.55</a:t>
+                      </a:r>
+                      <a:endParaRPr lang="en-US" dirty="0">
+                        <a:latin typeface="Avenir Book"/>
+                        <a:cs typeface="Avenir Book"/>
+                      </a:endParaRPr>
+                    </a:p>
+                  </a:txBody>
+                  <a:tcPr>
+                    <a:lnL w="12700" cap="flat" cmpd="sng" algn="ctr">
+                      <a:solidFill>
+                        <a:scrgbClr r="0" g="0" b="0"/>
+                      </a:solidFill>
+                      <a:prstDash val="solid"/>
+                      <a:round/>
+                      <a:headEnd type="none" w="med" len="med"/>
+                      <a:tailEnd type="none" w="med" len="med"/>
+                    </a:lnL>
+                    <a:lnR w="12700" cap="flat" cmpd="sng" algn="ctr">
+                      <a:solidFill>
+                        <a:scrgbClr r="0" g="0" b="0"/>
+                      </a:solidFill>
+                      <a:prstDash val="solid"/>
+                      <a:round/>
+                      <a:headEnd type="none" w="med" len="med"/>
+                      <a:tailEnd type="none" w="med" len="med"/>
+                    </a:lnR>
+                    <a:lnT w="12700" cap="flat" cmpd="sng" algn="ctr">
+                      <a:solidFill>
+                        <a:scrgbClr r="0" g="0" b="0"/>
+                      </a:solidFill>
+                      <a:prstDash val="solid"/>
+                      <a:round/>
+                      <a:headEnd type="none" w="med" len="med"/>
+                      <a:tailEnd type="none" w="med" len="med"/>
+                    </a:lnT>
+                    <a:lnB w="12700" cap="flat" cmpd="sng" algn="ctr">
+                      <a:solidFill>
+                        <a:scrgbClr r="0" g="0" b="0"/>
+                      </a:solidFill>
+                      <a:prstDash val="solid"/>
+                      <a:round/>
+                      <a:headEnd type="none" w="med" len="med"/>
+                      <a:tailEnd type="none" w="med" len="med"/>
+                    </a:lnB>
+                  </a:tcPr>
+                </a:tc>
+              </a:tr>
+              <a:tr h="370840">
+                <a:tc>
+                  <a:txBody>
+                    <a:bodyPr/>
+                    <a:lstStyle/>
+                    <a:p>
+                      <a:pPr marL="460375" indent="0" algn="l"/>
+                      <a:r>
+                        <a:rPr lang="en-US" dirty="0" smtClean="0">
+                          <a:latin typeface="Avenir Book"/>
+                          <a:cs typeface="Avenir Book"/>
+                        </a:rPr>
+                        <a:t>Asian</a:t>
+                      </a:r>
+                      <a:endParaRPr lang="en-US" dirty="0">
+                        <a:latin typeface="Avenir Book"/>
+                        <a:cs typeface="Avenir Book"/>
+                      </a:endParaRPr>
+                    </a:p>
+                  </a:txBody>
+                  <a:tcPr>
+                    <a:lnL w="12700" cap="flat" cmpd="sng" algn="ctr">
+                      <a:solidFill>
+                        <a:scrgbClr r="0" g="0" b="0"/>
+                      </a:solidFill>
+                      <a:prstDash val="solid"/>
+                      <a:round/>
+                      <a:headEnd type="none" w="med" len="med"/>
+                      <a:tailEnd type="none" w="med" len="med"/>
+                    </a:lnL>
+                    <a:lnR w="12700" cap="flat" cmpd="sng" algn="ctr">
+                      <a:solidFill>
+                        <a:scrgbClr r="0" g="0" b="0"/>
+                      </a:solidFill>
+                      <a:prstDash val="solid"/>
+                      <a:round/>
+                      <a:headEnd type="none" w="med" len="med"/>
+                      <a:tailEnd type="none" w="med" len="med"/>
+                    </a:lnR>
+                    <a:lnT w="12700" cap="flat" cmpd="sng" algn="ctr">
+                      <a:solidFill>
+                        <a:scrgbClr r="0" g="0" b="0"/>
+                      </a:solidFill>
+                      <a:prstDash val="solid"/>
+                      <a:round/>
+                      <a:headEnd type="none" w="med" len="med"/>
+                      <a:tailEnd type="none" w="med" len="med"/>
+                    </a:lnT>
+                    <a:lnB w="12700" cap="flat" cmpd="sng" algn="ctr">
+                      <a:solidFill>
+                        <a:scrgbClr r="0" g="0" b="0"/>
+                      </a:solidFill>
+                      <a:prstDash val="solid"/>
+                      <a:round/>
+                      <a:headEnd type="none" w="med" len="med"/>
+                      <a:tailEnd type="none" w="med" len="med"/>
+                    </a:lnB>
+                  </a:tcPr>
+                </a:tc>
+                <a:tc>
+                  <a:txBody>
+                    <a:bodyPr/>
+                    <a:lstStyle/>
+                    <a:p>
+                      <a:pPr algn="ctr"/>
+                      <a:r>
+                        <a:rPr lang="en-US" dirty="0" smtClean="0">
+                          <a:latin typeface="Avenir Book"/>
+                          <a:cs typeface="Avenir Book"/>
+                        </a:rPr>
+                        <a:t>&lt;0.001</a:t>
+                      </a:r>
+                      <a:endParaRPr lang="en-US" dirty="0">
+                        <a:latin typeface="Avenir Book"/>
+                        <a:cs typeface="Avenir Book"/>
+                      </a:endParaRPr>
+                    </a:p>
+                  </a:txBody>
+                  <a:tcPr>
+                    <a:lnL w="12700" cap="flat" cmpd="sng" algn="ctr">
+                      <a:solidFill>
+                        <a:scrgbClr r="0" g="0" b="0"/>
+                      </a:solidFill>
+                      <a:prstDash val="solid"/>
+                      <a:round/>
+                      <a:headEnd type="none" w="med" len="med"/>
+                      <a:tailEnd type="none" w="med" len="med"/>
+                    </a:lnL>
+                    <a:lnR w="12700" cap="flat" cmpd="sng" algn="ctr">
+                      <a:solidFill>
+                        <a:scrgbClr r="0" g="0" b="0"/>
+                      </a:solidFill>
+                      <a:prstDash val="solid"/>
+                      <a:round/>
+                      <a:headEnd type="none" w="med" len="med"/>
+                      <a:tailEnd type="none" w="med" len="med"/>
+                    </a:lnR>
+                    <a:lnT w="12700" cap="flat" cmpd="sng" algn="ctr">
+                      <a:solidFill>
+                        <a:scrgbClr r="0" g="0" b="0"/>
+                      </a:solidFill>
+                      <a:prstDash val="solid"/>
+                      <a:round/>
+                      <a:headEnd type="none" w="med" len="med"/>
+                      <a:tailEnd type="none" w="med" len="med"/>
+                    </a:lnT>
+                    <a:lnB w="12700" cap="flat" cmpd="sng" algn="ctr">
+                      <a:solidFill>
+                        <a:scrgbClr r="0" g="0" b="0"/>
+                      </a:solidFill>
+                      <a:prstDash val="solid"/>
+                      <a:round/>
+                      <a:headEnd type="none" w="med" len="med"/>
+                      <a:tailEnd type="none" w="med" len="med"/>
+                    </a:lnB>
+                  </a:tcPr>
+                </a:tc>
+                <a:tc>
+                  <a:txBody>
+                    <a:bodyPr/>
+                    <a:lstStyle/>
+                    <a:p>
+                      <a:pPr algn="ctr"/>
+                      <a:r>
+                        <a:rPr lang="en-US" dirty="0" smtClean="0">
+                          <a:latin typeface="Avenir Book"/>
+                          <a:cs typeface="Avenir Book"/>
+                        </a:rPr>
+                        <a:t>0.38</a:t>
+                      </a:r>
+                      <a:endParaRPr lang="en-US" dirty="0">
+                        <a:latin typeface="Avenir Book"/>
+                        <a:cs typeface="Avenir Book"/>
+                      </a:endParaRPr>
+                    </a:p>
+                  </a:txBody>
+                  <a:tcPr>
+                    <a:lnL w="12700" cap="flat" cmpd="sng" algn="ctr">
+                      <a:solidFill>
+                        <a:scrgbClr r="0" g="0" b="0"/>
+                      </a:solidFill>
+                      <a:prstDash val="solid"/>
+                      <a:round/>
+                      <a:headEnd type="none" w="med" len="med"/>
+                      <a:tailEnd type="none" w="med" len="med"/>
+                    </a:lnL>
+                    <a:lnR w="12700" cap="flat" cmpd="sng" algn="ctr">
+                      <a:solidFill>
+                        <a:scrgbClr r="0" g="0" b="0"/>
+                      </a:solidFill>
+                      <a:prstDash val="solid"/>
+                      <a:round/>
+                      <a:headEnd type="none" w="med" len="med"/>
+                      <a:tailEnd type="none" w="med" len="med"/>
+                    </a:lnR>
+                    <a:lnT w="12700" cap="flat" cmpd="sng" algn="ctr">
+                      <a:solidFill>
+                        <a:scrgbClr r="0" g="0" b="0"/>
+                      </a:solidFill>
+                      <a:prstDash val="solid"/>
+                      <a:round/>
+                      <a:headEnd type="none" w="med" len="med"/>
+                      <a:tailEnd type="none" w="med" len="med"/>
+                    </a:lnT>
+                    <a:lnB w="12700" cap="flat" cmpd="sng" algn="ctr">
+                      <a:solidFill>
+                        <a:scrgbClr r="0" g="0" b="0"/>
+                      </a:solidFill>
+                      <a:prstDash val="solid"/>
+                      <a:round/>
+                      <a:headEnd type="none" w="med" len="med"/>
+                      <a:tailEnd type="none" w="med" len="med"/>
+                    </a:lnB>
+                  </a:tcPr>
+                </a:tc>
+              </a:tr>
+              <a:tr h="370840">
+                <a:tc>
+                  <a:txBody>
+                    <a:bodyPr/>
+                    <a:lstStyle/>
+                    <a:p>
+                      <a:pPr marL="460375" indent="0" algn="l"/>
+                      <a:r>
+                        <a:rPr lang="en-US" dirty="0" smtClean="0">
+                          <a:latin typeface="Avenir Book"/>
+                          <a:cs typeface="Avenir Book"/>
+                        </a:rPr>
+                        <a:t>Black/African American</a:t>
+                      </a:r>
+                      <a:endParaRPr lang="en-US" dirty="0">
+                        <a:latin typeface="Avenir Book"/>
+                        <a:cs typeface="Avenir Book"/>
+                      </a:endParaRPr>
+                    </a:p>
+                  </a:txBody>
+                  <a:tcPr>
+                    <a:lnL w="12700" cap="flat" cmpd="sng" algn="ctr">
+                      <a:solidFill>
+                        <a:scrgbClr r="0" g="0" b="0"/>
+                      </a:solidFill>
+                      <a:prstDash val="solid"/>
+                      <a:round/>
+                      <a:headEnd type="none" w="med" len="med"/>
+                      <a:tailEnd type="none" w="med" len="med"/>
+                    </a:lnL>
+                    <a:lnR w="12700" cap="flat" cmpd="sng" algn="ctr">
+                      <a:solidFill>
+                        <a:scrgbClr r="0" g="0" b="0"/>
+                      </a:solidFill>
+                      <a:prstDash val="solid"/>
+                      <a:round/>
+                      <a:headEnd type="none" w="med" len="med"/>
+                      <a:tailEnd type="none" w="med" len="med"/>
+                    </a:lnR>
+                    <a:lnT w="12700" cap="flat" cmpd="sng" algn="ctr">
+                      <a:solidFill>
+                        <a:scrgbClr r="0" g="0" b="0"/>
+                      </a:solidFill>
+                      <a:prstDash val="solid"/>
+                      <a:round/>
+                      <a:headEnd type="none" w="med" len="med"/>
+                      <a:tailEnd type="none" w="med" len="med"/>
+                    </a:lnT>
+                    <a:lnB w="12700" cap="flat" cmpd="sng" algn="ctr">
+                      <a:solidFill>
+                        <a:scrgbClr r="0" g="0" b="0"/>
+                      </a:solidFill>
+                      <a:prstDash val="solid"/>
+                      <a:round/>
+                      <a:headEnd type="none" w="med" len="med"/>
+                      <a:tailEnd type="none" w="med" len="med"/>
+                    </a:lnB>
+                  </a:tcPr>
+                </a:tc>
+                <a:tc>
+                  <a:txBody>
+                    <a:bodyPr/>
+                    <a:lstStyle/>
+                    <a:p>
+                      <a:pPr algn="ctr"/>
+                      <a:r>
+                        <a:rPr lang="en-US" dirty="0" smtClean="0">
+                          <a:latin typeface="Avenir Book"/>
+                          <a:cs typeface="Avenir Book"/>
+                        </a:rPr>
+                        <a:t>0.841</a:t>
+                      </a:r>
+                      <a:endParaRPr lang="en-US" dirty="0">
+                        <a:latin typeface="Avenir Book"/>
+                        <a:cs typeface="Avenir Book"/>
+                      </a:endParaRPr>
+                    </a:p>
+                  </a:txBody>
+                  <a:tcPr>
+                    <a:lnL w="12700" cap="flat" cmpd="sng" algn="ctr">
+                      <a:solidFill>
+                        <a:scrgbClr r="0" g="0" b="0"/>
+                      </a:solidFill>
+                      <a:prstDash val="solid"/>
+                      <a:round/>
+                      <a:headEnd type="none" w="med" len="med"/>
+                      <a:tailEnd type="none" w="med" len="med"/>
+                    </a:lnL>
+                    <a:lnR w="12700" cap="flat" cmpd="sng" algn="ctr">
+                      <a:solidFill>
+                        <a:scrgbClr r="0" g="0" b="0"/>
+                      </a:solidFill>
+                      <a:prstDash val="solid"/>
+                      <a:round/>
+                      <a:headEnd type="none" w="med" len="med"/>
+                      <a:tailEnd type="none" w="med" len="med"/>
+                    </a:lnR>
+                    <a:lnT w="12700" cap="flat" cmpd="sng" algn="ctr">
+                      <a:solidFill>
+                        <a:scrgbClr r="0" g="0" b="0"/>
+                      </a:solidFill>
+                      <a:prstDash val="solid"/>
+                      <a:round/>
+                      <a:headEnd type="none" w="med" len="med"/>
+                      <a:tailEnd type="none" w="med" len="med"/>
+                    </a:lnT>
+                    <a:lnB w="12700" cap="flat" cmpd="sng" algn="ctr">
+                      <a:solidFill>
+                        <a:scrgbClr r="0" g="0" b="0"/>
+                      </a:solidFill>
+                      <a:prstDash val="solid"/>
+                      <a:round/>
+                      <a:headEnd type="none" w="med" len="med"/>
+                      <a:tailEnd type="none" w="med" len="med"/>
+                    </a:lnB>
+                  </a:tcPr>
+                </a:tc>
+                <a:tc>
+                  <a:txBody>
+                    <a:bodyPr/>
+                    <a:lstStyle/>
+                    <a:p>
+                      <a:pPr algn="ctr"/>
+                      <a:r>
+                        <a:rPr lang="en-US" dirty="0" smtClean="0">
+                          <a:latin typeface="Avenir Book"/>
+                          <a:cs typeface="Avenir Book"/>
+                        </a:rPr>
+                        <a:t>0.97</a:t>
+                      </a:r>
+                      <a:endParaRPr lang="en-US" dirty="0">
+                        <a:latin typeface="Avenir Book"/>
+                        <a:cs typeface="Avenir Book"/>
+                      </a:endParaRPr>
+                    </a:p>
+                  </a:txBody>
+                  <a:tcPr>
+                    <a:lnL w="12700" cap="flat" cmpd="sng" algn="ctr">
+                      <a:solidFill>
+                        <a:scrgbClr r="0" g="0" b="0"/>
+                      </a:solidFill>
+                      <a:prstDash val="solid"/>
+                      <a:round/>
+                      <a:headEnd type="none" w="med" len="med"/>
+                      <a:tailEnd type="none" w="med" len="med"/>
+                    </a:lnL>
+                    <a:lnR w="12700" cap="flat" cmpd="sng" algn="ctr">
+                      <a:solidFill>
+                        <a:scrgbClr r="0" g="0" b="0"/>
+                      </a:solidFill>
+                      <a:prstDash val="solid"/>
+                      <a:round/>
+                      <a:headEnd type="none" w="med" len="med"/>
+                      <a:tailEnd type="none" w="med" len="med"/>
+                    </a:lnR>
+                    <a:lnT w="12700" cap="flat" cmpd="sng" algn="ctr">
+                      <a:solidFill>
+                        <a:scrgbClr r="0" g="0" b="0"/>
+                      </a:solidFill>
+                      <a:prstDash val="solid"/>
+                      <a:round/>
+                      <a:headEnd type="none" w="med" len="med"/>
+                      <a:tailEnd type="none" w="med" len="med"/>
+                    </a:lnT>
+                    <a:lnB w="12700" cap="flat" cmpd="sng" algn="ctr">
+                      <a:solidFill>
+                        <a:scrgbClr r="0" g="0" b="0"/>
+                      </a:solidFill>
+                      <a:prstDash val="solid"/>
+                      <a:round/>
+                      <a:headEnd type="none" w="med" len="med"/>
+                      <a:tailEnd type="none" w="med" len="med"/>
+                    </a:lnB>
+                  </a:tcPr>
+                </a:tc>
+              </a:tr>
+              <a:tr h="370840">
+                <a:tc>
+                  <a:txBody>
+                    <a:bodyPr/>
+                    <a:lstStyle/>
+                    <a:p>
+                      <a:pPr marL="460375" indent="0" algn="l"/>
+                      <a:r>
+                        <a:rPr lang="en-US" dirty="0" smtClean="0">
+                          <a:latin typeface="Avenir Book"/>
+                          <a:cs typeface="Avenir Book"/>
+                        </a:rPr>
+                        <a:t>Hispanic/Latino</a:t>
+                      </a:r>
+                      <a:endParaRPr lang="en-US" dirty="0">
+                        <a:latin typeface="Avenir Book"/>
+                        <a:cs typeface="Avenir Book"/>
+                      </a:endParaRPr>
+                    </a:p>
+                  </a:txBody>
+                  <a:tcPr>
+                    <a:lnL w="12700" cap="flat" cmpd="sng" algn="ctr">
+                      <a:solidFill>
+                        <a:scrgbClr r="0" g="0" b="0"/>
+                      </a:solidFill>
+                      <a:prstDash val="solid"/>
+                      <a:round/>
+                      <a:headEnd type="none" w="med" len="med"/>
+                      <a:tailEnd type="none" w="med" len="med"/>
+                    </a:lnL>
+                    <a:lnR w="12700" cap="flat" cmpd="sng" algn="ctr">
+                      <a:solidFill>
+                        <a:scrgbClr r="0" g="0" b="0"/>
+                      </a:solidFill>
+                      <a:prstDash val="solid"/>
+                      <a:round/>
+                      <a:headEnd type="none" w="med" len="med"/>
+                      <a:tailEnd type="none" w="med" len="med"/>
+                    </a:lnR>
+                    <a:lnT w="12700" cap="flat" cmpd="sng" algn="ctr">
+                      <a:solidFill>
+                        <a:scrgbClr r="0" g="0" b="0"/>
+                      </a:solidFill>
+                      <a:prstDash val="solid"/>
+                      <a:round/>
+                      <a:headEnd type="none" w="med" len="med"/>
+                      <a:tailEnd type="none" w="med" len="med"/>
+                    </a:lnT>
+                    <a:lnB w="12700" cap="flat" cmpd="sng" algn="ctr">
+                      <a:solidFill>
+                        <a:scrgbClr r="0" g="0" b="0"/>
+                      </a:solidFill>
+                      <a:prstDash val="solid"/>
+                      <a:round/>
+                      <a:headEnd type="none" w="med" len="med"/>
+                      <a:tailEnd type="none" w="med" len="med"/>
+                    </a:lnB>
+                  </a:tcPr>
+                </a:tc>
+                <a:tc>
+                  <a:txBody>
+                    <a:bodyPr/>
+                    <a:lstStyle/>
+                    <a:p>
+                      <a:pPr algn="ctr"/>
+                      <a:r>
+                        <a:rPr lang="en-US" dirty="0" smtClean="0">
+                          <a:latin typeface="Avenir Book"/>
+                          <a:cs typeface="Avenir Book"/>
+                        </a:rPr>
+                        <a:t>0.037</a:t>
+                      </a:r>
+                      <a:endParaRPr lang="en-US" dirty="0">
+                        <a:latin typeface="Avenir Book"/>
+                        <a:cs typeface="Avenir Book"/>
+                      </a:endParaRPr>
+                    </a:p>
+                  </a:txBody>
+                  <a:tcPr>
+                    <a:lnL w="12700" cap="flat" cmpd="sng" algn="ctr">
+                      <a:solidFill>
+                        <a:scrgbClr r="0" g="0" b="0"/>
+                      </a:solidFill>
+                      <a:prstDash val="solid"/>
+                      <a:round/>
+                      <a:headEnd type="none" w="med" len="med"/>
+                      <a:tailEnd type="none" w="med" len="med"/>
+                    </a:lnL>
+                    <a:lnR w="12700" cap="flat" cmpd="sng" algn="ctr">
+                      <a:solidFill>
+                        <a:scrgbClr r="0" g="0" b="0"/>
+                      </a:solidFill>
+                      <a:prstDash val="solid"/>
+                      <a:round/>
+                      <a:headEnd type="none" w="med" len="med"/>
+                      <a:tailEnd type="none" w="med" len="med"/>
+                    </a:lnR>
+                    <a:lnT w="12700" cap="flat" cmpd="sng" algn="ctr">
+                      <a:solidFill>
+                        <a:scrgbClr r="0" g="0" b="0"/>
+                      </a:solidFill>
+                      <a:prstDash val="solid"/>
+                      <a:round/>
+                      <a:headEnd type="none" w="med" len="med"/>
+                      <a:tailEnd type="none" w="med" len="med"/>
+                    </a:lnT>
+                    <a:lnB w="12700" cap="flat" cmpd="sng" algn="ctr">
+                      <a:solidFill>
+                        <a:scrgbClr r="0" g="0" b="0"/>
+                      </a:solidFill>
+                      <a:prstDash val="solid"/>
+                      <a:round/>
+                      <a:headEnd type="none" w="med" len="med"/>
+                      <a:tailEnd type="none" w="med" len="med"/>
+                    </a:lnB>
+                  </a:tcPr>
+                </a:tc>
+                <a:tc>
+                  <a:txBody>
+                    <a:bodyPr/>
+                    <a:lstStyle/>
+                    <a:p>
+                      <a:pPr algn="ctr"/>
+                      <a:r>
+                        <a:rPr lang="en-US" dirty="0" smtClean="0">
+                          <a:latin typeface="Avenir Book"/>
+                          <a:cs typeface="Avenir Book"/>
+                        </a:rPr>
+                        <a:t>0.69</a:t>
+                      </a:r>
+                      <a:endParaRPr lang="en-US" dirty="0">
+                        <a:latin typeface="Avenir Book"/>
+                        <a:cs typeface="Avenir Book"/>
+                      </a:endParaRPr>
+                    </a:p>
+                  </a:txBody>
+                  <a:tcPr>
+                    <a:lnL w="12700" cap="flat" cmpd="sng" algn="ctr">
+                      <a:solidFill>
+                        <a:scrgbClr r="0" g="0" b="0"/>
+                      </a:solidFill>
+                      <a:prstDash val="solid"/>
+                      <a:round/>
+                      <a:headEnd type="none" w="med" len="med"/>
+                      <a:tailEnd type="none" w="med" len="med"/>
+                    </a:lnL>
+                    <a:lnR w="12700" cap="flat" cmpd="sng" algn="ctr">
+                      <a:solidFill>
+                        <a:scrgbClr r="0" g="0" b="0"/>
+                      </a:solidFill>
+                      <a:prstDash val="solid"/>
+                      <a:round/>
+                      <a:headEnd type="none" w="med" len="med"/>
+                      <a:tailEnd type="none" w="med" len="med"/>
+                    </a:lnR>
+                    <a:lnT w="12700" cap="flat" cmpd="sng" algn="ctr">
+                      <a:solidFill>
+                        <a:scrgbClr r="0" g="0" b="0"/>
+                      </a:solidFill>
+                      <a:prstDash val="solid"/>
+                      <a:round/>
+                      <a:headEnd type="none" w="med" len="med"/>
+                      <a:tailEnd type="none" w="med" len="med"/>
+                    </a:lnT>
+                    <a:lnB w="12700" cap="flat" cmpd="sng" algn="ctr">
+                      <a:solidFill>
+                        <a:scrgbClr r="0" g="0" b="0"/>
+                      </a:solidFill>
+                      <a:prstDash val="solid"/>
+                      <a:round/>
+                      <a:headEnd type="none" w="med" len="med"/>
+                      <a:tailEnd type="none" w="med" len="med"/>
+                    </a:lnB>
+                  </a:tcPr>
+                </a:tc>
+              </a:tr>
+              <a:tr h="370840">
+                <a:tc>
+                  <a:txBody>
+                    <a:bodyPr/>
+                    <a:lstStyle/>
+                    <a:p>
+                      <a:pPr marL="460375" indent="0" algn="l"/>
+                      <a:r>
+                        <a:rPr lang="en-US" dirty="0" smtClean="0">
+                          <a:latin typeface="Avenir Book"/>
+                          <a:cs typeface="Avenir Book"/>
+                        </a:rPr>
+                        <a:t>Multi/Other</a:t>
+                      </a:r>
+                      <a:endParaRPr lang="en-US" dirty="0">
+                        <a:latin typeface="Avenir Book"/>
+                        <a:cs typeface="Avenir Book"/>
+                      </a:endParaRPr>
+                    </a:p>
+                  </a:txBody>
+                  <a:tcPr>
+                    <a:lnL w="12700" cap="flat" cmpd="sng" algn="ctr">
+                      <a:solidFill>
+                        <a:scrgbClr r="0" g="0" b="0"/>
+                      </a:solidFill>
+                      <a:prstDash val="solid"/>
+                      <a:round/>
+                      <a:headEnd type="none" w="med" len="med"/>
+                      <a:tailEnd type="none" w="med" len="med"/>
+                    </a:lnL>
+                    <a:lnR w="12700" cap="flat" cmpd="sng" algn="ctr">
+                      <a:solidFill>
+                        <a:scrgbClr r="0" g="0" b="0"/>
+                      </a:solidFill>
+                      <a:prstDash val="solid"/>
+                      <a:round/>
+                      <a:headEnd type="none" w="med" len="med"/>
+                      <a:tailEnd type="none" w="med" len="med"/>
+                    </a:lnR>
+                    <a:lnT w="12700" cap="flat" cmpd="sng" algn="ctr">
+                      <a:solidFill>
+                        <a:scrgbClr r="0" g="0" b="0"/>
+                      </a:solidFill>
+                      <a:prstDash val="solid"/>
+                      <a:round/>
+                      <a:headEnd type="none" w="med" len="med"/>
+                      <a:tailEnd type="none" w="med" len="med"/>
+                    </a:lnT>
+                    <a:lnB w="12700" cap="flat" cmpd="sng" algn="ctr">
+                      <a:solidFill>
+                        <a:scrgbClr r="0" g="0" b="0"/>
+                      </a:solidFill>
+                      <a:prstDash val="solid"/>
+                      <a:round/>
+                      <a:headEnd type="none" w="med" len="med"/>
+                      <a:tailEnd type="none" w="med" len="med"/>
+                    </a:lnB>
+                  </a:tcPr>
+                </a:tc>
+                <a:tc>
+                  <a:txBody>
+                    <a:bodyPr/>
+                    <a:lstStyle/>
+                    <a:p>
+                      <a:pPr algn="ctr"/>
+                      <a:r>
+                        <a:rPr lang="en-US" dirty="0" smtClean="0">
+                          <a:latin typeface="Avenir Book"/>
+                          <a:cs typeface="Avenir Book"/>
+                        </a:rPr>
+                        <a:t>0.152</a:t>
+                      </a:r>
+                      <a:endParaRPr lang="en-US" dirty="0">
+                        <a:latin typeface="Avenir Book"/>
+                        <a:cs typeface="Avenir Book"/>
+                      </a:endParaRPr>
+                    </a:p>
+                  </a:txBody>
+                  <a:tcPr>
+                    <a:lnL w="12700" cap="flat" cmpd="sng" algn="ctr">
+                      <a:solidFill>
+                        <a:scrgbClr r="0" g="0" b="0"/>
+                      </a:solidFill>
+                      <a:prstDash val="solid"/>
+                      <a:round/>
+                      <a:headEnd type="none" w="med" len="med"/>
+                      <a:tailEnd type="none" w="med" len="med"/>
+                    </a:lnL>
+                    <a:lnR w="12700" cap="flat" cmpd="sng" algn="ctr">
+                      <a:solidFill>
+                        <a:scrgbClr r="0" g="0" b="0"/>
+                      </a:solidFill>
+                      <a:prstDash val="solid"/>
+                      <a:round/>
+                      <a:headEnd type="none" w="med" len="med"/>
+                      <a:tailEnd type="none" w="med" len="med"/>
+                    </a:lnR>
+                    <a:lnT w="12700" cap="flat" cmpd="sng" algn="ctr">
+                      <a:solidFill>
+                        <a:scrgbClr r="0" g="0" b="0"/>
+                      </a:solidFill>
+                      <a:prstDash val="solid"/>
+                      <a:round/>
+                      <a:headEnd type="none" w="med" len="med"/>
+                      <a:tailEnd type="none" w="med" len="med"/>
+                    </a:lnT>
+                    <a:lnB w="12700" cap="flat" cmpd="sng" algn="ctr">
+                      <a:solidFill>
+                        <a:scrgbClr r="0" g="0" b="0"/>
+                      </a:solidFill>
+                      <a:prstDash val="solid"/>
+                      <a:round/>
+                      <a:headEnd type="none" w="med" len="med"/>
+                      <a:tailEnd type="none" w="med" len="med"/>
+                    </a:lnB>
+                  </a:tcPr>
+                </a:tc>
+                <a:tc>
+                  <a:txBody>
+                    <a:bodyPr/>
+                    <a:lstStyle/>
+                    <a:p>
+                      <a:pPr algn="ctr"/>
+                      <a:r>
+                        <a:rPr lang="en-US" dirty="0" smtClean="0">
+                          <a:latin typeface="Avenir Book"/>
+                          <a:cs typeface="Avenir Book"/>
+                        </a:rPr>
+                        <a:t>0.75</a:t>
+                      </a:r>
+                      <a:endParaRPr lang="en-US" dirty="0">
+                        <a:latin typeface="Avenir Book"/>
+                        <a:cs typeface="Avenir Book"/>
+                      </a:endParaRPr>
+                    </a:p>
+                  </a:txBody>
+                  <a:tcPr>
+                    <a:lnL w="12700" cap="flat" cmpd="sng" algn="ctr">
+                      <a:solidFill>
+                        <a:scrgbClr r="0" g="0" b="0"/>
+                      </a:solidFill>
+                      <a:prstDash val="solid"/>
+                      <a:round/>
+                      <a:headEnd type="none" w="med" len="med"/>
+                      <a:tailEnd type="none" w="med" len="med"/>
+                    </a:lnL>
+                    <a:lnR w="12700" cap="flat" cmpd="sng" algn="ctr">
+                      <a:solidFill>
+                        <a:scrgbClr r="0" g="0" b="0"/>
+                      </a:solidFill>
+                      <a:prstDash val="solid"/>
+                      <a:round/>
+                      <a:headEnd type="none" w="med" len="med"/>
+                      <a:tailEnd type="none" w="med" len="med"/>
+                    </a:lnR>
+                    <a:lnT w="12700" cap="flat" cmpd="sng" algn="ctr">
+                      <a:solidFill>
+                        <a:scrgbClr r="0" g="0" b="0"/>
+                      </a:solidFill>
+                      <a:prstDash val="solid"/>
+                      <a:round/>
+                      <a:headEnd type="none" w="med" len="med"/>
+                      <a:tailEnd type="none" w="med" len="med"/>
+                    </a:lnT>
+                    <a:lnB w="12700" cap="flat" cmpd="sng" algn="ctr">
+                      <a:solidFill>
+                        <a:scrgbClr r="0" g="0" b="0"/>
+                      </a:solidFill>
+                      <a:prstDash val="solid"/>
+                      <a:round/>
+                      <a:headEnd type="none" w="med" len="med"/>
+                      <a:tailEnd type="none" w="med" len="med"/>
+                    </a:lnB>
+                  </a:tcPr>
+                </a:tc>
+              </a:tr>
+              <a:tr h="370840">
+                <a:tc>
+                  <a:txBody>
+                    <a:bodyPr/>
+                    <a:lstStyle/>
+                    <a:p>
+                      <a:pPr marL="460375" indent="0" algn="l"/>
+                      <a:r>
+                        <a:rPr lang="en-US" dirty="0" smtClean="0">
+                          <a:latin typeface="Avenir Book"/>
+                          <a:cs typeface="Avenir Book"/>
+                        </a:rPr>
+                        <a:t>Unknown</a:t>
+                      </a:r>
+                      <a:endParaRPr lang="en-US" dirty="0">
+                        <a:latin typeface="Avenir Book"/>
+                        <a:cs typeface="Avenir Book"/>
+                      </a:endParaRPr>
+                    </a:p>
+                  </a:txBody>
+                  <a:tcPr>
+                    <a:lnL w="12700" cap="flat" cmpd="sng" algn="ctr">
+                      <a:solidFill>
+                        <a:scrgbClr r="0" g="0" b="0"/>
+                      </a:solidFill>
+                      <a:prstDash val="solid"/>
+                      <a:round/>
+                      <a:headEnd type="none" w="med" len="med"/>
+                      <a:tailEnd type="none" w="med" len="med"/>
+                    </a:lnL>
+                    <a:lnR w="12700" cap="flat" cmpd="sng" algn="ctr">
+                      <a:solidFill>
+                        <a:scrgbClr r="0" g="0" b="0"/>
+                      </a:solidFill>
+                      <a:prstDash val="solid"/>
+                      <a:round/>
+                      <a:headEnd type="none" w="med" len="med"/>
+                      <a:tailEnd type="none" w="med" len="med"/>
+                    </a:lnR>
+                    <a:lnT w="12700" cap="flat" cmpd="sng" algn="ctr">
+                      <a:solidFill>
+                        <a:scrgbClr r="0" g="0" b="0"/>
+                      </a:solidFill>
+                      <a:prstDash val="solid"/>
+                      <a:round/>
+                      <a:headEnd type="none" w="med" len="med"/>
+                      <a:tailEnd type="none" w="med" len="med"/>
+                    </a:lnT>
+                    <a:lnB w="12700" cap="flat" cmpd="sng" algn="ctr">
+                      <a:solidFill>
+                        <a:scrgbClr r="0" g="0" b="0"/>
+                      </a:solidFill>
+                      <a:prstDash val="solid"/>
+                      <a:round/>
+                      <a:headEnd type="none" w="med" len="med"/>
+                      <a:tailEnd type="none" w="med" len="med"/>
+                    </a:lnB>
+                  </a:tcPr>
+                </a:tc>
+                <a:tc>
+                  <a:txBody>
+                    <a:bodyPr/>
+                    <a:lstStyle/>
+                    <a:p>
+                      <a:pPr algn="ctr"/>
+                      <a:r>
+                        <a:rPr lang="en-US" dirty="0" smtClean="0">
+                          <a:latin typeface="Avenir Book"/>
+                          <a:cs typeface="Avenir Book"/>
+                        </a:rPr>
+                        <a:t>0.502</a:t>
+                      </a:r>
+                      <a:endParaRPr lang="en-US" dirty="0">
+                        <a:latin typeface="Avenir Book"/>
+                        <a:cs typeface="Avenir Book"/>
+                      </a:endParaRPr>
+                    </a:p>
+                  </a:txBody>
+                  <a:tcPr>
+                    <a:lnL w="12700" cap="flat" cmpd="sng" algn="ctr">
+                      <a:solidFill>
+                        <a:scrgbClr r="0" g="0" b="0"/>
+                      </a:solidFill>
+                      <a:prstDash val="solid"/>
+                      <a:round/>
+                      <a:headEnd type="none" w="med" len="med"/>
+                      <a:tailEnd type="none" w="med" len="med"/>
+                    </a:lnL>
+                    <a:lnR w="12700" cap="flat" cmpd="sng" algn="ctr">
+                      <a:solidFill>
+                        <a:scrgbClr r="0" g="0" b="0"/>
+                      </a:solidFill>
+                      <a:prstDash val="solid"/>
+                      <a:round/>
+                      <a:headEnd type="none" w="med" len="med"/>
+                      <a:tailEnd type="none" w="med" len="med"/>
+                    </a:lnR>
+                    <a:lnT w="12700" cap="flat" cmpd="sng" algn="ctr">
+                      <a:solidFill>
+                        <a:scrgbClr r="0" g="0" b="0"/>
+                      </a:solidFill>
+                      <a:prstDash val="solid"/>
+                      <a:round/>
+                      <a:headEnd type="none" w="med" len="med"/>
+                      <a:tailEnd type="none" w="med" len="med"/>
+                    </a:lnT>
+                    <a:lnB w="12700" cap="flat" cmpd="sng" algn="ctr">
+                      <a:solidFill>
+                        <a:scrgbClr r="0" g="0" b="0"/>
+                      </a:solidFill>
+                      <a:prstDash val="solid"/>
+                      <a:round/>
+                      <a:headEnd type="none" w="med" len="med"/>
+                      <a:tailEnd type="none" w="med" len="med"/>
+                    </a:lnB>
+                  </a:tcPr>
+                </a:tc>
+                <a:tc>
+                  <a:txBody>
+                    <a:bodyPr/>
+                    <a:lstStyle/>
+                    <a:p>
+                      <a:pPr algn="ctr"/>
+                      <a:r>
+                        <a:rPr lang="en-US" dirty="0" smtClean="0">
+                          <a:latin typeface="Avenir Book"/>
+                          <a:cs typeface="Avenir Book"/>
+                        </a:rPr>
+                        <a:t>0.93</a:t>
                       </a:r>
                       <a:endParaRPr lang="en-US" dirty="0">
                         <a:latin typeface="Avenir Book"/>
@@ -6061,7 +7100,7 @@
                           <a:latin typeface="Avenir Book"/>
                           <a:cs typeface="Avenir Book"/>
                         </a:rPr>
-                        <a:t>0.000</a:t>
+                        <a:t>&lt;0.001</a:t>
                       </a:r>
                       <a:endParaRPr lang="en-US" dirty="0">
                         <a:latin typeface="Avenir Book"/>
@@ -6237,7 +7276,7 @@
                           <a:latin typeface="Avenir Book"/>
                           <a:cs typeface="Avenir Book"/>
                         </a:rPr>
-                        <a:t>0.000</a:t>
+                        <a:t>&lt;0.001</a:t>
                       </a:r>
                       <a:endParaRPr lang="en-US" dirty="0">
                         <a:latin typeface="Avenir Book"/>
@@ -6297,6 +7336,10 @@
                         </a:rPr>
                         <a:t>1.05</a:t>
                       </a:r>
+                      <a:endParaRPr lang="en-US" dirty="0">
+                        <a:latin typeface="Avenir Book"/>
+                        <a:cs typeface="Avenir Book"/>
+                      </a:endParaRPr>
                     </a:p>
                   </a:txBody>
                   <a:tcPr>
@@ -6416,7 +7459,7 @@
                           <a:latin typeface="Avenir Book"/>
                           <a:cs typeface="Avenir Book"/>
                         </a:rPr>
-                        <a:t>0.065</a:t>
+                        <a:t>0.125</a:t>
                       </a:r>
                       <a:endParaRPr lang="en-US" dirty="0">
                         <a:latin typeface="Avenir Book"/>
@@ -6474,7 +7517,7 @@
                           <a:latin typeface="Avenir Book"/>
                           <a:cs typeface="Avenir Book"/>
                         </a:rPr>
-                        <a:t>1.36</a:t>
+                        <a:t>1.29</a:t>
                       </a:r>
                     </a:p>
                   </a:txBody>
@@ -6588,7 +7631,7 @@
                           <a:latin typeface="Avenir Book"/>
                           <a:cs typeface="Avenir Book"/>
                         </a:rPr>
-                        <a:t>0.000</a:t>
+                        <a:t>&lt;0.001</a:t>
                       </a:r>
                       <a:endParaRPr lang="en-US" dirty="0">
                         <a:latin typeface="Avenir Book"/>
@@ -6646,7 +7689,7 @@
                           <a:latin typeface="Avenir Book"/>
                           <a:cs typeface="Avenir Book"/>
                         </a:rPr>
-                        <a:t>0.75</a:t>
+                        <a:t>0.97</a:t>
                       </a:r>
                     </a:p>
                   </a:txBody>
@@ -6806,10 +7849,2514 @@
           </a:p>
         </p:txBody>
       </p:sp>
+      <p:graphicFrame>
+        <p:nvGraphicFramePr>
+          <p:cNvPr id="9" name="Table 8"/>
+          <p:cNvGraphicFramePr>
+            <a:graphicFrameLocks noGrp="1"/>
+          </p:cNvGraphicFramePr>
+          <p:nvPr>
+            <p:extLst>
+              <p:ext uri="{D42A27DB-BD31-4B8C-83A1-F6EECF244321}">
+                <p14:modId xmlns:p14="http://schemas.microsoft.com/office/powerpoint/2010/main" val="3305558054"/>
+              </p:ext>
+            </p:extLst>
+          </p:nvPr>
+        </p:nvGraphicFramePr>
+        <p:xfrm>
+          <a:off x="642937" y="1206500"/>
+          <a:ext cx="7858126" cy="5191760"/>
+        </p:xfrm>
+        <a:graphic>
+          <a:graphicData uri="http://schemas.openxmlformats.org/drawingml/2006/table">
+            <a:tbl>
+              <a:tblPr firstRow="1" bandRow="1">
+                <a:tableStyleId>{2D5ABB26-0587-4C30-8999-92F81FD0307C}</a:tableStyleId>
+              </a:tblPr>
+              <a:tblGrid>
+                <a:gridCol w="3840069"/>
+                <a:gridCol w="1819917"/>
+                <a:gridCol w="2198140"/>
+              </a:tblGrid>
+              <a:tr h="370840">
+                <a:tc>
+                  <a:txBody>
+                    <a:bodyPr/>
+                    <a:lstStyle/>
+                    <a:p>
+                      <a:pPr algn="ctr"/>
+                      <a:r>
+                        <a:rPr lang="en-US" b="1" dirty="0" smtClean="0">
+                          <a:latin typeface="Avenir Black"/>
+                          <a:cs typeface="Avenir Black"/>
+                        </a:rPr>
+                        <a:t>Covariate</a:t>
+                      </a:r>
+                      <a:endParaRPr lang="en-US" b="1" dirty="0">
+                        <a:latin typeface="Avenir Black"/>
+                        <a:cs typeface="Avenir Black"/>
+                      </a:endParaRPr>
+                    </a:p>
+                  </a:txBody>
+                  <a:tcPr>
+                    <a:lnL w="12700" cap="flat" cmpd="sng" algn="ctr">
+                      <a:solidFill>
+                        <a:scrgbClr r="0" g="0" b="0"/>
+                      </a:solidFill>
+                      <a:prstDash val="solid"/>
+                      <a:round/>
+                      <a:headEnd type="none" w="med" len="med"/>
+                      <a:tailEnd type="none" w="med" len="med"/>
+                    </a:lnL>
+                    <a:lnR w="12700" cap="flat" cmpd="sng" algn="ctr">
+                      <a:solidFill>
+                        <a:scrgbClr r="0" g="0" b="0"/>
+                      </a:solidFill>
+                      <a:prstDash val="solid"/>
+                      <a:round/>
+                      <a:headEnd type="none" w="med" len="med"/>
+                      <a:tailEnd type="none" w="med" len="med"/>
+                    </a:lnR>
+                    <a:lnT w="12700" cap="flat" cmpd="sng" algn="ctr">
+                      <a:solidFill>
+                        <a:scrgbClr r="0" g="0" b="0"/>
+                      </a:solidFill>
+                      <a:prstDash val="solid"/>
+                      <a:round/>
+                      <a:headEnd type="none" w="med" len="med"/>
+                      <a:tailEnd type="none" w="med" len="med"/>
+                    </a:lnT>
+                    <a:lnB w="28575" cap="flat" cmpd="sng" algn="ctr">
+                      <a:solidFill>
+                        <a:scrgbClr r="0" g="0" b="0"/>
+                      </a:solidFill>
+                      <a:prstDash val="solid"/>
+                      <a:round/>
+                      <a:headEnd type="none" w="med" len="med"/>
+                      <a:tailEnd type="none" w="med" len="med"/>
+                    </a:lnB>
+                  </a:tcPr>
+                </a:tc>
+                <a:tc>
+                  <a:txBody>
+                    <a:bodyPr/>
+                    <a:lstStyle/>
+                    <a:p>
+                      <a:pPr algn="ctr"/>
+                      <a:r>
+                        <a:rPr lang="en-US" b="1" dirty="0" smtClean="0">
+                          <a:latin typeface="Avenir Black"/>
+                          <a:cs typeface="Avenir Black"/>
+                        </a:rPr>
+                        <a:t>P-value</a:t>
+                      </a:r>
+                      <a:endParaRPr lang="en-US" b="1" dirty="0">
+                        <a:latin typeface="Avenir Black"/>
+                        <a:cs typeface="Avenir Black"/>
+                      </a:endParaRPr>
+                    </a:p>
+                  </a:txBody>
+                  <a:tcPr>
+                    <a:lnL w="12700" cap="flat" cmpd="sng" algn="ctr">
+                      <a:solidFill>
+                        <a:scrgbClr r="0" g="0" b="0"/>
+                      </a:solidFill>
+                      <a:prstDash val="solid"/>
+                      <a:round/>
+                      <a:headEnd type="none" w="med" len="med"/>
+                      <a:tailEnd type="none" w="med" len="med"/>
+                    </a:lnL>
+                    <a:lnR w="12700" cap="flat" cmpd="sng" algn="ctr">
+                      <a:solidFill>
+                        <a:scrgbClr r="0" g="0" b="0"/>
+                      </a:solidFill>
+                      <a:prstDash val="solid"/>
+                      <a:round/>
+                      <a:headEnd type="none" w="med" len="med"/>
+                      <a:tailEnd type="none" w="med" len="med"/>
+                    </a:lnR>
+                    <a:lnT w="12700" cap="flat" cmpd="sng" algn="ctr">
+                      <a:solidFill>
+                        <a:scrgbClr r="0" g="0" b="0"/>
+                      </a:solidFill>
+                      <a:prstDash val="solid"/>
+                      <a:round/>
+                      <a:headEnd type="none" w="med" len="med"/>
+                      <a:tailEnd type="none" w="med" len="med"/>
+                    </a:lnT>
+                    <a:lnB w="28575" cap="flat" cmpd="sng" algn="ctr">
+                      <a:solidFill>
+                        <a:scrgbClr r="0" g="0" b="0"/>
+                      </a:solidFill>
+                      <a:prstDash val="solid"/>
+                      <a:round/>
+                      <a:headEnd type="none" w="med" len="med"/>
+                      <a:tailEnd type="none" w="med" len="med"/>
+                    </a:lnB>
+                  </a:tcPr>
+                </a:tc>
+                <a:tc>
+                  <a:txBody>
+                    <a:bodyPr/>
+                    <a:lstStyle/>
+                    <a:p>
+                      <a:pPr algn="ctr"/>
+                      <a:r>
+                        <a:rPr lang="en-US" b="1" dirty="0" smtClean="0">
+                          <a:latin typeface="Avenir Black"/>
+                          <a:cs typeface="Avenir Black"/>
+                        </a:rPr>
+                        <a:t>Odds</a:t>
+                      </a:r>
+                      <a:r>
+                        <a:rPr lang="en-US" b="1" baseline="0" dirty="0" smtClean="0">
+                          <a:latin typeface="Avenir Black"/>
+                          <a:cs typeface="Avenir Black"/>
+                        </a:rPr>
+                        <a:t> Ratio</a:t>
+                      </a:r>
+                      <a:endParaRPr lang="en-US" b="1" dirty="0">
+                        <a:latin typeface="Avenir Black"/>
+                        <a:cs typeface="Avenir Black"/>
+                      </a:endParaRPr>
+                    </a:p>
+                  </a:txBody>
+                  <a:tcPr>
+                    <a:lnL w="12700" cap="flat" cmpd="sng" algn="ctr">
+                      <a:solidFill>
+                        <a:scrgbClr r="0" g="0" b="0"/>
+                      </a:solidFill>
+                      <a:prstDash val="solid"/>
+                      <a:round/>
+                      <a:headEnd type="none" w="med" len="med"/>
+                      <a:tailEnd type="none" w="med" len="med"/>
+                    </a:lnL>
+                    <a:lnR w="12700" cap="flat" cmpd="sng" algn="ctr">
+                      <a:solidFill>
+                        <a:scrgbClr r="0" g="0" b="0"/>
+                      </a:solidFill>
+                      <a:prstDash val="solid"/>
+                      <a:round/>
+                      <a:headEnd type="none" w="med" len="med"/>
+                      <a:tailEnd type="none" w="med" len="med"/>
+                    </a:lnR>
+                    <a:lnT w="12700" cap="flat" cmpd="sng" algn="ctr">
+                      <a:solidFill>
+                        <a:scrgbClr r="0" g="0" b="0"/>
+                      </a:solidFill>
+                      <a:prstDash val="solid"/>
+                      <a:round/>
+                      <a:headEnd type="none" w="med" len="med"/>
+                      <a:tailEnd type="none" w="med" len="med"/>
+                    </a:lnT>
+                    <a:lnB w="28575" cap="flat" cmpd="sng" algn="ctr">
+                      <a:solidFill>
+                        <a:scrgbClr r="0" g="0" b="0"/>
+                      </a:solidFill>
+                      <a:prstDash val="solid"/>
+                      <a:round/>
+                      <a:headEnd type="none" w="med" len="med"/>
+                      <a:tailEnd type="none" w="med" len="med"/>
+                    </a:lnB>
+                  </a:tcPr>
+                </a:tc>
+              </a:tr>
+              <a:tr h="370840">
+                <a:tc>
+                  <a:txBody>
+                    <a:bodyPr/>
+                    <a:lstStyle/>
+                    <a:p>
+                      <a:pPr algn="l"/>
+                      <a:r>
+                        <a:rPr lang="en-US" dirty="0" smtClean="0">
+                          <a:latin typeface="Avenir Book"/>
+                          <a:cs typeface="Avenir Book"/>
+                        </a:rPr>
+                        <a:t>Age</a:t>
+                      </a:r>
+                      <a:endParaRPr lang="en-US" dirty="0">
+                        <a:latin typeface="Avenir Book"/>
+                        <a:cs typeface="Avenir Book"/>
+                      </a:endParaRPr>
+                    </a:p>
+                  </a:txBody>
+                  <a:tcPr>
+                    <a:lnL w="12700" cap="flat" cmpd="sng" algn="ctr">
+                      <a:solidFill>
+                        <a:scrgbClr r="0" g="0" b="0"/>
+                      </a:solidFill>
+                      <a:prstDash val="solid"/>
+                      <a:round/>
+                      <a:headEnd type="none" w="med" len="med"/>
+                      <a:tailEnd type="none" w="med" len="med"/>
+                    </a:lnL>
+                    <a:lnR w="12700" cap="flat" cmpd="sng" algn="ctr">
+                      <a:solidFill>
+                        <a:scrgbClr r="0" g="0" b="0"/>
+                      </a:solidFill>
+                      <a:prstDash val="solid"/>
+                      <a:round/>
+                      <a:headEnd type="none" w="med" len="med"/>
+                      <a:tailEnd type="none" w="med" len="med"/>
+                    </a:lnR>
+                    <a:lnT w="28575" cap="flat" cmpd="sng" algn="ctr">
+                      <a:solidFill>
+                        <a:scrgbClr r="0" g="0" b="0"/>
+                      </a:solidFill>
+                      <a:prstDash val="solid"/>
+                      <a:round/>
+                      <a:headEnd type="none" w="med" len="med"/>
+                      <a:tailEnd type="none" w="med" len="med"/>
+                    </a:lnT>
+                    <a:lnB w="12700" cap="flat" cmpd="sng" algn="ctr">
+                      <a:solidFill>
+                        <a:scrgbClr r="0" g="0" b="0"/>
+                      </a:solidFill>
+                      <a:prstDash val="solid"/>
+                      <a:round/>
+                      <a:headEnd type="none" w="med" len="med"/>
+                      <a:tailEnd type="none" w="med" len="med"/>
+                    </a:lnB>
+                  </a:tcPr>
+                </a:tc>
+                <a:tc>
+                  <a:txBody>
+                    <a:bodyPr/>
+                    <a:lstStyle/>
+                    <a:p>
+                      <a:pPr algn="ctr"/>
+                      <a:r>
+                        <a:rPr lang="en-US" dirty="0" smtClean="0">
+                          <a:latin typeface="Avenir Book"/>
+                          <a:cs typeface="Avenir Book"/>
+                        </a:rPr>
+                        <a:t>&lt;0.001</a:t>
+                      </a:r>
+                      <a:endParaRPr lang="en-US" dirty="0">
+                        <a:latin typeface="Avenir Book"/>
+                        <a:cs typeface="Avenir Book"/>
+                      </a:endParaRPr>
+                    </a:p>
+                  </a:txBody>
+                  <a:tcPr>
+                    <a:lnL w="12700" cap="flat" cmpd="sng" algn="ctr">
+                      <a:solidFill>
+                        <a:scrgbClr r="0" g="0" b="0"/>
+                      </a:solidFill>
+                      <a:prstDash val="solid"/>
+                      <a:round/>
+                      <a:headEnd type="none" w="med" len="med"/>
+                      <a:tailEnd type="none" w="med" len="med"/>
+                    </a:lnL>
+                    <a:lnR w="12700" cap="flat" cmpd="sng" algn="ctr">
+                      <a:solidFill>
+                        <a:scrgbClr r="0" g="0" b="0"/>
+                      </a:solidFill>
+                      <a:prstDash val="solid"/>
+                      <a:round/>
+                      <a:headEnd type="none" w="med" len="med"/>
+                      <a:tailEnd type="none" w="med" len="med"/>
+                    </a:lnR>
+                    <a:lnT w="28575" cap="flat" cmpd="sng" algn="ctr">
+                      <a:solidFill>
+                        <a:scrgbClr r="0" g="0" b="0"/>
+                      </a:solidFill>
+                      <a:prstDash val="solid"/>
+                      <a:round/>
+                      <a:headEnd type="none" w="med" len="med"/>
+                      <a:tailEnd type="none" w="med" len="med"/>
+                    </a:lnT>
+                    <a:lnB w="12700" cap="flat" cmpd="sng" algn="ctr">
+                      <a:solidFill>
+                        <a:scrgbClr r="0" g="0" b="0"/>
+                      </a:solidFill>
+                      <a:prstDash val="solid"/>
+                      <a:round/>
+                      <a:headEnd type="none" w="med" len="med"/>
+                      <a:tailEnd type="none" w="med" len="med"/>
+                    </a:lnB>
+                  </a:tcPr>
+                </a:tc>
+                <a:tc>
+                  <a:txBody>
+                    <a:bodyPr/>
+                    <a:lstStyle/>
+                    <a:p>
+                      <a:pPr algn="ctr"/>
+                      <a:r>
+                        <a:rPr lang="en-US" dirty="0" smtClean="0">
+                          <a:latin typeface="Avenir Book"/>
+                          <a:cs typeface="Avenir Book"/>
+                        </a:rPr>
+                        <a:t>1.00</a:t>
+                      </a:r>
+                      <a:endParaRPr lang="en-US" dirty="0">
+                        <a:latin typeface="Avenir Book"/>
+                        <a:cs typeface="Avenir Book"/>
+                      </a:endParaRPr>
+                    </a:p>
+                  </a:txBody>
+                  <a:tcPr>
+                    <a:lnL w="12700" cap="flat" cmpd="sng" algn="ctr">
+                      <a:solidFill>
+                        <a:scrgbClr r="0" g="0" b="0"/>
+                      </a:solidFill>
+                      <a:prstDash val="solid"/>
+                      <a:round/>
+                      <a:headEnd type="none" w="med" len="med"/>
+                      <a:tailEnd type="none" w="med" len="med"/>
+                    </a:lnL>
+                    <a:lnR w="12700" cap="flat" cmpd="sng" algn="ctr">
+                      <a:solidFill>
+                        <a:scrgbClr r="0" g="0" b="0"/>
+                      </a:solidFill>
+                      <a:prstDash val="solid"/>
+                      <a:round/>
+                      <a:headEnd type="none" w="med" len="med"/>
+                      <a:tailEnd type="none" w="med" len="med"/>
+                    </a:lnR>
+                    <a:lnT w="28575" cap="flat" cmpd="sng" algn="ctr">
+                      <a:solidFill>
+                        <a:scrgbClr r="0" g="0" b="0"/>
+                      </a:solidFill>
+                      <a:prstDash val="solid"/>
+                      <a:round/>
+                      <a:headEnd type="none" w="med" len="med"/>
+                      <a:tailEnd type="none" w="med" len="med"/>
+                    </a:lnT>
+                    <a:lnB w="12700" cap="flat" cmpd="sng" algn="ctr">
+                      <a:solidFill>
+                        <a:scrgbClr r="0" g="0" b="0"/>
+                      </a:solidFill>
+                      <a:prstDash val="solid"/>
+                      <a:round/>
+                      <a:headEnd type="none" w="med" len="med"/>
+                      <a:tailEnd type="none" w="med" len="med"/>
+                    </a:lnB>
+                  </a:tcPr>
+                </a:tc>
+              </a:tr>
+              <a:tr h="370840">
+                <a:tc>
+                  <a:txBody>
+                    <a:bodyPr/>
+                    <a:lstStyle/>
+                    <a:p>
+                      <a:pPr algn="l"/>
+                      <a:r>
+                        <a:rPr lang="en-US" dirty="0" smtClean="0">
+                          <a:latin typeface="Avenir Book"/>
+                          <a:cs typeface="Avenir Book"/>
+                        </a:rPr>
+                        <a:t>Gender: Female</a:t>
+                      </a:r>
+                      <a:endParaRPr lang="en-US" dirty="0">
+                        <a:latin typeface="Avenir Book"/>
+                        <a:cs typeface="Avenir Book"/>
+                      </a:endParaRPr>
+                    </a:p>
+                  </a:txBody>
+                  <a:tcPr>
+                    <a:lnL w="12700" cap="flat" cmpd="sng" algn="ctr">
+                      <a:solidFill>
+                        <a:scrgbClr r="0" g="0" b="0"/>
+                      </a:solidFill>
+                      <a:prstDash val="solid"/>
+                      <a:round/>
+                      <a:headEnd type="none" w="med" len="med"/>
+                      <a:tailEnd type="none" w="med" len="med"/>
+                    </a:lnL>
+                    <a:lnR w="12700" cap="flat" cmpd="sng" algn="ctr">
+                      <a:solidFill>
+                        <a:scrgbClr r="0" g="0" b="0"/>
+                      </a:solidFill>
+                      <a:prstDash val="solid"/>
+                      <a:round/>
+                      <a:headEnd type="none" w="med" len="med"/>
+                      <a:tailEnd type="none" w="med" len="med"/>
+                    </a:lnR>
+                    <a:lnT w="12700" cap="flat" cmpd="sng" algn="ctr">
+                      <a:solidFill>
+                        <a:scrgbClr r="0" g="0" b="0"/>
+                      </a:solidFill>
+                      <a:prstDash val="solid"/>
+                      <a:round/>
+                      <a:headEnd type="none" w="med" len="med"/>
+                      <a:tailEnd type="none" w="med" len="med"/>
+                    </a:lnT>
+                    <a:lnB w="12700" cap="flat" cmpd="sng" algn="ctr">
+                      <a:solidFill>
+                        <a:scrgbClr r="0" g="0" b="0"/>
+                      </a:solidFill>
+                      <a:prstDash val="solid"/>
+                      <a:round/>
+                      <a:headEnd type="none" w="med" len="med"/>
+                      <a:tailEnd type="none" w="med" len="med"/>
+                    </a:lnB>
+                  </a:tcPr>
+                </a:tc>
+                <a:tc>
+                  <a:txBody>
+                    <a:bodyPr/>
+                    <a:lstStyle/>
+                    <a:p>
+                      <a:pPr algn="ctr"/>
+                      <a:r>
+                        <a:rPr lang="en-US" dirty="0" smtClean="0">
+                          <a:latin typeface="Avenir Book"/>
+                          <a:cs typeface="Avenir Book"/>
+                        </a:rPr>
+                        <a:t>&lt;0.001</a:t>
+                      </a:r>
+                      <a:endParaRPr lang="en-US" dirty="0">
+                        <a:latin typeface="Avenir Book"/>
+                        <a:cs typeface="Avenir Book"/>
+                      </a:endParaRPr>
+                    </a:p>
+                  </a:txBody>
+                  <a:tcPr>
+                    <a:lnL w="12700" cap="flat" cmpd="sng" algn="ctr">
+                      <a:solidFill>
+                        <a:scrgbClr r="0" g="0" b="0"/>
+                      </a:solidFill>
+                      <a:prstDash val="solid"/>
+                      <a:round/>
+                      <a:headEnd type="none" w="med" len="med"/>
+                      <a:tailEnd type="none" w="med" len="med"/>
+                    </a:lnL>
+                    <a:lnR w="12700" cap="flat" cmpd="sng" algn="ctr">
+                      <a:solidFill>
+                        <a:scrgbClr r="0" g="0" b="0"/>
+                      </a:solidFill>
+                      <a:prstDash val="solid"/>
+                      <a:round/>
+                      <a:headEnd type="none" w="med" len="med"/>
+                      <a:tailEnd type="none" w="med" len="med"/>
+                    </a:lnR>
+                    <a:lnT w="12700" cap="flat" cmpd="sng" algn="ctr">
+                      <a:solidFill>
+                        <a:scrgbClr r="0" g="0" b="0"/>
+                      </a:solidFill>
+                      <a:prstDash val="solid"/>
+                      <a:round/>
+                      <a:headEnd type="none" w="med" len="med"/>
+                      <a:tailEnd type="none" w="med" len="med"/>
+                    </a:lnT>
+                    <a:lnB w="12700" cap="flat" cmpd="sng" algn="ctr">
+                      <a:solidFill>
+                        <a:scrgbClr r="0" g="0" b="0"/>
+                      </a:solidFill>
+                      <a:prstDash val="solid"/>
+                      <a:round/>
+                      <a:headEnd type="none" w="med" len="med"/>
+                      <a:tailEnd type="none" w="med" len="med"/>
+                    </a:lnB>
+                  </a:tcPr>
+                </a:tc>
+                <a:tc>
+                  <a:txBody>
+                    <a:bodyPr/>
+                    <a:lstStyle/>
+                    <a:p>
+                      <a:pPr algn="ctr"/>
+                      <a:r>
+                        <a:rPr lang="en-US" dirty="0" smtClean="0">
+                          <a:latin typeface="Avenir Book"/>
+                          <a:cs typeface="Avenir Book"/>
+                        </a:rPr>
+                        <a:t>1.03</a:t>
+                      </a:r>
+                      <a:endParaRPr lang="en-US" dirty="0">
+                        <a:latin typeface="Avenir Book"/>
+                        <a:cs typeface="Avenir Book"/>
+                      </a:endParaRPr>
+                    </a:p>
+                  </a:txBody>
+                  <a:tcPr>
+                    <a:lnL w="12700" cap="flat" cmpd="sng" algn="ctr">
+                      <a:solidFill>
+                        <a:scrgbClr r="0" g="0" b="0"/>
+                      </a:solidFill>
+                      <a:prstDash val="solid"/>
+                      <a:round/>
+                      <a:headEnd type="none" w="med" len="med"/>
+                      <a:tailEnd type="none" w="med" len="med"/>
+                    </a:lnL>
+                    <a:lnR w="12700" cap="flat" cmpd="sng" algn="ctr">
+                      <a:solidFill>
+                        <a:scrgbClr r="0" g="0" b="0"/>
+                      </a:solidFill>
+                      <a:prstDash val="solid"/>
+                      <a:round/>
+                      <a:headEnd type="none" w="med" len="med"/>
+                      <a:tailEnd type="none" w="med" len="med"/>
+                    </a:lnR>
+                    <a:lnT w="12700" cap="flat" cmpd="sng" algn="ctr">
+                      <a:solidFill>
+                        <a:scrgbClr r="0" g="0" b="0"/>
+                      </a:solidFill>
+                      <a:prstDash val="solid"/>
+                      <a:round/>
+                      <a:headEnd type="none" w="med" len="med"/>
+                      <a:tailEnd type="none" w="med" len="med"/>
+                    </a:lnT>
+                    <a:lnB w="12700" cap="flat" cmpd="sng" algn="ctr">
+                      <a:solidFill>
+                        <a:scrgbClr r="0" g="0" b="0"/>
+                      </a:solidFill>
+                      <a:prstDash val="solid"/>
+                      <a:round/>
+                      <a:headEnd type="none" w="med" len="med"/>
+                      <a:tailEnd type="none" w="med" len="med"/>
+                    </a:lnB>
+                  </a:tcPr>
+                </a:tc>
+              </a:tr>
+              <a:tr h="370840">
+                <a:tc>
+                  <a:txBody>
+                    <a:bodyPr/>
+                    <a:lstStyle/>
+                    <a:p>
+                      <a:pPr algn="l"/>
+                      <a:r>
+                        <a:rPr lang="en-US" dirty="0" smtClean="0">
+                          <a:latin typeface="Avenir Book"/>
+                          <a:cs typeface="Avenir Book"/>
+                        </a:rPr>
+                        <a:t>Ethnicity (ref: White)</a:t>
+                      </a:r>
+                      <a:endParaRPr lang="en-US" dirty="0">
+                        <a:latin typeface="Avenir Book"/>
+                        <a:cs typeface="Avenir Book"/>
+                      </a:endParaRPr>
+                    </a:p>
+                  </a:txBody>
+                  <a:tcPr>
+                    <a:lnL w="12700" cap="flat" cmpd="sng" algn="ctr">
+                      <a:solidFill>
+                        <a:scrgbClr r="0" g="0" b="0"/>
+                      </a:solidFill>
+                      <a:prstDash val="solid"/>
+                      <a:round/>
+                      <a:headEnd type="none" w="med" len="med"/>
+                      <a:tailEnd type="none" w="med" len="med"/>
+                    </a:lnL>
+                    <a:lnR w="12700" cap="flat" cmpd="sng" algn="ctr">
+                      <a:solidFill>
+                        <a:scrgbClr r="0" g="0" b="0"/>
+                      </a:solidFill>
+                      <a:prstDash val="solid"/>
+                      <a:round/>
+                      <a:headEnd type="none" w="med" len="med"/>
+                      <a:tailEnd type="none" w="med" len="med"/>
+                    </a:lnR>
+                    <a:lnT w="12700" cap="flat" cmpd="sng" algn="ctr">
+                      <a:solidFill>
+                        <a:scrgbClr r="0" g="0" b="0"/>
+                      </a:solidFill>
+                      <a:prstDash val="solid"/>
+                      <a:round/>
+                      <a:headEnd type="none" w="med" len="med"/>
+                      <a:tailEnd type="none" w="med" len="med"/>
+                    </a:lnT>
+                    <a:lnB w="12700" cap="flat" cmpd="sng" algn="ctr">
+                      <a:solidFill>
+                        <a:scrgbClr r="0" g="0" b="0"/>
+                      </a:solidFill>
+                      <a:prstDash val="solid"/>
+                      <a:round/>
+                      <a:headEnd type="none" w="med" len="med"/>
+                      <a:tailEnd type="none" w="med" len="med"/>
+                    </a:lnB>
+                  </a:tcPr>
+                </a:tc>
+                <a:tc>
+                  <a:txBody>
+                    <a:bodyPr/>
+                    <a:lstStyle/>
+                    <a:p>
+                      <a:pPr algn="ctr"/>
+                      <a:endParaRPr lang="en-US" dirty="0"/>
+                    </a:p>
+                  </a:txBody>
+                  <a:tcPr>
+                    <a:lnL w="12700" cap="flat" cmpd="sng" algn="ctr">
+                      <a:solidFill>
+                        <a:scrgbClr r="0" g="0" b="0"/>
+                      </a:solidFill>
+                      <a:prstDash val="solid"/>
+                      <a:round/>
+                      <a:headEnd type="none" w="med" len="med"/>
+                      <a:tailEnd type="none" w="med" len="med"/>
+                    </a:lnL>
+                    <a:lnR w="12700" cap="flat" cmpd="sng" algn="ctr">
+                      <a:solidFill>
+                        <a:scrgbClr r="0" g="0" b="0"/>
+                      </a:solidFill>
+                      <a:prstDash val="solid"/>
+                      <a:round/>
+                      <a:headEnd type="none" w="med" len="med"/>
+                      <a:tailEnd type="none" w="med" len="med"/>
+                    </a:lnR>
+                    <a:lnT w="12700" cap="flat" cmpd="sng" algn="ctr">
+                      <a:solidFill>
+                        <a:scrgbClr r="0" g="0" b="0"/>
+                      </a:solidFill>
+                      <a:prstDash val="solid"/>
+                      <a:round/>
+                      <a:headEnd type="none" w="med" len="med"/>
+                      <a:tailEnd type="none" w="med" len="med"/>
+                    </a:lnT>
+                    <a:lnB w="12700" cap="flat" cmpd="sng" algn="ctr">
+                      <a:solidFill>
+                        <a:scrgbClr r="0" g="0" b="0"/>
+                      </a:solidFill>
+                      <a:prstDash val="solid"/>
+                      <a:round/>
+                      <a:headEnd type="none" w="med" len="med"/>
+                      <a:tailEnd type="none" w="med" len="med"/>
+                    </a:lnB>
+                  </a:tcPr>
+                </a:tc>
+                <a:tc>
+                  <a:txBody>
+                    <a:bodyPr/>
+                    <a:lstStyle/>
+                    <a:p>
+                      <a:pPr algn="ctr"/>
+                      <a:endParaRPr lang="en-US" dirty="0">
+                        <a:latin typeface="Avenir Book"/>
+                        <a:cs typeface="Avenir Book"/>
+                      </a:endParaRPr>
+                    </a:p>
+                  </a:txBody>
+                  <a:tcPr>
+                    <a:lnL w="12700" cap="flat" cmpd="sng" algn="ctr">
+                      <a:solidFill>
+                        <a:scrgbClr r="0" g="0" b="0"/>
+                      </a:solidFill>
+                      <a:prstDash val="solid"/>
+                      <a:round/>
+                      <a:headEnd type="none" w="med" len="med"/>
+                      <a:tailEnd type="none" w="med" len="med"/>
+                    </a:lnL>
+                    <a:lnR w="12700" cap="flat" cmpd="sng" algn="ctr">
+                      <a:solidFill>
+                        <a:scrgbClr r="0" g="0" b="0"/>
+                      </a:solidFill>
+                      <a:prstDash val="solid"/>
+                      <a:round/>
+                      <a:headEnd type="none" w="med" len="med"/>
+                      <a:tailEnd type="none" w="med" len="med"/>
+                    </a:lnR>
+                    <a:lnT w="12700" cap="flat" cmpd="sng" algn="ctr">
+                      <a:solidFill>
+                        <a:scrgbClr r="0" g="0" b="0"/>
+                      </a:solidFill>
+                      <a:prstDash val="solid"/>
+                      <a:round/>
+                      <a:headEnd type="none" w="med" len="med"/>
+                      <a:tailEnd type="none" w="med" len="med"/>
+                    </a:lnT>
+                    <a:lnB w="12700" cap="flat" cmpd="sng" algn="ctr">
+                      <a:solidFill>
+                        <a:scrgbClr r="0" g="0" b="0"/>
+                      </a:solidFill>
+                      <a:prstDash val="solid"/>
+                      <a:round/>
+                      <a:headEnd type="none" w="med" len="med"/>
+                      <a:tailEnd type="none" w="med" len="med"/>
+                    </a:lnB>
+                  </a:tcPr>
+                </a:tc>
+              </a:tr>
+              <a:tr h="370840">
+                <a:tc>
+                  <a:txBody>
+                    <a:bodyPr/>
+                    <a:lstStyle/>
+                    <a:p>
+                      <a:pPr marL="460375" indent="0" algn="l"/>
+                      <a:r>
+                        <a:rPr lang="en-US" dirty="0" smtClean="0">
+                          <a:latin typeface="Avenir Book"/>
+                          <a:cs typeface="Avenir Book"/>
+                        </a:rPr>
+                        <a:t>American Indian/Alaska Native</a:t>
+                      </a:r>
+                      <a:endParaRPr lang="en-US" dirty="0">
+                        <a:latin typeface="Avenir Book"/>
+                        <a:cs typeface="Avenir Book"/>
+                      </a:endParaRPr>
+                    </a:p>
+                  </a:txBody>
+                  <a:tcPr>
+                    <a:lnL w="12700" cap="flat" cmpd="sng" algn="ctr">
+                      <a:solidFill>
+                        <a:scrgbClr r="0" g="0" b="0"/>
+                      </a:solidFill>
+                      <a:prstDash val="solid"/>
+                      <a:round/>
+                      <a:headEnd type="none" w="med" len="med"/>
+                      <a:tailEnd type="none" w="med" len="med"/>
+                    </a:lnL>
+                    <a:lnR w="12700" cap="flat" cmpd="sng" algn="ctr">
+                      <a:solidFill>
+                        <a:scrgbClr r="0" g="0" b="0"/>
+                      </a:solidFill>
+                      <a:prstDash val="solid"/>
+                      <a:round/>
+                      <a:headEnd type="none" w="med" len="med"/>
+                      <a:tailEnd type="none" w="med" len="med"/>
+                    </a:lnR>
+                    <a:lnT w="12700" cap="flat" cmpd="sng" algn="ctr">
+                      <a:solidFill>
+                        <a:scrgbClr r="0" g="0" b="0"/>
+                      </a:solidFill>
+                      <a:prstDash val="solid"/>
+                      <a:round/>
+                      <a:headEnd type="none" w="med" len="med"/>
+                      <a:tailEnd type="none" w="med" len="med"/>
+                    </a:lnT>
+                    <a:lnB w="12700" cap="flat" cmpd="sng" algn="ctr">
+                      <a:solidFill>
+                        <a:scrgbClr r="0" g="0" b="0"/>
+                      </a:solidFill>
+                      <a:prstDash val="solid"/>
+                      <a:round/>
+                      <a:headEnd type="none" w="med" len="med"/>
+                      <a:tailEnd type="none" w="med" len="med"/>
+                    </a:lnB>
+                  </a:tcPr>
+                </a:tc>
+                <a:tc>
+                  <a:txBody>
+                    <a:bodyPr/>
+                    <a:lstStyle/>
+                    <a:p>
+                      <a:pPr algn="ctr"/>
+                      <a:r>
+                        <a:rPr lang="en-US" dirty="0" smtClean="0">
+                          <a:latin typeface="Avenir Book"/>
+                          <a:cs typeface="Avenir Book"/>
+                        </a:rPr>
+                        <a:t>0.686</a:t>
+                      </a:r>
+                      <a:endParaRPr lang="en-US" dirty="0">
+                        <a:latin typeface="Avenir Book"/>
+                        <a:cs typeface="Avenir Book"/>
+                      </a:endParaRPr>
+                    </a:p>
+                  </a:txBody>
+                  <a:tcPr>
+                    <a:lnL w="12700" cap="flat" cmpd="sng" algn="ctr">
+                      <a:solidFill>
+                        <a:scrgbClr r="0" g="0" b="0"/>
+                      </a:solidFill>
+                      <a:prstDash val="solid"/>
+                      <a:round/>
+                      <a:headEnd type="none" w="med" len="med"/>
+                      <a:tailEnd type="none" w="med" len="med"/>
+                    </a:lnL>
+                    <a:lnR w="12700" cap="flat" cmpd="sng" algn="ctr">
+                      <a:solidFill>
+                        <a:scrgbClr r="0" g="0" b="0"/>
+                      </a:solidFill>
+                      <a:prstDash val="solid"/>
+                      <a:round/>
+                      <a:headEnd type="none" w="med" len="med"/>
+                      <a:tailEnd type="none" w="med" len="med"/>
+                    </a:lnR>
+                    <a:lnT w="12700" cap="flat" cmpd="sng" algn="ctr">
+                      <a:solidFill>
+                        <a:scrgbClr r="0" g="0" b="0"/>
+                      </a:solidFill>
+                      <a:prstDash val="solid"/>
+                      <a:round/>
+                      <a:headEnd type="none" w="med" len="med"/>
+                      <a:tailEnd type="none" w="med" len="med"/>
+                    </a:lnT>
+                    <a:lnB w="12700" cap="flat" cmpd="sng" algn="ctr">
+                      <a:solidFill>
+                        <a:scrgbClr r="0" g="0" b="0"/>
+                      </a:solidFill>
+                      <a:prstDash val="solid"/>
+                      <a:round/>
+                      <a:headEnd type="none" w="med" len="med"/>
+                      <a:tailEnd type="none" w="med" len="med"/>
+                    </a:lnB>
+                  </a:tcPr>
+                </a:tc>
+                <a:tc>
+                  <a:txBody>
+                    <a:bodyPr/>
+                    <a:lstStyle/>
+                    <a:p>
+                      <a:pPr algn="ctr"/>
+                      <a:r>
+                        <a:rPr lang="en-US" dirty="0" smtClean="0">
+                          <a:latin typeface="Avenir Book"/>
+                          <a:cs typeface="Avenir Book"/>
+                        </a:rPr>
+                        <a:t>0.55</a:t>
+                      </a:r>
+                      <a:endParaRPr lang="en-US" dirty="0">
+                        <a:latin typeface="Avenir Book"/>
+                        <a:cs typeface="Avenir Book"/>
+                      </a:endParaRPr>
+                    </a:p>
+                  </a:txBody>
+                  <a:tcPr>
+                    <a:lnL w="12700" cap="flat" cmpd="sng" algn="ctr">
+                      <a:solidFill>
+                        <a:scrgbClr r="0" g="0" b="0"/>
+                      </a:solidFill>
+                      <a:prstDash val="solid"/>
+                      <a:round/>
+                      <a:headEnd type="none" w="med" len="med"/>
+                      <a:tailEnd type="none" w="med" len="med"/>
+                    </a:lnL>
+                    <a:lnR w="12700" cap="flat" cmpd="sng" algn="ctr">
+                      <a:solidFill>
+                        <a:scrgbClr r="0" g="0" b="0"/>
+                      </a:solidFill>
+                      <a:prstDash val="solid"/>
+                      <a:round/>
+                      <a:headEnd type="none" w="med" len="med"/>
+                      <a:tailEnd type="none" w="med" len="med"/>
+                    </a:lnR>
+                    <a:lnT w="12700" cap="flat" cmpd="sng" algn="ctr">
+                      <a:solidFill>
+                        <a:scrgbClr r="0" g="0" b="0"/>
+                      </a:solidFill>
+                      <a:prstDash val="solid"/>
+                      <a:round/>
+                      <a:headEnd type="none" w="med" len="med"/>
+                      <a:tailEnd type="none" w="med" len="med"/>
+                    </a:lnT>
+                    <a:lnB w="12700" cap="flat" cmpd="sng" algn="ctr">
+                      <a:solidFill>
+                        <a:scrgbClr r="0" g="0" b="0"/>
+                      </a:solidFill>
+                      <a:prstDash val="solid"/>
+                      <a:round/>
+                      <a:headEnd type="none" w="med" len="med"/>
+                      <a:tailEnd type="none" w="med" len="med"/>
+                    </a:lnB>
+                  </a:tcPr>
+                </a:tc>
+              </a:tr>
+              <a:tr h="370840">
+                <a:tc>
+                  <a:txBody>
+                    <a:bodyPr/>
+                    <a:lstStyle/>
+                    <a:p>
+                      <a:pPr marL="460375" indent="0" algn="l"/>
+                      <a:r>
+                        <a:rPr lang="en-US" dirty="0" smtClean="0">
+                          <a:latin typeface="Avenir Book"/>
+                          <a:cs typeface="Avenir Book"/>
+                        </a:rPr>
+                        <a:t>Asian</a:t>
+                      </a:r>
+                      <a:endParaRPr lang="en-US" dirty="0">
+                        <a:latin typeface="Avenir Book"/>
+                        <a:cs typeface="Avenir Book"/>
+                      </a:endParaRPr>
+                    </a:p>
+                  </a:txBody>
+                  <a:tcPr>
+                    <a:lnL w="12700" cap="flat" cmpd="sng" algn="ctr">
+                      <a:solidFill>
+                        <a:scrgbClr r="0" g="0" b="0"/>
+                      </a:solidFill>
+                      <a:prstDash val="solid"/>
+                      <a:round/>
+                      <a:headEnd type="none" w="med" len="med"/>
+                      <a:tailEnd type="none" w="med" len="med"/>
+                    </a:lnL>
+                    <a:lnR w="12700" cap="flat" cmpd="sng" algn="ctr">
+                      <a:solidFill>
+                        <a:scrgbClr r="0" g="0" b="0"/>
+                      </a:solidFill>
+                      <a:prstDash val="solid"/>
+                      <a:round/>
+                      <a:headEnd type="none" w="med" len="med"/>
+                      <a:tailEnd type="none" w="med" len="med"/>
+                    </a:lnR>
+                    <a:lnT w="12700" cap="flat" cmpd="sng" algn="ctr">
+                      <a:solidFill>
+                        <a:scrgbClr r="0" g="0" b="0"/>
+                      </a:solidFill>
+                      <a:prstDash val="solid"/>
+                      <a:round/>
+                      <a:headEnd type="none" w="med" len="med"/>
+                      <a:tailEnd type="none" w="med" len="med"/>
+                    </a:lnT>
+                    <a:lnB w="12700" cap="flat" cmpd="sng" algn="ctr">
+                      <a:solidFill>
+                        <a:scrgbClr r="0" g="0" b="0"/>
+                      </a:solidFill>
+                      <a:prstDash val="solid"/>
+                      <a:round/>
+                      <a:headEnd type="none" w="med" len="med"/>
+                      <a:tailEnd type="none" w="med" len="med"/>
+                    </a:lnB>
+                  </a:tcPr>
+                </a:tc>
+                <a:tc>
+                  <a:txBody>
+                    <a:bodyPr/>
+                    <a:lstStyle/>
+                    <a:p>
+                      <a:pPr algn="ctr"/>
+                      <a:r>
+                        <a:rPr lang="en-US" dirty="0" smtClean="0">
+                          <a:latin typeface="Avenir Book"/>
+                          <a:cs typeface="Avenir Book"/>
+                        </a:rPr>
+                        <a:t>&lt;0.001</a:t>
+                      </a:r>
+                      <a:endParaRPr lang="en-US" dirty="0">
+                        <a:latin typeface="Avenir Book"/>
+                        <a:cs typeface="Avenir Book"/>
+                      </a:endParaRPr>
+                    </a:p>
+                  </a:txBody>
+                  <a:tcPr>
+                    <a:lnL w="12700" cap="flat" cmpd="sng" algn="ctr">
+                      <a:solidFill>
+                        <a:scrgbClr r="0" g="0" b="0"/>
+                      </a:solidFill>
+                      <a:prstDash val="solid"/>
+                      <a:round/>
+                      <a:headEnd type="none" w="med" len="med"/>
+                      <a:tailEnd type="none" w="med" len="med"/>
+                    </a:lnL>
+                    <a:lnR w="12700" cap="flat" cmpd="sng" algn="ctr">
+                      <a:solidFill>
+                        <a:scrgbClr r="0" g="0" b="0"/>
+                      </a:solidFill>
+                      <a:prstDash val="solid"/>
+                      <a:round/>
+                      <a:headEnd type="none" w="med" len="med"/>
+                      <a:tailEnd type="none" w="med" len="med"/>
+                    </a:lnR>
+                    <a:lnT w="12700" cap="flat" cmpd="sng" algn="ctr">
+                      <a:solidFill>
+                        <a:scrgbClr r="0" g="0" b="0"/>
+                      </a:solidFill>
+                      <a:prstDash val="solid"/>
+                      <a:round/>
+                      <a:headEnd type="none" w="med" len="med"/>
+                      <a:tailEnd type="none" w="med" len="med"/>
+                    </a:lnT>
+                    <a:lnB w="12700" cap="flat" cmpd="sng" algn="ctr">
+                      <a:solidFill>
+                        <a:scrgbClr r="0" g="0" b="0"/>
+                      </a:solidFill>
+                      <a:prstDash val="solid"/>
+                      <a:round/>
+                      <a:headEnd type="none" w="med" len="med"/>
+                      <a:tailEnd type="none" w="med" len="med"/>
+                    </a:lnB>
+                  </a:tcPr>
+                </a:tc>
+                <a:tc>
+                  <a:txBody>
+                    <a:bodyPr/>
+                    <a:lstStyle/>
+                    <a:p>
+                      <a:pPr algn="ctr"/>
+                      <a:r>
+                        <a:rPr lang="en-US" dirty="0" smtClean="0">
+                          <a:latin typeface="Avenir Book"/>
+                          <a:cs typeface="Avenir Book"/>
+                        </a:rPr>
+                        <a:t>0.38</a:t>
+                      </a:r>
+                      <a:endParaRPr lang="en-US" dirty="0">
+                        <a:latin typeface="Avenir Book"/>
+                        <a:cs typeface="Avenir Book"/>
+                      </a:endParaRPr>
+                    </a:p>
+                  </a:txBody>
+                  <a:tcPr>
+                    <a:lnL w="12700" cap="flat" cmpd="sng" algn="ctr">
+                      <a:solidFill>
+                        <a:scrgbClr r="0" g="0" b="0"/>
+                      </a:solidFill>
+                      <a:prstDash val="solid"/>
+                      <a:round/>
+                      <a:headEnd type="none" w="med" len="med"/>
+                      <a:tailEnd type="none" w="med" len="med"/>
+                    </a:lnL>
+                    <a:lnR w="12700" cap="flat" cmpd="sng" algn="ctr">
+                      <a:solidFill>
+                        <a:scrgbClr r="0" g="0" b="0"/>
+                      </a:solidFill>
+                      <a:prstDash val="solid"/>
+                      <a:round/>
+                      <a:headEnd type="none" w="med" len="med"/>
+                      <a:tailEnd type="none" w="med" len="med"/>
+                    </a:lnR>
+                    <a:lnT w="12700" cap="flat" cmpd="sng" algn="ctr">
+                      <a:solidFill>
+                        <a:scrgbClr r="0" g="0" b="0"/>
+                      </a:solidFill>
+                      <a:prstDash val="solid"/>
+                      <a:round/>
+                      <a:headEnd type="none" w="med" len="med"/>
+                      <a:tailEnd type="none" w="med" len="med"/>
+                    </a:lnT>
+                    <a:lnB w="12700" cap="flat" cmpd="sng" algn="ctr">
+                      <a:solidFill>
+                        <a:scrgbClr r="0" g="0" b="0"/>
+                      </a:solidFill>
+                      <a:prstDash val="solid"/>
+                      <a:round/>
+                      <a:headEnd type="none" w="med" len="med"/>
+                      <a:tailEnd type="none" w="med" len="med"/>
+                    </a:lnB>
+                  </a:tcPr>
+                </a:tc>
+              </a:tr>
+              <a:tr h="370840">
+                <a:tc>
+                  <a:txBody>
+                    <a:bodyPr/>
+                    <a:lstStyle/>
+                    <a:p>
+                      <a:pPr marL="460375" indent="0" algn="l"/>
+                      <a:r>
+                        <a:rPr lang="en-US" dirty="0" smtClean="0">
+                          <a:latin typeface="Avenir Book"/>
+                          <a:cs typeface="Avenir Book"/>
+                        </a:rPr>
+                        <a:t>Black/African American</a:t>
+                      </a:r>
+                      <a:endParaRPr lang="en-US" dirty="0">
+                        <a:latin typeface="Avenir Book"/>
+                        <a:cs typeface="Avenir Book"/>
+                      </a:endParaRPr>
+                    </a:p>
+                  </a:txBody>
+                  <a:tcPr>
+                    <a:lnL w="12700" cap="flat" cmpd="sng" algn="ctr">
+                      <a:solidFill>
+                        <a:scrgbClr r="0" g="0" b="0"/>
+                      </a:solidFill>
+                      <a:prstDash val="solid"/>
+                      <a:round/>
+                      <a:headEnd type="none" w="med" len="med"/>
+                      <a:tailEnd type="none" w="med" len="med"/>
+                    </a:lnL>
+                    <a:lnR w="12700" cap="flat" cmpd="sng" algn="ctr">
+                      <a:solidFill>
+                        <a:scrgbClr r="0" g="0" b="0"/>
+                      </a:solidFill>
+                      <a:prstDash val="solid"/>
+                      <a:round/>
+                      <a:headEnd type="none" w="med" len="med"/>
+                      <a:tailEnd type="none" w="med" len="med"/>
+                    </a:lnR>
+                    <a:lnT w="12700" cap="flat" cmpd="sng" algn="ctr">
+                      <a:solidFill>
+                        <a:scrgbClr r="0" g="0" b="0"/>
+                      </a:solidFill>
+                      <a:prstDash val="solid"/>
+                      <a:round/>
+                      <a:headEnd type="none" w="med" len="med"/>
+                      <a:tailEnd type="none" w="med" len="med"/>
+                    </a:lnT>
+                    <a:lnB w="12700" cap="flat" cmpd="sng" algn="ctr">
+                      <a:solidFill>
+                        <a:scrgbClr r="0" g="0" b="0"/>
+                      </a:solidFill>
+                      <a:prstDash val="solid"/>
+                      <a:round/>
+                      <a:headEnd type="none" w="med" len="med"/>
+                      <a:tailEnd type="none" w="med" len="med"/>
+                    </a:lnB>
+                  </a:tcPr>
+                </a:tc>
+                <a:tc>
+                  <a:txBody>
+                    <a:bodyPr/>
+                    <a:lstStyle/>
+                    <a:p>
+                      <a:pPr algn="ctr"/>
+                      <a:r>
+                        <a:rPr lang="en-US" dirty="0" smtClean="0">
+                          <a:latin typeface="Avenir Book"/>
+                          <a:cs typeface="Avenir Book"/>
+                        </a:rPr>
+                        <a:t>0.841</a:t>
+                      </a:r>
+                      <a:endParaRPr lang="en-US" dirty="0">
+                        <a:latin typeface="Avenir Book"/>
+                        <a:cs typeface="Avenir Book"/>
+                      </a:endParaRPr>
+                    </a:p>
+                  </a:txBody>
+                  <a:tcPr>
+                    <a:lnL w="12700" cap="flat" cmpd="sng" algn="ctr">
+                      <a:solidFill>
+                        <a:scrgbClr r="0" g="0" b="0"/>
+                      </a:solidFill>
+                      <a:prstDash val="solid"/>
+                      <a:round/>
+                      <a:headEnd type="none" w="med" len="med"/>
+                      <a:tailEnd type="none" w="med" len="med"/>
+                    </a:lnL>
+                    <a:lnR w="12700" cap="flat" cmpd="sng" algn="ctr">
+                      <a:solidFill>
+                        <a:scrgbClr r="0" g="0" b="0"/>
+                      </a:solidFill>
+                      <a:prstDash val="solid"/>
+                      <a:round/>
+                      <a:headEnd type="none" w="med" len="med"/>
+                      <a:tailEnd type="none" w="med" len="med"/>
+                    </a:lnR>
+                    <a:lnT w="12700" cap="flat" cmpd="sng" algn="ctr">
+                      <a:solidFill>
+                        <a:scrgbClr r="0" g="0" b="0"/>
+                      </a:solidFill>
+                      <a:prstDash val="solid"/>
+                      <a:round/>
+                      <a:headEnd type="none" w="med" len="med"/>
+                      <a:tailEnd type="none" w="med" len="med"/>
+                    </a:lnT>
+                    <a:lnB w="12700" cap="flat" cmpd="sng" algn="ctr">
+                      <a:solidFill>
+                        <a:scrgbClr r="0" g="0" b="0"/>
+                      </a:solidFill>
+                      <a:prstDash val="solid"/>
+                      <a:round/>
+                      <a:headEnd type="none" w="med" len="med"/>
+                      <a:tailEnd type="none" w="med" len="med"/>
+                    </a:lnB>
+                  </a:tcPr>
+                </a:tc>
+                <a:tc>
+                  <a:txBody>
+                    <a:bodyPr/>
+                    <a:lstStyle/>
+                    <a:p>
+                      <a:pPr algn="ctr"/>
+                      <a:r>
+                        <a:rPr lang="en-US" dirty="0" smtClean="0">
+                          <a:latin typeface="Avenir Book"/>
+                          <a:cs typeface="Avenir Book"/>
+                        </a:rPr>
+                        <a:t>0.97</a:t>
+                      </a:r>
+                      <a:endParaRPr lang="en-US" dirty="0">
+                        <a:latin typeface="Avenir Book"/>
+                        <a:cs typeface="Avenir Book"/>
+                      </a:endParaRPr>
+                    </a:p>
+                  </a:txBody>
+                  <a:tcPr>
+                    <a:lnL w="12700" cap="flat" cmpd="sng" algn="ctr">
+                      <a:solidFill>
+                        <a:scrgbClr r="0" g="0" b="0"/>
+                      </a:solidFill>
+                      <a:prstDash val="solid"/>
+                      <a:round/>
+                      <a:headEnd type="none" w="med" len="med"/>
+                      <a:tailEnd type="none" w="med" len="med"/>
+                    </a:lnL>
+                    <a:lnR w="12700" cap="flat" cmpd="sng" algn="ctr">
+                      <a:solidFill>
+                        <a:scrgbClr r="0" g="0" b="0"/>
+                      </a:solidFill>
+                      <a:prstDash val="solid"/>
+                      <a:round/>
+                      <a:headEnd type="none" w="med" len="med"/>
+                      <a:tailEnd type="none" w="med" len="med"/>
+                    </a:lnR>
+                    <a:lnT w="12700" cap="flat" cmpd="sng" algn="ctr">
+                      <a:solidFill>
+                        <a:scrgbClr r="0" g="0" b="0"/>
+                      </a:solidFill>
+                      <a:prstDash val="solid"/>
+                      <a:round/>
+                      <a:headEnd type="none" w="med" len="med"/>
+                      <a:tailEnd type="none" w="med" len="med"/>
+                    </a:lnT>
+                    <a:lnB w="12700" cap="flat" cmpd="sng" algn="ctr">
+                      <a:solidFill>
+                        <a:scrgbClr r="0" g="0" b="0"/>
+                      </a:solidFill>
+                      <a:prstDash val="solid"/>
+                      <a:round/>
+                      <a:headEnd type="none" w="med" len="med"/>
+                      <a:tailEnd type="none" w="med" len="med"/>
+                    </a:lnB>
+                  </a:tcPr>
+                </a:tc>
+              </a:tr>
+              <a:tr h="370840">
+                <a:tc>
+                  <a:txBody>
+                    <a:bodyPr/>
+                    <a:lstStyle/>
+                    <a:p>
+                      <a:pPr marL="460375" indent="0" algn="l"/>
+                      <a:r>
+                        <a:rPr lang="en-US" dirty="0" smtClean="0">
+                          <a:latin typeface="Avenir Book"/>
+                          <a:cs typeface="Avenir Book"/>
+                        </a:rPr>
+                        <a:t>Hispanic/Latino</a:t>
+                      </a:r>
+                      <a:endParaRPr lang="en-US" dirty="0">
+                        <a:latin typeface="Avenir Book"/>
+                        <a:cs typeface="Avenir Book"/>
+                      </a:endParaRPr>
+                    </a:p>
+                  </a:txBody>
+                  <a:tcPr>
+                    <a:lnL w="12700" cap="flat" cmpd="sng" algn="ctr">
+                      <a:solidFill>
+                        <a:scrgbClr r="0" g="0" b="0"/>
+                      </a:solidFill>
+                      <a:prstDash val="solid"/>
+                      <a:round/>
+                      <a:headEnd type="none" w="med" len="med"/>
+                      <a:tailEnd type="none" w="med" len="med"/>
+                    </a:lnL>
+                    <a:lnR w="12700" cap="flat" cmpd="sng" algn="ctr">
+                      <a:solidFill>
+                        <a:scrgbClr r="0" g="0" b="0"/>
+                      </a:solidFill>
+                      <a:prstDash val="solid"/>
+                      <a:round/>
+                      <a:headEnd type="none" w="med" len="med"/>
+                      <a:tailEnd type="none" w="med" len="med"/>
+                    </a:lnR>
+                    <a:lnT w="12700" cap="flat" cmpd="sng" algn="ctr">
+                      <a:solidFill>
+                        <a:scrgbClr r="0" g="0" b="0"/>
+                      </a:solidFill>
+                      <a:prstDash val="solid"/>
+                      <a:round/>
+                      <a:headEnd type="none" w="med" len="med"/>
+                      <a:tailEnd type="none" w="med" len="med"/>
+                    </a:lnT>
+                    <a:lnB w="12700" cap="flat" cmpd="sng" algn="ctr">
+                      <a:solidFill>
+                        <a:scrgbClr r="0" g="0" b="0"/>
+                      </a:solidFill>
+                      <a:prstDash val="solid"/>
+                      <a:round/>
+                      <a:headEnd type="none" w="med" len="med"/>
+                      <a:tailEnd type="none" w="med" len="med"/>
+                    </a:lnB>
+                  </a:tcPr>
+                </a:tc>
+                <a:tc>
+                  <a:txBody>
+                    <a:bodyPr/>
+                    <a:lstStyle/>
+                    <a:p>
+                      <a:pPr algn="ctr"/>
+                      <a:r>
+                        <a:rPr lang="en-US" dirty="0" smtClean="0">
+                          <a:latin typeface="Avenir Book"/>
+                          <a:cs typeface="Avenir Book"/>
+                        </a:rPr>
+                        <a:t>0.037</a:t>
+                      </a:r>
+                      <a:endParaRPr lang="en-US" dirty="0">
+                        <a:latin typeface="Avenir Book"/>
+                        <a:cs typeface="Avenir Book"/>
+                      </a:endParaRPr>
+                    </a:p>
+                  </a:txBody>
+                  <a:tcPr>
+                    <a:lnL w="12700" cap="flat" cmpd="sng" algn="ctr">
+                      <a:solidFill>
+                        <a:scrgbClr r="0" g="0" b="0"/>
+                      </a:solidFill>
+                      <a:prstDash val="solid"/>
+                      <a:round/>
+                      <a:headEnd type="none" w="med" len="med"/>
+                      <a:tailEnd type="none" w="med" len="med"/>
+                    </a:lnL>
+                    <a:lnR w="12700" cap="flat" cmpd="sng" algn="ctr">
+                      <a:solidFill>
+                        <a:scrgbClr r="0" g="0" b="0"/>
+                      </a:solidFill>
+                      <a:prstDash val="solid"/>
+                      <a:round/>
+                      <a:headEnd type="none" w="med" len="med"/>
+                      <a:tailEnd type="none" w="med" len="med"/>
+                    </a:lnR>
+                    <a:lnT w="12700" cap="flat" cmpd="sng" algn="ctr">
+                      <a:solidFill>
+                        <a:scrgbClr r="0" g="0" b="0"/>
+                      </a:solidFill>
+                      <a:prstDash val="solid"/>
+                      <a:round/>
+                      <a:headEnd type="none" w="med" len="med"/>
+                      <a:tailEnd type="none" w="med" len="med"/>
+                    </a:lnT>
+                    <a:lnB w="12700" cap="flat" cmpd="sng" algn="ctr">
+                      <a:solidFill>
+                        <a:scrgbClr r="0" g="0" b="0"/>
+                      </a:solidFill>
+                      <a:prstDash val="solid"/>
+                      <a:round/>
+                      <a:headEnd type="none" w="med" len="med"/>
+                      <a:tailEnd type="none" w="med" len="med"/>
+                    </a:lnB>
+                  </a:tcPr>
+                </a:tc>
+                <a:tc>
+                  <a:txBody>
+                    <a:bodyPr/>
+                    <a:lstStyle/>
+                    <a:p>
+                      <a:pPr algn="ctr"/>
+                      <a:r>
+                        <a:rPr lang="en-US" dirty="0" smtClean="0">
+                          <a:latin typeface="Avenir Book"/>
+                          <a:cs typeface="Avenir Book"/>
+                        </a:rPr>
+                        <a:t>0.69</a:t>
+                      </a:r>
+                      <a:endParaRPr lang="en-US" dirty="0">
+                        <a:latin typeface="Avenir Book"/>
+                        <a:cs typeface="Avenir Book"/>
+                      </a:endParaRPr>
+                    </a:p>
+                  </a:txBody>
+                  <a:tcPr>
+                    <a:lnL w="12700" cap="flat" cmpd="sng" algn="ctr">
+                      <a:solidFill>
+                        <a:scrgbClr r="0" g="0" b="0"/>
+                      </a:solidFill>
+                      <a:prstDash val="solid"/>
+                      <a:round/>
+                      <a:headEnd type="none" w="med" len="med"/>
+                      <a:tailEnd type="none" w="med" len="med"/>
+                    </a:lnL>
+                    <a:lnR w="12700" cap="flat" cmpd="sng" algn="ctr">
+                      <a:solidFill>
+                        <a:scrgbClr r="0" g="0" b="0"/>
+                      </a:solidFill>
+                      <a:prstDash val="solid"/>
+                      <a:round/>
+                      <a:headEnd type="none" w="med" len="med"/>
+                      <a:tailEnd type="none" w="med" len="med"/>
+                    </a:lnR>
+                    <a:lnT w="12700" cap="flat" cmpd="sng" algn="ctr">
+                      <a:solidFill>
+                        <a:scrgbClr r="0" g="0" b="0"/>
+                      </a:solidFill>
+                      <a:prstDash val="solid"/>
+                      <a:round/>
+                      <a:headEnd type="none" w="med" len="med"/>
+                      <a:tailEnd type="none" w="med" len="med"/>
+                    </a:lnT>
+                    <a:lnB w="12700" cap="flat" cmpd="sng" algn="ctr">
+                      <a:solidFill>
+                        <a:scrgbClr r="0" g="0" b="0"/>
+                      </a:solidFill>
+                      <a:prstDash val="solid"/>
+                      <a:round/>
+                      <a:headEnd type="none" w="med" len="med"/>
+                      <a:tailEnd type="none" w="med" len="med"/>
+                    </a:lnB>
+                  </a:tcPr>
+                </a:tc>
+              </a:tr>
+              <a:tr h="370840">
+                <a:tc>
+                  <a:txBody>
+                    <a:bodyPr/>
+                    <a:lstStyle/>
+                    <a:p>
+                      <a:pPr marL="460375" indent="0" algn="l"/>
+                      <a:r>
+                        <a:rPr lang="en-US" dirty="0" smtClean="0">
+                          <a:latin typeface="Avenir Book"/>
+                          <a:cs typeface="Avenir Book"/>
+                        </a:rPr>
+                        <a:t>Multi/Other</a:t>
+                      </a:r>
+                      <a:endParaRPr lang="en-US" dirty="0">
+                        <a:latin typeface="Avenir Book"/>
+                        <a:cs typeface="Avenir Book"/>
+                      </a:endParaRPr>
+                    </a:p>
+                  </a:txBody>
+                  <a:tcPr>
+                    <a:lnL w="12700" cap="flat" cmpd="sng" algn="ctr">
+                      <a:solidFill>
+                        <a:scrgbClr r="0" g="0" b="0"/>
+                      </a:solidFill>
+                      <a:prstDash val="solid"/>
+                      <a:round/>
+                      <a:headEnd type="none" w="med" len="med"/>
+                      <a:tailEnd type="none" w="med" len="med"/>
+                    </a:lnL>
+                    <a:lnR w="12700" cap="flat" cmpd="sng" algn="ctr">
+                      <a:solidFill>
+                        <a:scrgbClr r="0" g="0" b="0"/>
+                      </a:solidFill>
+                      <a:prstDash val="solid"/>
+                      <a:round/>
+                      <a:headEnd type="none" w="med" len="med"/>
+                      <a:tailEnd type="none" w="med" len="med"/>
+                    </a:lnR>
+                    <a:lnT w="12700" cap="flat" cmpd="sng" algn="ctr">
+                      <a:solidFill>
+                        <a:scrgbClr r="0" g="0" b="0"/>
+                      </a:solidFill>
+                      <a:prstDash val="solid"/>
+                      <a:round/>
+                      <a:headEnd type="none" w="med" len="med"/>
+                      <a:tailEnd type="none" w="med" len="med"/>
+                    </a:lnT>
+                    <a:lnB w="12700" cap="flat" cmpd="sng" algn="ctr">
+                      <a:solidFill>
+                        <a:scrgbClr r="0" g="0" b="0"/>
+                      </a:solidFill>
+                      <a:prstDash val="solid"/>
+                      <a:round/>
+                      <a:headEnd type="none" w="med" len="med"/>
+                      <a:tailEnd type="none" w="med" len="med"/>
+                    </a:lnB>
+                  </a:tcPr>
+                </a:tc>
+                <a:tc>
+                  <a:txBody>
+                    <a:bodyPr/>
+                    <a:lstStyle/>
+                    <a:p>
+                      <a:pPr algn="ctr"/>
+                      <a:r>
+                        <a:rPr lang="en-US" dirty="0" smtClean="0">
+                          <a:latin typeface="Avenir Book"/>
+                          <a:cs typeface="Avenir Book"/>
+                        </a:rPr>
+                        <a:t>0.152</a:t>
+                      </a:r>
+                      <a:endParaRPr lang="en-US" dirty="0">
+                        <a:latin typeface="Avenir Book"/>
+                        <a:cs typeface="Avenir Book"/>
+                      </a:endParaRPr>
+                    </a:p>
+                  </a:txBody>
+                  <a:tcPr>
+                    <a:lnL w="12700" cap="flat" cmpd="sng" algn="ctr">
+                      <a:solidFill>
+                        <a:scrgbClr r="0" g="0" b="0"/>
+                      </a:solidFill>
+                      <a:prstDash val="solid"/>
+                      <a:round/>
+                      <a:headEnd type="none" w="med" len="med"/>
+                      <a:tailEnd type="none" w="med" len="med"/>
+                    </a:lnL>
+                    <a:lnR w="12700" cap="flat" cmpd="sng" algn="ctr">
+                      <a:solidFill>
+                        <a:scrgbClr r="0" g="0" b="0"/>
+                      </a:solidFill>
+                      <a:prstDash val="solid"/>
+                      <a:round/>
+                      <a:headEnd type="none" w="med" len="med"/>
+                      <a:tailEnd type="none" w="med" len="med"/>
+                    </a:lnR>
+                    <a:lnT w="12700" cap="flat" cmpd="sng" algn="ctr">
+                      <a:solidFill>
+                        <a:scrgbClr r="0" g="0" b="0"/>
+                      </a:solidFill>
+                      <a:prstDash val="solid"/>
+                      <a:round/>
+                      <a:headEnd type="none" w="med" len="med"/>
+                      <a:tailEnd type="none" w="med" len="med"/>
+                    </a:lnT>
+                    <a:lnB w="12700" cap="flat" cmpd="sng" algn="ctr">
+                      <a:solidFill>
+                        <a:scrgbClr r="0" g="0" b="0"/>
+                      </a:solidFill>
+                      <a:prstDash val="solid"/>
+                      <a:round/>
+                      <a:headEnd type="none" w="med" len="med"/>
+                      <a:tailEnd type="none" w="med" len="med"/>
+                    </a:lnB>
+                  </a:tcPr>
+                </a:tc>
+                <a:tc>
+                  <a:txBody>
+                    <a:bodyPr/>
+                    <a:lstStyle/>
+                    <a:p>
+                      <a:pPr algn="ctr"/>
+                      <a:r>
+                        <a:rPr lang="en-US" dirty="0" smtClean="0">
+                          <a:latin typeface="Avenir Book"/>
+                          <a:cs typeface="Avenir Book"/>
+                        </a:rPr>
+                        <a:t>0.75</a:t>
+                      </a:r>
+                      <a:endParaRPr lang="en-US" dirty="0">
+                        <a:latin typeface="Avenir Book"/>
+                        <a:cs typeface="Avenir Book"/>
+                      </a:endParaRPr>
+                    </a:p>
+                  </a:txBody>
+                  <a:tcPr>
+                    <a:lnL w="12700" cap="flat" cmpd="sng" algn="ctr">
+                      <a:solidFill>
+                        <a:scrgbClr r="0" g="0" b="0"/>
+                      </a:solidFill>
+                      <a:prstDash val="solid"/>
+                      <a:round/>
+                      <a:headEnd type="none" w="med" len="med"/>
+                      <a:tailEnd type="none" w="med" len="med"/>
+                    </a:lnL>
+                    <a:lnR w="12700" cap="flat" cmpd="sng" algn="ctr">
+                      <a:solidFill>
+                        <a:scrgbClr r="0" g="0" b="0"/>
+                      </a:solidFill>
+                      <a:prstDash val="solid"/>
+                      <a:round/>
+                      <a:headEnd type="none" w="med" len="med"/>
+                      <a:tailEnd type="none" w="med" len="med"/>
+                    </a:lnR>
+                    <a:lnT w="12700" cap="flat" cmpd="sng" algn="ctr">
+                      <a:solidFill>
+                        <a:scrgbClr r="0" g="0" b="0"/>
+                      </a:solidFill>
+                      <a:prstDash val="solid"/>
+                      <a:round/>
+                      <a:headEnd type="none" w="med" len="med"/>
+                      <a:tailEnd type="none" w="med" len="med"/>
+                    </a:lnT>
+                    <a:lnB w="12700" cap="flat" cmpd="sng" algn="ctr">
+                      <a:solidFill>
+                        <a:scrgbClr r="0" g="0" b="0"/>
+                      </a:solidFill>
+                      <a:prstDash val="solid"/>
+                      <a:round/>
+                      <a:headEnd type="none" w="med" len="med"/>
+                      <a:tailEnd type="none" w="med" len="med"/>
+                    </a:lnB>
+                  </a:tcPr>
+                </a:tc>
+              </a:tr>
+              <a:tr h="370840">
+                <a:tc>
+                  <a:txBody>
+                    <a:bodyPr/>
+                    <a:lstStyle/>
+                    <a:p>
+                      <a:pPr marL="460375" indent="0" algn="l"/>
+                      <a:r>
+                        <a:rPr lang="en-US" dirty="0" smtClean="0">
+                          <a:latin typeface="Avenir Book"/>
+                          <a:cs typeface="Avenir Book"/>
+                        </a:rPr>
+                        <a:t>Unknown</a:t>
+                      </a:r>
+                      <a:endParaRPr lang="en-US" dirty="0">
+                        <a:latin typeface="Avenir Book"/>
+                        <a:cs typeface="Avenir Book"/>
+                      </a:endParaRPr>
+                    </a:p>
+                  </a:txBody>
+                  <a:tcPr>
+                    <a:lnL w="12700" cap="flat" cmpd="sng" algn="ctr">
+                      <a:solidFill>
+                        <a:scrgbClr r="0" g="0" b="0"/>
+                      </a:solidFill>
+                      <a:prstDash val="solid"/>
+                      <a:round/>
+                      <a:headEnd type="none" w="med" len="med"/>
+                      <a:tailEnd type="none" w="med" len="med"/>
+                    </a:lnL>
+                    <a:lnR w="12700" cap="flat" cmpd="sng" algn="ctr">
+                      <a:solidFill>
+                        <a:scrgbClr r="0" g="0" b="0"/>
+                      </a:solidFill>
+                      <a:prstDash val="solid"/>
+                      <a:round/>
+                      <a:headEnd type="none" w="med" len="med"/>
+                      <a:tailEnd type="none" w="med" len="med"/>
+                    </a:lnR>
+                    <a:lnT w="12700" cap="flat" cmpd="sng" algn="ctr">
+                      <a:solidFill>
+                        <a:scrgbClr r="0" g="0" b="0"/>
+                      </a:solidFill>
+                      <a:prstDash val="solid"/>
+                      <a:round/>
+                      <a:headEnd type="none" w="med" len="med"/>
+                      <a:tailEnd type="none" w="med" len="med"/>
+                    </a:lnT>
+                    <a:lnB w="12700" cap="flat" cmpd="sng" algn="ctr">
+                      <a:solidFill>
+                        <a:scrgbClr r="0" g="0" b="0"/>
+                      </a:solidFill>
+                      <a:prstDash val="solid"/>
+                      <a:round/>
+                      <a:headEnd type="none" w="med" len="med"/>
+                      <a:tailEnd type="none" w="med" len="med"/>
+                    </a:lnB>
+                  </a:tcPr>
+                </a:tc>
+                <a:tc>
+                  <a:txBody>
+                    <a:bodyPr/>
+                    <a:lstStyle/>
+                    <a:p>
+                      <a:pPr algn="ctr"/>
+                      <a:r>
+                        <a:rPr lang="en-US" dirty="0" smtClean="0">
+                          <a:latin typeface="Avenir Book"/>
+                          <a:cs typeface="Avenir Book"/>
+                        </a:rPr>
+                        <a:t>0.502</a:t>
+                      </a:r>
+                      <a:endParaRPr lang="en-US" dirty="0">
+                        <a:latin typeface="Avenir Book"/>
+                        <a:cs typeface="Avenir Book"/>
+                      </a:endParaRPr>
+                    </a:p>
+                  </a:txBody>
+                  <a:tcPr>
+                    <a:lnL w="12700" cap="flat" cmpd="sng" algn="ctr">
+                      <a:solidFill>
+                        <a:scrgbClr r="0" g="0" b="0"/>
+                      </a:solidFill>
+                      <a:prstDash val="solid"/>
+                      <a:round/>
+                      <a:headEnd type="none" w="med" len="med"/>
+                      <a:tailEnd type="none" w="med" len="med"/>
+                    </a:lnL>
+                    <a:lnR w="12700" cap="flat" cmpd="sng" algn="ctr">
+                      <a:solidFill>
+                        <a:scrgbClr r="0" g="0" b="0"/>
+                      </a:solidFill>
+                      <a:prstDash val="solid"/>
+                      <a:round/>
+                      <a:headEnd type="none" w="med" len="med"/>
+                      <a:tailEnd type="none" w="med" len="med"/>
+                    </a:lnR>
+                    <a:lnT w="12700" cap="flat" cmpd="sng" algn="ctr">
+                      <a:solidFill>
+                        <a:scrgbClr r="0" g="0" b="0"/>
+                      </a:solidFill>
+                      <a:prstDash val="solid"/>
+                      <a:round/>
+                      <a:headEnd type="none" w="med" len="med"/>
+                      <a:tailEnd type="none" w="med" len="med"/>
+                    </a:lnT>
+                    <a:lnB w="12700" cap="flat" cmpd="sng" algn="ctr">
+                      <a:solidFill>
+                        <a:scrgbClr r="0" g="0" b="0"/>
+                      </a:solidFill>
+                      <a:prstDash val="solid"/>
+                      <a:round/>
+                      <a:headEnd type="none" w="med" len="med"/>
+                      <a:tailEnd type="none" w="med" len="med"/>
+                    </a:lnB>
+                  </a:tcPr>
+                </a:tc>
+                <a:tc>
+                  <a:txBody>
+                    <a:bodyPr/>
+                    <a:lstStyle/>
+                    <a:p>
+                      <a:pPr algn="ctr"/>
+                      <a:r>
+                        <a:rPr lang="en-US" dirty="0" smtClean="0">
+                          <a:latin typeface="Avenir Book"/>
+                          <a:cs typeface="Avenir Book"/>
+                        </a:rPr>
+                        <a:t>0.93</a:t>
+                      </a:r>
+                      <a:endParaRPr lang="en-US" dirty="0">
+                        <a:latin typeface="Avenir Book"/>
+                        <a:cs typeface="Avenir Book"/>
+                      </a:endParaRPr>
+                    </a:p>
+                  </a:txBody>
+                  <a:tcPr>
+                    <a:lnL w="12700" cap="flat" cmpd="sng" algn="ctr">
+                      <a:solidFill>
+                        <a:scrgbClr r="0" g="0" b="0"/>
+                      </a:solidFill>
+                      <a:prstDash val="solid"/>
+                      <a:round/>
+                      <a:headEnd type="none" w="med" len="med"/>
+                      <a:tailEnd type="none" w="med" len="med"/>
+                    </a:lnL>
+                    <a:lnR w="12700" cap="flat" cmpd="sng" algn="ctr">
+                      <a:solidFill>
+                        <a:scrgbClr r="0" g="0" b="0"/>
+                      </a:solidFill>
+                      <a:prstDash val="solid"/>
+                      <a:round/>
+                      <a:headEnd type="none" w="med" len="med"/>
+                      <a:tailEnd type="none" w="med" len="med"/>
+                    </a:lnR>
+                    <a:lnT w="12700" cap="flat" cmpd="sng" algn="ctr">
+                      <a:solidFill>
+                        <a:scrgbClr r="0" g="0" b="0"/>
+                      </a:solidFill>
+                      <a:prstDash val="solid"/>
+                      <a:round/>
+                      <a:headEnd type="none" w="med" len="med"/>
+                      <a:tailEnd type="none" w="med" len="med"/>
+                    </a:lnT>
+                    <a:lnB w="12700" cap="flat" cmpd="sng" algn="ctr">
+                      <a:solidFill>
+                        <a:scrgbClr r="0" g="0" b="0"/>
+                      </a:solidFill>
+                      <a:prstDash val="solid"/>
+                      <a:round/>
+                      <a:headEnd type="none" w="med" len="med"/>
+                      <a:tailEnd type="none" w="med" len="med"/>
+                    </a:lnB>
+                  </a:tcPr>
+                </a:tc>
+              </a:tr>
+              <a:tr h="370840">
+                <a:tc>
+                  <a:txBody>
+                    <a:bodyPr/>
+                    <a:lstStyle/>
+                    <a:p>
+                      <a:pPr algn="l"/>
+                      <a:r>
+                        <a:rPr lang="en-US" dirty="0" smtClean="0">
+                          <a:latin typeface="Avenir Book"/>
+                          <a:cs typeface="Avenir Book"/>
+                        </a:rPr>
+                        <a:t>Length of Stay</a:t>
+                      </a:r>
+                      <a:endParaRPr lang="en-US" dirty="0">
+                        <a:latin typeface="Avenir Book"/>
+                        <a:cs typeface="Avenir Book"/>
+                      </a:endParaRPr>
+                    </a:p>
+                  </a:txBody>
+                  <a:tcPr>
+                    <a:lnL w="12700" cap="flat" cmpd="sng" algn="ctr">
+                      <a:solidFill>
+                        <a:scrgbClr r="0" g="0" b="0"/>
+                      </a:solidFill>
+                      <a:prstDash val="solid"/>
+                      <a:round/>
+                      <a:headEnd type="none" w="med" len="med"/>
+                      <a:tailEnd type="none" w="med" len="med"/>
+                    </a:lnL>
+                    <a:lnR w="12700" cap="flat" cmpd="sng" algn="ctr">
+                      <a:solidFill>
+                        <a:scrgbClr r="0" g="0" b="0"/>
+                      </a:solidFill>
+                      <a:prstDash val="solid"/>
+                      <a:round/>
+                      <a:headEnd type="none" w="med" len="med"/>
+                      <a:tailEnd type="none" w="med" len="med"/>
+                    </a:lnR>
+                    <a:lnT w="12700" cap="flat" cmpd="sng" algn="ctr">
+                      <a:solidFill>
+                        <a:scrgbClr r="0" g="0" b="0"/>
+                      </a:solidFill>
+                      <a:prstDash val="solid"/>
+                      <a:round/>
+                      <a:headEnd type="none" w="med" len="med"/>
+                      <a:tailEnd type="none" w="med" len="med"/>
+                    </a:lnT>
+                    <a:lnB w="12700" cap="flat" cmpd="sng" algn="ctr">
+                      <a:solidFill>
+                        <a:scrgbClr r="0" g="0" b="0"/>
+                      </a:solidFill>
+                      <a:prstDash val="solid"/>
+                      <a:round/>
+                      <a:headEnd type="none" w="med" len="med"/>
+                      <a:tailEnd type="none" w="med" len="med"/>
+                    </a:lnB>
+                  </a:tcPr>
+                </a:tc>
+                <a:tc>
+                  <a:txBody>
+                    <a:bodyPr/>
+                    <a:lstStyle/>
+                    <a:p>
+                      <a:pPr algn="ctr"/>
+                      <a:r>
+                        <a:rPr lang="en-US" dirty="0" smtClean="0">
+                          <a:latin typeface="Avenir Book"/>
+                          <a:cs typeface="Avenir Book"/>
+                        </a:rPr>
+                        <a:t>&lt;0.001</a:t>
+                      </a:r>
+                      <a:endParaRPr lang="en-US" dirty="0">
+                        <a:latin typeface="Avenir Book"/>
+                        <a:cs typeface="Avenir Book"/>
+                      </a:endParaRPr>
+                    </a:p>
+                  </a:txBody>
+                  <a:tcPr>
+                    <a:lnL w="12700" cap="flat" cmpd="sng" algn="ctr">
+                      <a:solidFill>
+                        <a:scrgbClr r="0" g="0" b="0"/>
+                      </a:solidFill>
+                      <a:prstDash val="solid"/>
+                      <a:round/>
+                      <a:headEnd type="none" w="med" len="med"/>
+                      <a:tailEnd type="none" w="med" len="med"/>
+                    </a:lnL>
+                    <a:lnR w="12700" cap="flat" cmpd="sng" algn="ctr">
+                      <a:solidFill>
+                        <a:scrgbClr r="0" g="0" b="0"/>
+                      </a:solidFill>
+                      <a:prstDash val="solid"/>
+                      <a:round/>
+                      <a:headEnd type="none" w="med" len="med"/>
+                      <a:tailEnd type="none" w="med" len="med"/>
+                    </a:lnR>
+                    <a:lnT w="12700" cap="flat" cmpd="sng" algn="ctr">
+                      <a:solidFill>
+                        <a:scrgbClr r="0" g="0" b="0"/>
+                      </a:solidFill>
+                      <a:prstDash val="solid"/>
+                      <a:round/>
+                      <a:headEnd type="none" w="med" len="med"/>
+                      <a:tailEnd type="none" w="med" len="med"/>
+                    </a:lnT>
+                    <a:lnB w="12700" cap="flat" cmpd="sng" algn="ctr">
+                      <a:solidFill>
+                        <a:scrgbClr r="0" g="0" b="0"/>
+                      </a:solidFill>
+                      <a:prstDash val="solid"/>
+                      <a:round/>
+                      <a:headEnd type="none" w="med" len="med"/>
+                      <a:tailEnd type="none" w="med" len="med"/>
+                    </a:lnB>
+                  </a:tcPr>
+                </a:tc>
+                <a:tc>
+                  <a:txBody>
+                    <a:bodyPr/>
+                    <a:lstStyle/>
+                    <a:p>
+                      <a:pPr algn="ctr"/>
+                      <a:r>
+                        <a:rPr lang="en-US" dirty="0" smtClean="0">
+                          <a:latin typeface="Avenir Book"/>
+                          <a:cs typeface="Avenir Book"/>
+                        </a:rPr>
+                        <a:t>1.05</a:t>
+                      </a:r>
+                      <a:endParaRPr lang="en-US" dirty="0">
+                        <a:latin typeface="Avenir Book"/>
+                        <a:cs typeface="Avenir Book"/>
+                      </a:endParaRPr>
+                    </a:p>
+                  </a:txBody>
+                  <a:tcPr>
+                    <a:lnL w="12700" cap="flat" cmpd="sng" algn="ctr">
+                      <a:solidFill>
+                        <a:scrgbClr r="0" g="0" b="0"/>
+                      </a:solidFill>
+                      <a:prstDash val="solid"/>
+                      <a:round/>
+                      <a:headEnd type="none" w="med" len="med"/>
+                      <a:tailEnd type="none" w="med" len="med"/>
+                    </a:lnL>
+                    <a:lnR w="12700" cap="flat" cmpd="sng" algn="ctr">
+                      <a:solidFill>
+                        <a:scrgbClr r="0" g="0" b="0"/>
+                      </a:solidFill>
+                      <a:prstDash val="solid"/>
+                      <a:round/>
+                      <a:headEnd type="none" w="med" len="med"/>
+                      <a:tailEnd type="none" w="med" len="med"/>
+                    </a:lnR>
+                    <a:lnT w="12700" cap="flat" cmpd="sng" algn="ctr">
+                      <a:solidFill>
+                        <a:scrgbClr r="0" g="0" b="0"/>
+                      </a:solidFill>
+                      <a:prstDash val="solid"/>
+                      <a:round/>
+                      <a:headEnd type="none" w="med" len="med"/>
+                      <a:tailEnd type="none" w="med" len="med"/>
+                    </a:lnT>
+                    <a:lnB w="12700" cap="flat" cmpd="sng" algn="ctr">
+                      <a:solidFill>
+                        <a:scrgbClr r="0" g="0" b="0"/>
+                      </a:solidFill>
+                      <a:prstDash val="solid"/>
+                      <a:round/>
+                      <a:headEnd type="none" w="med" len="med"/>
+                      <a:tailEnd type="none" w="med" len="med"/>
+                    </a:lnB>
+                  </a:tcPr>
+                </a:tc>
+              </a:tr>
+              <a:tr h="370840">
+                <a:tc>
+                  <a:txBody>
+                    <a:bodyPr/>
+                    <a:lstStyle/>
+                    <a:p>
+                      <a:pPr algn="l"/>
+                      <a:r>
+                        <a:rPr lang="en-US" dirty="0" smtClean="0">
+                          <a:latin typeface="Avenir Book"/>
+                          <a:cs typeface="Avenir Book"/>
+                        </a:rPr>
+                        <a:t>Maximum Lactate</a:t>
+                      </a:r>
+                      <a:endParaRPr lang="en-US" dirty="0">
+                        <a:latin typeface="Avenir Book"/>
+                        <a:cs typeface="Avenir Book"/>
+                      </a:endParaRPr>
+                    </a:p>
+                  </a:txBody>
+                  <a:tcPr>
+                    <a:lnL w="12700" cap="flat" cmpd="sng" algn="ctr">
+                      <a:solidFill>
+                        <a:scrgbClr r="0" g="0" b="0"/>
+                      </a:solidFill>
+                      <a:prstDash val="solid"/>
+                      <a:round/>
+                      <a:headEnd type="none" w="med" len="med"/>
+                      <a:tailEnd type="none" w="med" len="med"/>
+                    </a:lnL>
+                    <a:lnR w="12700" cap="flat" cmpd="sng" algn="ctr">
+                      <a:solidFill>
+                        <a:scrgbClr r="0" g="0" b="0"/>
+                      </a:solidFill>
+                      <a:prstDash val="solid"/>
+                      <a:round/>
+                      <a:headEnd type="none" w="med" len="med"/>
+                      <a:tailEnd type="none" w="med" len="med"/>
+                    </a:lnR>
+                    <a:lnT w="12700" cap="flat" cmpd="sng" algn="ctr">
+                      <a:solidFill>
+                        <a:scrgbClr r="0" g="0" b="0"/>
+                      </a:solidFill>
+                      <a:prstDash val="solid"/>
+                      <a:round/>
+                      <a:headEnd type="none" w="med" len="med"/>
+                      <a:tailEnd type="none" w="med" len="med"/>
+                    </a:lnT>
+                    <a:lnB w="12700" cap="flat" cmpd="sng" algn="ctr">
+                      <a:solidFill>
+                        <a:scrgbClr r="0" g="0" b="0"/>
+                      </a:solidFill>
+                      <a:prstDash val="solid"/>
+                      <a:round/>
+                      <a:headEnd type="none" w="med" len="med"/>
+                      <a:tailEnd type="none" w="med" len="med"/>
+                    </a:lnB>
+                  </a:tcPr>
+                </a:tc>
+                <a:tc>
+                  <a:txBody>
+                    <a:bodyPr/>
+                    <a:lstStyle/>
+                    <a:p>
+                      <a:pPr algn="ctr"/>
+                      <a:r>
+                        <a:rPr lang="en-US" dirty="0" smtClean="0">
+                          <a:latin typeface="Avenir Book"/>
+                          <a:cs typeface="Avenir Book"/>
+                        </a:rPr>
+                        <a:t>&lt;0.001</a:t>
+                      </a:r>
+                      <a:endParaRPr lang="en-US" dirty="0">
+                        <a:latin typeface="Avenir Book"/>
+                        <a:cs typeface="Avenir Book"/>
+                      </a:endParaRPr>
+                    </a:p>
+                  </a:txBody>
+                  <a:tcPr>
+                    <a:lnL w="12700" cap="flat" cmpd="sng" algn="ctr">
+                      <a:solidFill>
+                        <a:scrgbClr r="0" g="0" b="0"/>
+                      </a:solidFill>
+                      <a:prstDash val="solid"/>
+                      <a:round/>
+                      <a:headEnd type="none" w="med" len="med"/>
+                      <a:tailEnd type="none" w="med" len="med"/>
+                    </a:lnL>
+                    <a:lnR w="12700" cap="flat" cmpd="sng" algn="ctr">
+                      <a:solidFill>
+                        <a:scrgbClr r="0" g="0" b="0"/>
+                      </a:solidFill>
+                      <a:prstDash val="solid"/>
+                      <a:round/>
+                      <a:headEnd type="none" w="med" len="med"/>
+                      <a:tailEnd type="none" w="med" len="med"/>
+                    </a:lnR>
+                    <a:lnT w="12700" cap="flat" cmpd="sng" algn="ctr">
+                      <a:solidFill>
+                        <a:scrgbClr r="0" g="0" b="0"/>
+                      </a:solidFill>
+                      <a:prstDash val="solid"/>
+                      <a:round/>
+                      <a:headEnd type="none" w="med" len="med"/>
+                      <a:tailEnd type="none" w="med" len="med"/>
+                    </a:lnT>
+                    <a:lnB w="12700" cap="flat" cmpd="sng" algn="ctr">
+                      <a:solidFill>
+                        <a:scrgbClr r="0" g="0" b="0"/>
+                      </a:solidFill>
+                      <a:prstDash val="solid"/>
+                      <a:round/>
+                      <a:headEnd type="none" w="med" len="med"/>
+                      <a:tailEnd type="none" w="med" len="med"/>
+                    </a:lnB>
+                  </a:tcPr>
+                </a:tc>
+                <a:tc>
+                  <a:txBody>
+                    <a:bodyPr/>
+                    <a:lstStyle/>
+                    <a:p>
+                      <a:pPr algn="ctr"/>
+                      <a:r>
+                        <a:rPr lang="en-US" dirty="0" smtClean="0">
+                          <a:latin typeface="Avenir Book"/>
+                          <a:cs typeface="Avenir Book"/>
+                        </a:rPr>
+                        <a:t>1.05</a:t>
+                      </a:r>
+                      <a:endParaRPr lang="en-US" dirty="0">
+                        <a:latin typeface="Avenir Book"/>
+                        <a:cs typeface="Avenir Book"/>
+                      </a:endParaRPr>
+                    </a:p>
+                  </a:txBody>
+                  <a:tcPr>
+                    <a:lnL w="12700" cap="flat" cmpd="sng" algn="ctr">
+                      <a:solidFill>
+                        <a:scrgbClr r="0" g="0" b="0"/>
+                      </a:solidFill>
+                      <a:prstDash val="solid"/>
+                      <a:round/>
+                      <a:headEnd type="none" w="med" len="med"/>
+                      <a:tailEnd type="none" w="med" len="med"/>
+                    </a:lnL>
+                    <a:lnR w="12700" cap="flat" cmpd="sng" algn="ctr">
+                      <a:solidFill>
+                        <a:scrgbClr r="0" g="0" b="0"/>
+                      </a:solidFill>
+                      <a:prstDash val="solid"/>
+                      <a:round/>
+                      <a:headEnd type="none" w="med" len="med"/>
+                      <a:tailEnd type="none" w="med" len="med"/>
+                    </a:lnR>
+                    <a:lnT w="12700" cap="flat" cmpd="sng" algn="ctr">
+                      <a:solidFill>
+                        <a:scrgbClr r="0" g="0" b="0"/>
+                      </a:solidFill>
+                      <a:prstDash val="solid"/>
+                      <a:round/>
+                      <a:headEnd type="none" w="med" len="med"/>
+                      <a:tailEnd type="none" w="med" len="med"/>
+                    </a:lnT>
+                    <a:lnB w="12700" cap="flat" cmpd="sng" algn="ctr">
+                      <a:solidFill>
+                        <a:scrgbClr r="0" g="0" b="0"/>
+                      </a:solidFill>
+                      <a:prstDash val="solid"/>
+                      <a:round/>
+                      <a:headEnd type="none" w="med" len="med"/>
+                      <a:tailEnd type="none" w="med" len="med"/>
+                    </a:lnB>
+                  </a:tcPr>
+                </a:tc>
+              </a:tr>
+              <a:tr h="370840">
+                <a:tc>
+                  <a:txBody>
+                    <a:bodyPr/>
+                    <a:lstStyle/>
+                    <a:p>
+                      <a:pPr algn="l"/>
+                      <a:r>
+                        <a:rPr lang="en-US" dirty="0" smtClean="0">
+                          <a:latin typeface="Avenir Book"/>
+                          <a:cs typeface="Avenir Book"/>
+                        </a:rPr>
+                        <a:t>%</a:t>
+                      </a:r>
+                      <a:r>
+                        <a:rPr lang="en-US" baseline="0" dirty="0" smtClean="0">
+                          <a:latin typeface="Avenir Book"/>
+                          <a:cs typeface="Avenir Book"/>
+                        </a:rPr>
+                        <a:t> Time on Vasopressors</a:t>
+                      </a:r>
+                      <a:endParaRPr lang="en-US" dirty="0">
+                        <a:latin typeface="Avenir Book"/>
+                        <a:cs typeface="Avenir Book"/>
+                      </a:endParaRPr>
+                    </a:p>
+                  </a:txBody>
+                  <a:tcPr>
+                    <a:lnL w="12700" cap="flat" cmpd="sng" algn="ctr">
+                      <a:solidFill>
+                        <a:scrgbClr r="0" g="0" b="0"/>
+                      </a:solidFill>
+                      <a:prstDash val="solid"/>
+                      <a:round/>
+                      <a:headEnd type="none" w="med" len="med"/>
+                      <a:tailEnd type="none" w="med" len="med"/>
+                    </a:lnL>
+                    <a:lnR w="12700" cap="flat" cmpd="sng" algn="ctr">
+                      <a:solidFill>
+                        <a:scrgbClr r="0" g="0" b="0"/>
+                      </a:solidFill>
+                      <a:prstDash val="solid"/>
+                      <a:round/>
+                      <a:headEnd type="none" w="med" len="med"/>
+                      <a:tailEnd type="none" w="med" len="med"/>
+                    </a:lnR>
+                    <a:lnT w="12700" cap="flat" cmpd="sng" algn="ctr">
+                      <a:solidFill>
+                        <a:scrgbClr r="0" g="0" b="0"/>
+                      </a:solidFill>
+                      <a:prstDash val="solid"/>
+                      <a:round/>
+                      <a:headEnd type="none" w="med" len="med"/>
+                      <a:tailEnd type="none" w="med" len="med"/>
+                    </a:lnT>
+                    <a:lnB w="12700" cap="flat" cmpd="sng" algn="ctr">
+                      <a:solidFill>
+                        <a:scrgbClr r="0" g="0" b="0"/>
+                      </a:solidFill>
+                      <a:prstDash val="solid"/>
+                      <a:round/>
+                      <a:headEnd type="none" w="med" len="med"/>
+                      <a:tailEnd type="none" w="med" len="med"/>
+                    </a:lnB>
+                  </a:tcPr>
+                </a:tc>
+                <a:tc>
+                  <a:txBody>
+                    <a:bodyPr/>
+                    <a:lstStyle/>
+                    <a:p>
+                      <a:pPr algn="ctr"/>
+                      <a:r>
+                        <a:rPr lang="en-US" dirty="0" smtClean="0">
+                          <a:latin typeface="Avenir Book"/>
+                          <a:cs typeface="Avenir Book"/>
+                        </a:rPr>
+                        <a:t>0.125</a:t>
+                      </a:r>
+                      <a:endParaRPr lang="en-US" dirty="0">
+                        <a:latin typeface="Avenir Book"/>
+                        <a:cs typeface="Avenir Book"/>
+                      </a:endParaRPr>
+                    </a:p>
+                  </a:txBody>
+                  <a:tcPr>
+                    <a:lnL w="12700" cap="flat" cmpd="sng" algn="ctr">
+                      <a:solidFill>
+                        <a:scrgbClr r="0" g="0" b="0"/>
+                      </a:solidFill>
+                      <a:prstDash val="solid"/>
+                      <a:round/>
+                      <a:headEnd type="none" w="med" len="med"/>
+                      <a:tailEnd type="none" w="med" len="med"/>
+                    </a:lnL>
+                    <a:lnR w="12700" cap="flat" cmpd="sng" algn="ctr">
+                      <a:solidFill>
+                        <a:scrgbClr r="0" g="0" b="0"/>
+                      </a:solidFill>
+                      <a:prstDash val="solid"/>
+                      <a:round/>
+                      <a:headEnd type="none" w="med" len="med"/>
+                      <a:tailEnd type="none" w="med" len="med"/>
+                    </a:lnR>
+                    <a:lnT w="12700" cap="flat" cmpd="sng" algn="ctr">
+                      <a:solidFill>
+                        <a:scrgbClr r="0" g="0" b="0"/>
+                      </a:solidFill>
+                      <a:prstDash val="solid"/>
+                      <a:round/>
+                      <a:headEnd type="none" w="med" len="med"/>
+                      <a:tailEnd type="none" w="med" len="med"/>
+                    </a:lnT>
+                    <a:lnB w="12700" cap="flat" cmpd="sng" algn="ctr">
+                      <a:solidFill>
+                        <a:scrgbClr r="0" g="0" b="0"/>
+                      </a:solidFill>
+                      <a:prstDash val="solid"/>
+                      <a:round/>
+                      <a:headEnd type="none" w="med" len="med"/>
+                      <a:tailEnd type="none" w="med" len="med"/>
+                    </a:lnB>
+                  </a:tcPr>
+                </a:tc>
+                <a:tc>
+                  <a:txBody>
+                    <a:bodyPr/>
+                    <a:lstStyle/>
+                    <a:p>
+                      <a:pPr algn="ctr"/>
+                      <a:r>
+                        <a:rPr lang="en-US" dirty="0" smtClean="0">
+                          <a:latin typeface="Avenir Book"/>
+                          <a:cs typeface="Avenir Book"/>
+                        </a:rPr>
+                        <a:t>1.29</a:t>
+                      </a:r>
+                    </a:p>
+                  </a:txBody>
+                  <a:tcPr>
+                    <a:lnL w="12700" cap="flat" cmpd="sng" algn="ctr">
+                      <a:solidFill>
+                        <a:scrgbClr r="0" g="0" b="0"/>
+                      </a:solidFill>
+                      <a:prstDash val="solid"/>
+                      <a:round/>
+                      <a:headEnd type="none" w="med" len="med"/>
+                      <a:tailEnd type="none" w="med" len="med"/>
+                    </a:lnL>
+                    <a:lnR w="12700" cap="flat" cmpd="sng" algn="ctr">
+                      <a:solidFill>
+                        <a:scrgbClr r="0" g="0" b="0"/>
+                      </a:solidFill>
+                      <a:prstDash val="solid"/>
+                      <a:round/>
+                      <a:headEnd type="none" w="med" len="med"/>
+                      <a:tailEnd type="none" w="med" len="med"/>
+                    </a:lnR>
+                    <a:lnT w="12700" cap="flat" cmpd="sng" algn="ctr">
+                      <a:solidFill>
+                        <a:scrgbClr r="0" g="0" b="0"/>
+                      </a:solidFill>
+                      <a:prstDash val="solid"/>
+                      <a:round/>
+                      <a:headEnd type="none" w="med" len="med"/>
+                      <a:tailEnd type="none" w="med" len="med"/>
+                    </a:lnT>
+                    <a:lnB w="12700" cap="flat" cmpd="sng" algn="ctr">
+                      <a:solidFill>
+                        <a:scrgbClr r="0" g="0" b="0"/>
+                      </a:solidFill>
+                      <a:prstDash val="solid"/>
+                      <a:round/>
+                      <a:headEnd type="none" w="med" len="med"/>
+                      <a:tailEnd type="none" w="med" len="med"/>
+                    </a:lnB>
+                  </a:tcPr>
+                </a:tc>
+              </a:tr>
+              <a:tr h="370840">
+                <a:tc>
+                  <a:txBody>
+                    <a:bodyPr/>
+                    <a:lstStyle/>
+                    <a:p>
+                      <a:pPr algn="l"/>
+                      <a:r>
+                        <a:rPr lang="en-US" dirty="0" smtClean="0">
+                          <a:latin typeface="Avenir Book"/>
+                          <a:cs typeface="Avenir Book"/>
+                        </a:rPr>
+                        <a:t>Minimum MAP </a:t>
+                      </a:r>
+                      <a:endParaRPr lang="en-US" dirty="0">
+                        <a:latin typeface="Avenir Book"/>
+                        <a:cs typeface="Avenir Book"/>
+                      </a:endParaRPr>
+                    </a:p>
+                  </a:txBody>
+                  <a:tcPr>
+                    <a:lnL w="12700" cap="flat" cmpd="sng" algn="ctr">
+                      <a:solidFill>
+                        <a:scrgbClr r="0" g="0" b="0"/>
+                      </a:solidFill>
+                      <a:prstDash val="solid"/>
+                      <a:round/>
+                      <a:headEnd type="none" w="med" len="med"/>
+                      <a:tailEnd type="none" w="med" len="med"/>
+                    </a:lnL>
+                    <a:lnR w="12700" cap="flat" cmpd="sng" algn="ctr">
+                      <a:solidFill>
+                        <a:scrgbClr r="0" g="0" b="0"/>
+                      </a:solidFill>
+                      <a:prstDash val="solid"/>
+                      <a:round/>
+                      <a:headEnd type="none" w="med" len="med"/>
+                      <a:tailEnd type="none" w="med" len="med"/>
+                    </a:lnR>
+                    <a:lnT w="12700" cap="flat" cmpd="sng" algn="ctr">
+                      <a:solidFill>
+                        <a:scrgbClr r="0" g="0" b="0"/>
+                      </a:solidFill>
+                      <a:prstDash val="solid"/>
+                      <a:round/>
+                      <a:headEnd type="none" w="med" len="med"/>
+                      <a:tailEnd type="none" w="med" len="med"/>
+                    </a:lnT>
+                    <a:lnB w="12700" cap="flat" cmpd="sng" algn="ctr">
+                      <a:solidFill>
+                        <a:scrgbClr r="0" g="0" b="0"/>
+                      </a:solidFill>
+                      <a:prstDash val="solid"/>
+                      <a:round/>
+                      <a:headEnd type="none" w="med" len="med"/>
+                      <a:tailEnd type="none" w="med" len="med"/>
+                    </a:lnB>
+                    <a:solidFill>
+                      <a:schemeClr val="accent5">
+                        <a:lumMod val="60000"/>
+                        <a:lumOff val="40000"/>
+                      </a:schemeClr>
+                    </a:solidFill>
+                  </a:tcPr>
+                </a:tc>
+                <a:tc>
+                  <a:txBody>
+                    <a:bodyPr/>
+                    <a:lstStyle/>
+                    <a:p>
+                      <a:pPr algn="ctr"/>
+                      <a:r>
+                        <a:rPr lang="en-US" dirty="0" smtClean="0">
+                          <a:latin typeface="Avenir Book"/>
+                          <a:cs typeface="Avenir Book"/>
+                        </a:rPr>
+                        <a:t>&lt;0.001</a:t>
+                      </a:r>
+                      <a:endParaRPr lang="en-US" dirty="0">
+                        <a:latin typeface="Avenir Book"/>
+                        <a:cs typeface="Avenir Book"/>
+                      </a:endParaRPr>
+                    </a:p>
+                  </a:txBody>
+                  <a:tcPr>
+                    <a:lnL w="12700" cap="flat" cmpd="sng" algn="ctr">
+                      <a:solidFill>
+                        <a:scrgbClr r="0" g="0" b="0"/>
+                      </a:solidFill>
+                      <a:prstDash val="solid"/>
+                      <a:round/>
+                      <a:headEnd type="none" w="med" len="med"/>
+                      <a:tailEnd type="none" w="med" len="med"/>
+                    </a:lnL>
+                    <a:lnR w="12700" cap="flat" cmpd="sng" algn="ctr">
+                      <a:solidFill>
+                        <a:scrgbClr r="0" g="0" b="0"/>
+                      </a:solidFill>
+                      <a:prstDash val="solid"/>
+                      <a:round/>
+                      <a:headEnd type="none" w="med" len="med"/>
+                      <a:tailEnd type="none" w="med" len="med"/>
+                    </a:lnR>
+                    <a:lnT w="12700" cap="flat" cmpd="sng" algn="ctr">
+                      <a:solidFill>
+                        <a:scrgbClr r="0" g="0" b="0"/>
+                      </a:solidFill>
+                      <a:prstDash val="solid"/>
+                      <a:round/>
+                      <a:headEnd type="none" w="med" len="med"/>
+                      <a:tailEnd type="none" w="med" len="med"/>
+                    </a:lnT>
+                    <a:lnB w="12700" cap="flat" cmpd="sng" algn="ctr">
+                      <a:solidFill>
+                        <a:scrgbClr r="0" g="0" b="0"/>
+                      </a:solidFill>
+                      <a:prstDash val="solid"/>
+                      <a:round/>
+                      <a:headEnd type="none" w="med" len="med"/>
+                      <a:tailEnd type="none" w="med" len="med"/>
+                    </a:lnB>
+                    <a:solidFill>
+                      <a:schemeClr val="accent5">
+                        <a:lumMod val="60000"/>
+                        <a:lumOff val="40000"/>
+                      </a:schemeClr>
+                    </a:solidFill>
+                  </a:tcPr>
+                </a:tc>
+                <a:tc>
+                  <a:txBody>
+                    <a:bodyPr/>
+                    <a:lstStyle/>
+                    <a:p>
+                      <a:pPr algn="ctr"/>
+                      <a:r>
+                        <a:rPr lang="en-US" dirty="0" smtClean="0">
+                          <a:latin typeface="Avenir Book"/>
+                          <a:cs typeface="Avenir Book"/>
+                        </a:rPr>
+                        <a:t>0.97</a:t>
+                      </a:r>
+                    </a:p>
+                  </a:txBody>
+                  <a:tcPr>
+                    <a:lnL w="12700" cap="flat" cmpd="sng" algn="ctr">
+                      <a:solidFill>
+                        <a:scrgbClr r="0" g="0" b="0"/>
+                      </a:solidFill>
+                      <a:prstDash val="solid"/>
+                      <a:round/>
+                      <a:headEnd type="none" w="med" len="med"/>
+                      <a:tailEnd type="none" w="med" len="med"/>
+                    </a:lnL>
+                    <a:lnR w="12700" cap="flat" cmpd="sng" algn="ctr">
+                      <a:solidFill>
+                        <a:scrgbClr r="0" g="0" b="0"/>
+                      </a:solidFill>
+                      <a:prstDash val="solid"/>
+                      <a:round/>
+                      <a:headEnd type="none" w="med" len="med"/>
+                      <a:tailEnd type="none" w="med" len="med"/>
+                    </a:lnR>
+                    <a:lnT w="12700" cap="flat" cmpd="sng" algn="ctr">
+                      <a:solidFill>
+                        <a:scrgbClr r="0" g="0" b="0"/>
+                      </a:solidFill>
+                      <a:prstDash val="solid"/>
+                      <a:round/>
+                      <a:headEnd type="none" w="med" len="med"/>
+                      <a:tailEnd type="none" w="med" len="med"/>
+                    </a:lnT>
+                    <a:lnB w="12700" cap="flat" cmpd="sng" algn="ctr">
+                      <a:solidFill>
+                        <a:scrgbClr r="0" g="0" b="0"/>
+                      </a:solidFill>
+                      <a:prstDash val="solid"/>
+                      <a:round/>
+                      <a:headEnd type="none" w="med" len="med"/>
+                      <a:tailEnd type="none" w="med" len="med"/>
+                    </a:lnB>
+                    <a:solidFill>
+                      <a:schemeClr val="accent5">
+                        <a:lumMod val="60000"/>
+                        <a:lumOff val="40000"/>
+                      </a:schemeClr>
+                    </a:solidFill>
+                  </a:tcPr>
+                </a:tc>
+              </a:tr>
+            </a:tbl>
+          </a:graphicData>
+        </a:graphic>
+      </p:graphicFrame>
     </p:spTree>
     <p:extLst>
       <p:ext uri="{BB962C8B-B14F-4D97-AF65-F5344CB8AC3E}">
-        <p14:creationId xmlns:p14="http://schemas.microsoft.com/office/powerpoint/2010/main" val="455728235"/>
+        <p14:creationId xmlns:p14="http://schemas.microsoft.com/office/powerpoint/2010/main" val="3497031714"/>
       </p:ext>
     </p:extLst>
   </p:cSld>
@@ -7369,14 +10916,14 @@
           <a:lstStyle/>
           <a:p>
             <a:r>
-              <a:rPr lang="en-US" sz="4400" b="1" dirty="0" smtClean="0">
+              <a:rPr lang="en-US" sz="4400" dirty="0" smtClean="0">
                 <a:latin typeface="Avenir Heavy"/>
                 <a:cs typeface="Avenir Heavy"/>
               </a:rPr>
               <a:t>&gt;1 </a:t>
             </a:r>
             <a:r>
-              <a:rPr lang="en-US" sz="4400" b="1" dirty="0" smtClean="0">
+              <a:rPr lang="en-US" sz="4400" dirty="0" smtClean="0">
                 <a:latin typeface="Avenir Heavy"/>
                 <a:cs typeface="Avenir Heavy"/>
               </a:rPr>
@@ -7425,13 +10972,13 @@
               </a:rPr>
             </a:br>
             <a:r>
-              <a:rPr lang="en-US" sz="4400" b="1" dirty="0" smtClean="0">
+              <a:rPr lang="en-US" sz="4400" dirty="0" smtClean="0">
                 <a:latin typeface="Avenir Heavy"/>
                 <a:cs typeface="Avenir Heavy"/>
               </a:rPr>
               <a:t>28–50%</a:t>
             </a:r>
-            <a:endParaRPr lang="en-US" sz="4400" b="1" dirty="0">
+            <a:endParaRPr lang="en-US" sz="4400" dirty="0">
               <a:latin typeface="Avenir Heavy"/>
               <a:cs typeface="Avenir Heavy"/>
             </a:endParaRPr>
@@ -7464,13 +11011,13 @@
               </a:rPr>
             </a:br>
             <a:r>
-              <a:rPr lang="en-US" sz="4400" b="1" dirty="0" smtClean="0">
+              <a:rPr lang="en-US" sz="4400" dirty="0" smtClean="0">
                 <a:latin typeface="Avenir Heavy"/>
                 <a:cs typeface="Avenir Heavy"/>
               </a:rPr>
               <a:t>$14.2 billion</a:t>
             </a:r>
-            <a:endParaRPr lang="en-US" sz="4400" b="1" dirty="0">
+            <a:endParaRPr lang="en-US" sz="4400" dirty="0">
               <a:latin typeface="Avenir Heavy"/>
               <a:cs typeface="Avenir Heavy"/>
             </a:endParaRPr>
@@ -7800,13 +11347,13 @@
           <a:lstStyle/>
           <a:p>
             <a:r>
-              <a:rPr lang="en-US" sz="4800" b="1" dirty="0" smtClean="0">
+              <a:rPr lang="en-US" sz="4800" dirty="0" smtClean="0">
                 <a:latin typeface="Avenir Heavy"/>
                 <a:cs typeface="Avenir Heavy"/>
               </a:rPr>
               <a:t>36%</a:t>
             </a:r>
-            <a:endParaRPr lang="en-US" sz="4800" b="1" dirty="0" smtClean="0">
+            <a:endParaRPr lang="en-US" sz="4800" dirty="0" smtClean="0">
               <a:latin typeface="Avenir Heavy"/>
               <a:cs typeface="Avenir Heavy"/>
             </a:endParaRPr>
@@ -7846,20 +11393,20 @@
               </a:rPr>
             </a:br>
             <a:r>
-              <a:rPr lang="en-US" sz="4800" b="1" dirty="0" smtClean="0">
+              <a:rPr lang="en-US" sz="4800" dirty="0" smtClean="0">
                 <a:latin typeface="Avenir Heavy"/>
                 <a:cs typeface="Avenir Heavy"/>
               </a:rPr>
               <a:t>37</a:t>
             </a:r>
             <a:r>
-              <a:rPr lang="en-US" sz="4800" b="1" dirty="0" smtClean="0">
+              <a:rPr lang="en-US" sz="4800" dirty="0" smtClean="0">
                 <a:latin typeface="Avenir Heavy"/>
                 <a:cs typeface="Avenir Heavy"/>
               </a:rPr>
               <a:t>–50%</a:t>
             </a:r>
-            <a:endParaRPr lang="en-US" sz="4800" b="1" dirty="0">
+            <a:endParaRPr lang="en-US" sz="4800" dirty="0">
               <a:latin typeface="Avenir Heavy"/>
               <a:cs typeface="Avenir Heavy"/>
             </a:endParaRPr>

</xml_diff>

<commit_message>
Simplify line plot and cosmetic changes
</commit_message>
<xml_diff>
--- a/docs/Presentation.pptx
+++ b/docs/Presentation.pptx
@@ -22,8 +22,8 @@
     <p:sldId id="308" r:id="rId10"/>
     <p:sldId id="310" r:id="rId11"/>
     <p:sldId id="317" r:id="rId12"/>
-    <p:sldId id="309" r:id="rId13"/>
-    <p:sldId id="315" r:id="rId14"/>
+    <p:sldId id="315" r:id="rId13"/>
+    <p:sldId id="309" r:id="rId14"/>
     <p:sldId id="303" r:id="rId15"/>
   </p:sldIdLst>
   <p:sldSz cx="9144000" cy="6858000" type="screen4x3"/>
@@ -953,7 +953,7 @@
           <a:p>
             <a:r>
               <a:rPr lang="en-US" dirty="0" smtClean="0"/>
-              <a:t>Nalini</a:t>
+              <a:t>Chen</a:t>
             </a:r>
             <a:endParaRPr lang="en-US" dirty="0"/>
           </a:p>
@@ -985,7 +985,7 @@
     </p:spTree>
     <p:extLst>
       <p:ext uri="{BB962C8B-B14F-4D97-AF65-F5344CB8AC3E}">
-        <p14:creationId xmlns:p14="http://schemas.microsoft.com/office/powerpoint/2010/main" val="1378853230"/>
+        <p14:creationId xmlns:p14="http://schemas.microsoft.com/office/powerpoint/2010/main" val="3922956313"/>
       </p:ext>
     </p:extLst>
   </p:cSld>
@@ -1041,7 +1041,7 @@
           <a:p>
             <a:r>
               <a:rPr lang="en-US" dirty="0" smtClean="0"/>
-              <a:t>Chen</a:t>
+              <a:t>Nalini</a:t>
             </a:r>
             <a:endParaRPr lang="en-US" dirty="0"/>
           </a:p>
@@ -1073,7 +1073,7 @@
     </p:spTree>
     <p:extLst>
       <p:ext uri="{BB962C8B-B14F-4D97-AF65-F5344CB8AC3E}">
-        <p14:creationId xmlns:p14="http://schemas.microsoft.com/office/powerpoint/2010/main" val="3922956313"/>
+        <p14:creationId xmlns:p14="http://schemas.microsoft.com/office/powerpoint/2010/main" val="1378853230"/>
       </p:ext>
     </p:extLst>
   </p:cSld>
@@ -10400,7 +10400,7 @@
           <a:p>
             <a:r>
               <a:rPr lang="en-US" dirty="0" smtClean="0"/>
-              <a:t>Results: Hypotension Durations</a:t>
+              <a:t>Results: Hypotension Severities</a:t>
             </a:r>
             <a:endParaRPr lang="en-US" dirty="0"/>
           </a:p>
@@ -10460,148 +10460,6 @@
             <a:fld id="{DF18B25F-A302-1845-BDE6-EAE2B319C6F9}" type="slidenum">
               <a:rPr lang="en-US" smtClean="0"/>
               <a:t>12</a:t>
-            </a:fld>
-            <a:endParaRPr lang="en-US"/>
-          </a:p>
-        </p:txBody>
-      </p:sp>
-      <p:pic>
-        <p:nvPicPr>
-          <p:cNvPr id="5" name="Picture 4" descr="map_bins.png"/>
-          <p:cNvPicPr>
-            <a:picLocks noChangeAspect="1"/>
-          </p:cNvPicPr>
-          <p:nvPr/>
-        </p:nvPicPr>
-        <p:blipFill>
-          <a:blip r:embed="rId3">
-            <a:extLst>
-              <a:ext uri="{28A0092B-C50C-407E-A947-70E740481C1C}">
-                <a14:useLocalDpi xmlns:a14="http://schemas.microsoft.com/office/drawing/2010/main" val="0"/>
-              </a:ext>
-            </a:extLst>
-          </a:blip>
-          <a:stretch>
-            <a:fillRect/>
-          </a:stretch>
-        </p:blipFill>
-        <p:spPr>
-          <a:xfrm>
-            <a:off x="1088170" y="1574800"/>
-            <a:ext cx="6967661" cy="4572000"/>
-          </a:xfrm>
-          <a:prstGeom prst="rect">
-            <a:avLst/>
-          </a:prstGeom>
-        </p:spPr>
-      </p:pic>
-    </p:spTree>
-    <p:extLst>
-      <p:ext uri="{BB962C8B-B14F-4D97-AF65-F5344CB8AC3E}">
-        <p14:creationId xmlns:p14="http://schemas.microsoft.com/office/powerpoint/2010/main" val="1040052002"/>
-      </p:ext>
-    </p:extLst>
-  </p:cSld>
-  <p:clrMapOvr>
-    <a:masterClrMapping/>
-  </p:clrMapOvr>
-</p:sld>
-</file>
-
-<file path=ppt/slides/slide13.xml><?xml version="1.0" encoding="utf-8"?>
-<p:sld xmlns:a="http://schemas.openxmlformats.org/drawingml/2006/main" xmlns:r="http://schemas.openxmlformats.org/officeDocument/2006/relationships" xmlns:p="http://schemas.openxmlformats.org/presentationml/2006/main">
-  <p:cSld>
-    <p:spTree>
-      <p:nvGrpSpPr>
-        <p:cNvPr id="1" name=""/>
-        <p:cNvGrpSpPr/>
-        <p:nvPr/>
-      </p:nvGrpSpPr>
-      <p:grpSpPr>
-        <a:xfrm>
-          <a:off x="0" y="0"/>
-          <a:ext cx="0" cy="0"/>
-          <a:chOff x="0" y="0"/>
-          <a:chExt cx="0" cy="0"/>
-        </a:xfrm>
-      </p:grpSpPr>
-      <p:sp>
-        <p:nvSpPr>
-          <p:cNvPr id="2" name="Title 1"/>
-          <p:cNvSpPr>
-            <a:spLocks noGrp="1"/>
-          </p:cNvSpPr>
-          <p:nvPr>
-            <p:ph type="title"/>
-          </p:nvPr>
-        </p:nvSpPr>
-        <p:spPr/>
-        <p:txBody>
-          <a:bodyPr/>
-          <a:lstStyle/>
-          <a:p>
-            <a:r>
-              <a:rPr lang="en-US" dirty="0" smtClean="0"/>
-              <a:t>Results: Hypotension Durations</a:t>
-            </a:r>
-            <a:endParaRPr lang="en-US" dirty="0"/>
-          </a:p>
-        </p:txBody>
-      </p:sp>
-      <p:sp>
-        <p:nvSpPr>
-          <p:cNvPr id="3" name="Content Placeholder 2"/>
-          <p:cNvSpPr>
-            <a:spLocks noGrp="1"/>
-          </p:cNvSpPr>
-          <p:nvPr>
-            <p:ph idx="1"/>
-          </p:nvPr>
-        </p:nvSpPr>
-        <p:spPr/>
-        <p:txBody>
-          <a:bodyPr>
-            <a:normAutofit/>
-          </a:bodyPr>
-          <a:lstStyle/>
-          <a:p>
-            <a:pPr marL="0" indent="0" algn="ctr">
-              <a:buNone/>
-            </a:pPr>
-            <a:endParaRPr lang="en-US" dirty="0" smtClean="0"/>
-          </a:p>
-          <a:p>
-            <a:pPr marL="0" indent="0" algn="ctr">
-              <a:buNone/>
-            </a:pPr>
-            <a:endParaRPr lang="en-US" dirty="0"/>
-          </a:p>
-          <a:p>
-            <a:pPr marL="0" indent="0" algn="ctr">
-              <a:buNone/>
-            </a:pPr>
-            <a:endParaRPr lang="en-US" dirty="0" smtClean="0"/>
-          </a:p>
-        </p:txBody>
-      </p:sp>
-      <p:sp>
-        <p:nvSpPr>
-          <p:cNvPr id="4" name="Slide Number Placeholder 3"/>
-          <p:cNvSpPr>
-            <a:spLocks noGrp="1"/>
-          </p:cNvSpPr>
-          <p:nvPr>
-            <p:ph type="sldNum" sz="quarter" idx="12"/>
-          </p:nvPr>
-        </p:nvSpPr>
-        <p:spPr/>
-        <p:txBody>
-          <a:bodyPr/>
-          <a:lstStyle/>
-          <a:p>
-            <a:fld id="{DF18B25F-A302-1845-BDE6-EAE2B319C6F9}" type="slidenum">
-              <a:rPr lang="en-US" smtClean="0"/>
-              <a:t>13</a:t>
             </a:fld>
             <a:endParaRPr lang="en-US"/>
           </a:p>
@@ -10650,6 +10508,148 @@
 </p:sld>
 </file>
 
+<file path=ppt/slides/slide13.xml><?xml version="1.0" encoding="utf-8"?>
+<p:sld xmlns:a="http://schemas.openxmlformats.org/drawingml/2006/main" xmlns:r="http://schemas.openxmlformats.org/officeDocument/2006/relationships" xmlns:p="http://schemas.openxmlformats.org/presentationml/2006/main">
+  <p:cSld>
+    <p:spTree>
+      <p:nvGrpSpPr>
+        <p:cNvPr id="1" name=""/>
+        <p:cNvGrpSpPr/>
+        <p:nvPr/>
+      </p:nvGrpSpPr>
+      <p:grpSpPr>
+        <a:xfrm>
+          <a:off x="0" y="0"/>
+          <a:ext cx="0" cy="0"/>
+          <a:chOff x="0" y="0"/>
+          <a:chExt cx="0" cy="0"/>
+        </a:xfrm>
+      </p:grpSpPr>
+      <p:sp>
+        <p:nvSpPr>
+          <p:cNvPr id="2" name="Title 1"/>
+          <p:cNvSpPr>
+            <a:spLocks noGrp="1"/>
+          </p:cNvSpPr>
+          <p:nvPr>
+            <p:ph type="title"/>
+          </p:nvPr>
+        </p:nvSpPr>
+        <p:spPr/>
+        <p:txBody>
+          <a:bodyPr/>
+          <a:lstStyle/>
+          <a:p>
+            <a:r>
+              <a:rPr lang="en-US" dirty="0" smtClean="0"/>
+              <a:t>Results: Hypotension Durations</a:t>
+            </a:r>
+            <a:endParaRPr lang="en-US" dirty="0"/>
+          </a:p>
+        </p:txBody>
+      </p:sp>
+      <p:sp>
+        <p:nvSpPr>
+          <p:cNvPr id="3" name="Content Placeholder 2"/>
+          <p:cNvSpPr>
+            <a:spLocks noGrp="1"/>
+          </p:cNvSpPr>
+          <p:nvPr>
+            <p:ph idx="1"/>
+          </p:nvPr>
+        </p:nvSpPr>
+        <p:spPr/>
+        <p:txBody>
+          <a:bodyPr>
+            <a:normAutofit/>
+          </a:bodyPr>
+          <a:lstStyle/>
+          <a:p>
+            <a:pPr marL="0" indent="0" algn="ctr">
+              <a:buNone/>
+            </a:pPr>
+            <a:endParaRPr lang="en-US" dirty="0" smtClean="0"/>
+          </a:p>
+          <a:p>
+            <a:pPr marL="0" indent="0" algn="ctr">
+              <a:buNone/>
+            </a:pPr>
+            <a:endParaRPr lang="en-US" dirty="0"/>
+          </a:p>
+          <a:p>
+            <a:pPr marL="0" indent="0" algn="ctr">
+              <a:buNone/>
+            </a:pPr>
+            <a:endParaRPr lang="en-US" dirty="0" smtClean="0"/>
+          </a:p>
+        </p:txBody>
+      </p:sp>
+      <p:sp>
+        <p:nvSpPr>
+          <p:cNvPr id="4" name="Slide Number Placeholder 3"/>
+          <p:cNvSpPr>
+            <a:spLocks noGrp="1"/>
+          </p:cNvSpPr>
+          <p:nvPr>
+            <p:ph type="sldNum" sz="quarter" idx="12"/>
+          </p:nvPr>
+        </p:nvSpPr>
+        <p:spPr/>
+        <p:txBody>
+          <a:bodyPr/>
+          <a:lstStyle/>
+          <a:p>
+            <a:fld id="{DF18B25F-A302-1845-BDE6-EAE2B319C6F9}" type="slidenum">
+              <a:rPr lang="en-US" smtClean="0"/>
+              <a:t>13</a:t>
+            </a:fld>
+            <a:endParaRPr lang="en-US"/>
+          </a:p>
+        </p:txBody>
+      </p:sp>
+      <p:pic>
+        <p:nvPicPr>
+          <p:cNvPr id="6" name="Picture 5" descr="line.png"/>
+          <p:cNvPicPr>
+            <a:picLocks noChangeAspect="1"/>
+          </p:cNvPicPr>
+          <p:nvPr/>
+        </p:nvPicPr>
+        <p:blipFill>
+          <a:blip r:embed="rId3">
+            <a:extLst>
+              <a:ext uri="{28A0092B-C50C-407E-A947-70E740481C1C}">
+                <a14:useLocalDpi xmlns:a14="http://schemas.microsoft.com/office/drawing/2010/main" val="0"/>
+              </a:ext>
+            </a:extLst>
+          </a:blip>
+          <a:stretch>
+            <a:fillRect/>
+          </a:stretch>
+        </p:blipFill>
+        <p:spPr>
+          <a:xfrm>
+            <a:off x="1088170" y="1511300"/>
+            <a:ext cx="6967661" cy="4572000"/>
+          </a:xfrm>
+          <a:prstGeom prst="rect">
+            <a:avLst/>
+          </a:prstGeom>
+        </p:spPr>
+      </p:pic>
+    </p:spTree>
+    <p:extLst>
+      <p:ext uri="{BB962C8B-B14F-4D97-AF65-F5344CB8AC3E}">
+        <p14:creationId xmlns:p14="http://schemas.microsoft.com/office/powerpoint/2010/main" val="1040052002"/>
+      </p:ext>
+    </p:extLst>
+  </p:cSld>
+  <p:clrMapOvr>
+    <a:masterClrMapping/>
+  </p:clrMapOvr>
+</p:sld>
+</file>
+
 <file path=ppt/slides/slide14.xml><?xml version="1.0" encoding="utf-8"?>
 <p:sld xmlns:a="http://schemas.openxmlformats.org/drawingml/2006/main" xmlns:r="http://schemas.openxmlformats.org/officeDocument/2006/relationships" xmlns:p="http://schemas.openxmlformats.org/presentationml/2006/main">
   <p:cSld>
@@ -10708,7 +10708,7 @@
         </p:spPr>
         <p:txBody>
           <a:bodyPr>
-            <a:normAutofit/>
+            <a:normAutofit fontScale="92500" lnSpcReduction="10000"/>
           </a:bodyPr>
           <a:lstStyle/>
           <a:p>
@@ -10736,7 +10736,7 @@
                   <a:srgbClr val="000000"/>
                 </a:solidFill>
               </a:rPr>
-              <a:t>Minimum MAP achieved lower for AKI patients than non-AKI patients</a:t>
+              <a:t>AKI associated with lower minimum MAP than non-AKI patients</a:t>
             </a:r>
             <a:endParaRPr lang="en-US" dirty="0">
               <a:solidFill>
@@ -10751,7 +10751,17 @@
                   <a:srgbClr val="000000"/>
                 </a:solidFill>
               </a:rPr>
-              <a:t>Higher proportion of patients with low MAPs have AKI</a:t>
+              <a:t>No clear MAP cutoff for predicting AKI</a:t>
+            </a:r>
+          </a:p>
+          <a:p>
+            <a:r>
+              <a:rPr lang="en-US" dirty="0" smtClean="0">
+                <a:solidFill>
+                  <a:srgbClr val="000000"/>
+                </a:solidFill>
+              </a:rPr>
+              <a:t>Inconclusive regarding effect of hypotension duration on AKI likelihood</a:t>
             </a:r>
             <a:endParaRPr lang="en-US" dirty="0" smtClean="0">
               <a:solidFill>
@@ -10789,7 +10799,7 @@
                   <a:srgbClr val="000000"/>
                 </a:solidFill>
               </a:rPr>
-              <a:t>Investigate additional MAP features</a:t>
+              <a:t>Investigate additional MAP duration features</a:t>
             </a:r>
           </a:p>
           <a:p>
@@ -10799,7 +10809,7 @@
                   <a:srgbClr val="000000"/>
                 </a:solidFill>
               </a:rPr>
-              <a:t>Investigate hypertension</a:t>
+              <a:t>Analyze results of hypertension</a:t>
             </a:r>
             <a:endParaRPr lang="en-US" dirty="0">
               <a:solidFill>
@@ -11207,7 +11217,7 @@
           <a:p>
             <a:pPr algn="ctr"/>
             <a:r>
-              <a:rPr lang="en-US" sz="2700" b="1" dirty="0" smtClean="0">
+              <a:rPr lang="en-US" sz="2700" dirty="0" smtClean="0">
                 <a:latin typeface="Avenir Book"/>
                 <a:cs typeface="Avenir Book"/>
               </a:rPr>

</xml_diff>